<commit_message>
made changes in PPT and aberration code
</commit_message>
<xml_diff>
--- a/Optical analysis of different glass types.pptx
+++ b/Optical analysis of different glass types.pptx
@@ -10,6 +10,15 @@
     <p:sldId id="258" r:id="rId4"/>
     <p:sldId id="259" r:id="rId5"/>
     <p:sldId id="260" r:id="rId6"/>
+    <p:sldId id="262" r:id="rId7"/>
+    <p:sldId id="261" r:id="rId8"/>
+    <p:sldId id="263" r:id="rId9"/>
+    <p:sldId id="264" r:id="rId10"/>
+    <p:sldId id="267" r:id="rId11"/>
+    <p:sldId id="268" r:id="rId12"/>
+    <p:sldId id="269" r:id="rId13"/>
+    <p:sldId id="265" r:id="rId14"/>
+    <p:sldId id="266" r:id="rId15"/>
   </p:sldIdLst>
   <p:sldSz cx="9144000" cy="6858000" type="screen4x3"/>
   <p:notesSz cx="6858000" cy="9144000"/>
@@ -3114,6 +3123,773 @@
   <p:clrMapOvr>
     <a:masterClrMapping/>
   </p:clrMapOvr>
+  <p:timing>
+    <p:tnLst>
+      <p:par>
+        <p:cTn id="1" dur="indefinite" restart="never" nodeType="tmRoot"/>
+      </p:par>
+    </p:tnLst>
+  </p:timing>
+</p:sld>
+</file>
+
+<file path=ppt/slides/slide10.xml><?xml version="1.0" encoding="utf-8"?>
+<p:sld xmlns:a="http://schemas.openxmlformats.org/drawingml/2006/main" xmlns:r="http://schemas.openxmlformats.org/officeDocument/2006/relationships" xmlns:p="http://schemas.openxmlformats.org/presentationml/2006/main">
+  <p:cSld>
+    <p:spTree>
+      <p:nvGrpSpPr>
+        <p:cNvPr id="1" name=""/>
+        <p:cNvGrpSpPr/>
+        <p:nvPr/>
+      </p:nvGrpSpPr>
+      <p:grpSpPr>
+        <a:xfrm>
+          <a:off x="0" y="0"/>
+          <a:ext cx="0" cy="0"/>
+          <a:chOff x="0" y="0"/>
+          <a:chExt cx="0" cy="0"/>
+        </a:xfrm>
+      </p:grpSpPr>
+      <p:sp>
+        <p:nvSpPr>
+          <p:cNvPr id="2" name="Title 1"/>
+          <p:cNvSpPr>
+            <a:spLocks noGrp="1"/>
+          </p:cNvSpPr>
+          <p:nvPr>
+            <p:ph type="title"/>
+          </p:nvPr>
+        </p:nvSpPr>
+        <p:spPr/>
+        <p:txBody>
+          <a:bodyPr>
+            <a:normAutofit fontScale="90000"/>
+          </a:bodyPr>
+          <a:lstStyle/>
+          <a:p>
+            <a:r>
+              <a:rPr lang="en-IN" dirty="0" smtClean="0"/>
+              <a:t>Dispersion data for S-LAH99 (</a:t>
+            </a:r>
+            <a:r>
+              <a:rPr lang="en-IN" dirty="0" err="1" smtClean="0"/>
+              <a:t>ohara</a:t>
+            </a:r>
+            <a:r>
+              <a:rPr lang="en-IN" dirty="0" smtClean="0"/>
+              <a:t>) glass</a:t>
+            </a:r>
+            <a:endParaRPr lang="en-IN" dirty="0"/>
+          </a:p>
+        </p:txBody>
+      </p:sp>
+      <p:pic>
+        <p:nvPicPr>
+          <p:cNvPr id="1026" name="Picture 2"/>
+          <p:cNvPicPr>
+            <a:picLocks noGrp="1" noChangeAspect="1" noChangeArrowheads="1"/>
+          </p:cNvPicPr>
+          <p:nvPr>
+            <p:ph idx="1"/>
+          </p:nvPr>
+        </p:nvPicPr>
+        <p:blipFill>
+          <a:blip r:embed="rId2" cstate="print"/>
+          <a:srcRect/>
+          <a:stretch>
+            <a:fillRect/>
+          </a:stretch>
+        </p:blipFill>
+        <p:spPr bwMode="auto">
+          <a:xfrm>
+            <a:off x="4427984" y="3933056"/>
+            <a:ext cx="4716016" cy="2924944"/>
+          </a:xfrm>
+          <a:prstGeom prst="rect">
+            <a:avLst/>
+          </a:prstGeom>
+          <a:noFill/>
+          <a:ln w="9525">
+            <a:noFill/>
+            <a:miter lim="800000"/>
+            <a:headEnd/>
+            <a:tailEnd/>
+          </a:ln>
+        </p:spPr>
+      </p:pic>
+      <p:sp>
+        <p:nvSpPr>
+          <p:cNvPr id="6" name="TextBox 5"/>
+          <p:cNvSpPr txBox="1"/>
+          <p:nvPr/>
+        </p:nvSpPr>
+        <p:spPr>
+          <a:xfrm>
+            <a:off x="0" y="1340768"/>
+            <a:ext cx="8820472" cy="3323987"/>
+          </a:xfrm>
+          <a:prstGeom prst="rect">
+            <a:avLst/>
+          </a:prstGeom>
+          <a:noFill/>
+        </p:spPr>
+        <p:txBody>
+          <a:bodyPr wrap="square" rtlCol="0">
+            <a:spAutoFit/>
+          </a:bodyPr>
+          <a:lstStyle/>
+          <a:p>
+            <a:pPr>
+              <a:buFont typeface="Arial" pitchFamily="34" charset="0"/>
+              <a:buChar char="•"/>
+            </a:pPr>
+            <a:r>
+              <a:rPr lang="en-IN" sz="2400" dirty="0" smtClean="0"/>
+              <a:t>The </a:t>
+            </a:r>
+            <a:r>
+              <a:rPr lang="en-IN" sz="2400" dirty="0" smtClean="0"/>
+              <a:t>curve has negative slope and refractive index is </a:t>
+            </a:r>
+            <a:r>
+              <a:rPr lang="en-IN" sz="2400" dirty="0" smtClean="0"/>
+              <a:t>decreasing with </a:t>
+            </a:r>
+            <a:r>
+              <a:rPr lang="en-IN" sz="2400" dirty="0" smtClean="0"/>
+              <a:t>increasing of wavelength. </a:t>
+            </a:r>
+            <a:endParaRPr lang="en-IN" sz="2400" dirty="0" smtClean="0"/>
+          </a:p>
+          <a:p>
+            <a:pPr>
+              <a:buFont typeface="Arial" pitchFamily="34" charset="0"/>
+              <a:buChar char="•"/>
+            </a:pPr>
+            <a:r>
+              <a:rPr lang="en-IN" sz="2400" dirty="0" smtClean="0"/>
+              <a:t>Also </a:t>
+            </a:r>
+            <a:r>
+              <a:rPr lang="en-IN" sz="2400" dirty="0" smtClean="0"/>
+              <a:t>formula is valid only for certain range </a:t>
+            </a:r>
+            <a:r>
+              <a:rPr lang="en-IN" sz="2400" dirty="0" smtClean="0"/>
+              <a:t>of wavelengths</a:t>
+            </a:r>
+            <a:r>
+              <a:rPr lang="en-IN" sz="2400" dirty="0" smtClean="0"/>
+              <a:t>. The range is 404 nm to 2325 nm. </a:t>
+            </a:r>
+            <a:endParaRPr lang="en-IN" sz="2400" dirty="0" smtClean="0"/>
+          </a:p>
+          <a:p>
+            <a:pPr>
+              <a:buFont typeface="Arial" pitchFamily="34" charset="0"/>
+              <a:buChar char="•"/>
+            </a:pPr>
+            <a:r>
+              <a:rPr lang="en-IN" sz="2400" dirty="0" smtClean="0"/>
+              <a:t>Refractive </a:t>
+            </a:r>
+            <a:r>
+              <a:rPr lang="en-IN" sz="2400" dirty="0" smtClean="0"/>
+              <a:t>index of </a:t>
+            </a:r>
+            <a:r>
+              <a:rPr lang="en-IN" sz="2400" dirty="0" smtClean="0"/>
+              <a:t>S-LAH99 at </a:t>
+            </a:r>
+            <a:r>
+              <a:rPr lang="en-IN" sz="2400" dirty="0" smtClean="0"/>
+              <a:t>1060 nm wavelength is 1.9659499406949175 and we can get every value </a:t>
+            </a:r>
+            <a:r>
+              <a:rPr lang="en-IN" sz="2400" dirty="0" smtClean="0"/>
+              <a:t>by different </a:t>
+            </a:r>
+            <a:r>
+              <a:rPr lang="en-IN" sz="2400" dirty="0" smtClean="0"/>
+              <a:t>inputs. </a:t>
+            </a:r>
+            <a:r>
+              <a:rPr lang="en-IN" sz="2400" dirty="0" smtClean="0"/>
+              <a:t>From the </a:t>
+            </a:r>
+            <a:r>
+              <a:rPr lang="en-IN" sz="2400" dirty="0" smtClean="0"/>
+              <a:t>equation of </a:t>
+            </a:r>
+            <a:r>
+              <a:rPr lang="en-IN" sz="2400" dirty="0" err="1" smtClean="0"/>
+              <a:t>abbe</a:t>
+            </a:r>
+            <a:r>
+              <a:rPr lang="en-IN" sz="2400" dirty="0" smtClean="0"/>
+              <a:t> number ,</a:t>
+            </a:r>
+            <a:r>
+              <a:rPr lang="en-IN" sz="2400" dirty="0" smtClean="0"/>
+              <a:t> </a:t>
+            </a:r>
+            <a:r>
+              <a:rPr lang="en-IN" sz="2400" dirty="0" smtClean="0"/>
+              <a:t>the </a:t>
+            </a:r>
+            <a:r>
+              <a:rPr lang="en-IN" sz="2400" dirty="0" smtClean="0"/>
+              <a:t>value for </a:t>
+            </a:r>
+            <a:r>
+              <a:rPr lang="en-IN" sz="2400" dirty="0" smtClean="0"/>
+              <a:t>S-LAH99 is 29.11920404841508</a:t>
+            </a:r>
+            <a:r>
+              <a:rPr lang="en-IN" dirty="0" smtClean="0"/>
+              <a:t>.</a:t>
+            </a:r>
+          </a:p>
+          <a:p>
+            <a:endParaRPr lang="en-IN" dirty="0"/>
+          </a:p>
+        </p:txBody>
+      </p:sp>
+    </p:spTree>
+  </p:cSld>
+  <p:clrMapOvr>
+    <a:masterClrMapping/>
+  </p:clrMapOvr>
+  <p:timing>
+    <p:tnLst>
+      <p:par>
+        <p:cTn id="1" dur="indefinite" restart="never" nodeType="tmRoot"/>
+      </p:par>
+    </p:tnLst>
+  </p:timing>
+</p:sld>
+</file>
+
+<file path=ppt/slides/slide11.xml><?xml version="1.0" encoding="utf-8"?>
+<p:sld xmlns:a="http://schemas.openxmlformats.org/drawingml/2006/main" xmlns:r="http://schemas.openxmlformats.org/officeDocument/2006/relationships" xmlns:p="http://schemas.openxmlformats.org/presentationml/2006/main">
+  <p:cSld>
+    <p:spTree>
+      <p:nvGrpSpPr>
+        <p:cNvPr id="1" name=""/>
+        <p:cNvGrpSpPr/>
+        <p:nvPr/>
+      </p:nvGrpSpPr>
+      <p:grpSpPr>
+        <a:xfrm>
+          <a:off x="0" y="0"/>
+          <a:ext cx="0" cy="0"/>
+          <a:chOff x="0" y="0"/>
+          <a:chExt cx="0" cy="0"/>
+        </a:xfrm>
+      </p:grpSpPr>
+      <p:sp>
+        <p:nvSpPr>
+          <p:cNvPr id="2" name="Title 1"/>
+          <p:cNvSpPr>
+            <a:spLocks noGrp="1"/>
+          </p:cNvSpPr>
+          <p:nvPr>
+            <p:ph type="title"/>
+          </p:nvPr>
+        </p:nvSpPr>
+        <p:spPr>
+          <a:xfrm>
+            <a:off x="467544" y="0"/>
+            <a:ext cx="8229600" cy="1143000"/>
+          </a:xfrm>
+        </p:spPr>
+        <p:txBody>
+          <a:bodyPr>
+            <a:normAutofit fontScale="90000"/>
+          </a:bodyPr>
+          <a:lstStyle/>
+          <a:p>
+            <a:r>
+              <a:rPr lang="en-IN" dirty="0" smtClean="0"/>
+              <a:t>Dispersion data for J-PSKH1 (</a:t>
+            </a:r>
+            <a:r>
+              <a:rPr lang="en-IN" dirty="0" err="1" smtClean="0"/>
+              <a:t>hikari</a:t>
+            </a:r>
+            <a:r>
+              <a:rPr lang="en-IN" dirty="0" smtClean="0"/>
+              <a:t>) glass </a:t>
+            </a:r>
+            <a:endParaRPr lang="en-IN" dirty="0"/>
+          </a:p>
+        </p:txBody>
+      </p:sp>
+      <p:sp>
+        <p:nvSpPr>
+          <p:cNvPr id="3" name="Content Placeholder 2"/>
+          <p:cNvSpPr>
+            <a:spLocks noGrp="1"/>
+          </p:cNvSpPr>
+          <p:nvPr>
+            <p:ph idx="1"/>
+          </p:nvPr>
+        </p:nvSpPr>
+        <p:spPr>
+          <a:xfrm flipV="1">
+            <a:off x="457200" y="6126163"/>
+            <a:ext cx="8229600" cy="975245"/>
+          </a:xfrm>
+        </p:spPr>
+        <p:txBody>
+          <a:bodyPr/>
+          <a:lstStyle/>
+          <a:p>
+            <a:endParaRPr lang="en-IN" dirty="0"/>
+          </a:p>
+        </p:txBody>
+      </p:sp>
+      <p:pic>
+        <p:nvPicPr>
+          <p:cNvPr id="2050" name="Picture 2"/>
+          <p:cNvPicPr>
+            <a:picLocks noChangeAspect="1" noChangeArrowheads="1"/>
+          </p:cNvPicPr>
+          <p:nvPr/>
+        </p:nvPicPr>
+        <p:blipFill>
+          <a:blip r:embed="rId2" cstate="print"/>
+          <a:srcRect/>
+          <a:stretch>
+            <a:fillRect/>
+          </a:stretch>
+        </p:blipFill>
+        <p:spPr bwMode="auto">
+          <a:xfrm>
+            <a:off x="4644008" y="3501008"/>
+            <a:ext cx="4499992" cy="2996952"/>
+          </a:xfrm>
+          <a:prstGeom prst="rect">
+            <a:avLst/>
+          </a:prstGeom>
+          <a:noFill/>
+          <a:ln w="9525">
+            <a:noFill/>
+            <a:miter lim="800000"/>
+            <a:headEnd/>
+            <a:tailEnd/>
+          </a:ln>
+        </p:spPr>
+      </p:pic>
+      <p:sp>
+        <p:nvSpPr>
+          <p:cNvPr id="5" name="TextBox 4"/>
+          <p:cNvSpPr txBox="1"/>
+          <p:nvPr/>
+        </p:nvSpPr>
+        <p:spPr>
+          <a:xfrm>
+            <a:off x="251520" y="1052736"/>
+            <a:ext cx="7488832" cy="3323987"/>
+          </a:xfrm>
+          <a:prstGeom prst="rect">
+            <a:avLst/>
+          </a:prstGeom>
+          <a:noFill/>
+        </p:spPr>
+        <p:txBody>
+          <a:bodyPr wrap="square" rtlCol="0">
+            <a:spAutoFit/>
+          </a:bodyPr>
+          <a:lstStyle/>
+          <a:p>
+            <a:pPr>
+              <a:buFont typeface="Arial" pitchFamily="34" charset="0"/>
+              <a:buChar char="•"/>
+            </a:pPr>
+            <a:r>
+              <a:rPr lang="en-IN" sz="2400" dirty="0" smtClean="0"/>
+              <a:t>The </a:t>
+            </a:r>
+            <a:r>
+              <a:rPr lang="en-IN" sz="2400" dirty="0" smtClean="0"/>
+              <a:t>curve has negative slope and refractive </a:t>
+            </a:r>
+            <a:r>
+              <a:rPr lang="en-IN" sz="2400" dirty="0" smtClean="0"/>
+              <a:t>index is decreasing with </a:t>
+            </a:r>
+            <a:r>
+              <a:rPr lang="en-IN" sz="2400" dirty="0" smtClean="0"/>
+              <a:t>increasing of wavelength. </a:t>
+            </a:r>
+            <a:endParaRPr lang="en-IN" sz="2400" dirty="0" smtClean="0"/>
+          </a:p>
+          <a:p>
+            <a:pPr>
+              <a:buFont typeface="Arial" pitchFamily="34" charset="0"/>
+              <a:buChar char="•"/>
+            </a:pPr>
+            <a:r>
+              <a:rPr lang="en-IN" sz="2400" dirty="0" smtClean="0"/>
+              <a:t>Also </a:t>
+            </a:r>
+            <a:r>
+              <a:rPr lang="en-IN" sz="2400" dirty="0" smtClean="0"/>
+              <a:t>formula is valid only for certain range </a:t>
+            </a:r>
+            <a:r>
+              <a:rPr lang="en-IN" sz="2400" dirty="0" smtClean="0"/>
+              <a:t>of wavelengths</a:t>
+            </a:r>
+            <a:r>
+              <a:rPr lang="en-IN" sz="2400" dirty="0" smtClean="0"/>
+              <a:t>. The range is 388 nm to 2058 </a:t>
+            </a:r>
+            <a:r>
+              <a:rPr lang="en-IN" sz="2400" dirty="0" smtClean="0"/>
+              <a:t>nm.</a:t>
+            </a:r>
+          </a:p>
+          <a:p>
+            <a:pPr>
+              <a:buFont typeface="Arial" pitchFamily="34" charset="0"/>
+              <a:buChar char="•"/>
+            </a:pPr>
+            <a:r>
+              <a:rPr lang="en-IN" sz="2400" dirty="0" smtClean="0"/>
+              <a:t>Refractive </a:t>
+            </a:r>
+            <a:r>
+              <a:rPr lang="en-IN" sz="2400" dirty="0" smtClean="0"/>
+              <a:t>index of </a:t>
+            </a:r>
+            <a:r>
+              <a:rPr lang="en-IN" sz="2400" dirty="0" smtClean="0"/>
+              <a:t>J-PSKH1 at </a:t>
+            </a:r>
+            <a:r>
+              <a:rPr lang="en-IN" sz="2400" dirty="0" smtClean="0"/>
+              <a:t>1060 nm wavelength is </a:t>
+            </a:r>
+            <a:r>
+              <a:rPr lang="en-IN" sz="2400" dirty="0" smtClean="0"/>
+              <a:t>1.5830354695353313</a:t>
+            </a:r>
+          </a:p>
+          <a:p>
+            <a:pPr>
+              <a:buFont typeface="Arial" pitchFamily="34" charset="0"/>
+              <a:buChar char="•"/>
+            </a:pPr>
+            <a:r>
+              <a:rPr lang="en-IN" sz="2400" dirty="0" smtClean="0"/>
+              <a:t>From the equation of </a:t>
+            </a:r>
+            <a:r>
+              <a:rPr lang="en-IN" sz="2400" dirty="0" err="1" smtClean="0"/>
+              <a:t>abbe</a:t>
+            </a:r>
+            <a:r>
+              <a:rPr lang="en-IN" sz="2400" dirty="0" smtClean="0"/>
+              <a:t> </a:t>
+            </a:r>
+            <a:r>
+              <a:rPr lang="en-IN" sz="2400" dirty="0" smtClean="0"/>
+              <a:t>number, </a:t>
+            </a:r>
+            <a:r>
+              <a:rPr lang="en-IN" sz="2400" dirty="0" smtClean="0"/>
+              <a:t>the value</a:t>
+            </a:r>
+          </a:p>
+          <a:p>
+            <a:r>
+              <a:rPr lang="en-IN" sz="2400" dirty="0" smtClean="0"/>
+              <a:t>for J-PSKH1 is 67.86486866978349</a:t>
+            </a:r>
+          </a:p>
+          <a:p>
+            <a:pPr>
+              <a:buFont typeface="Arial" pitchFamily="34" charset="0"/>
+              <a:buChar char="•"/>
+            </a:pPr>
+            <a:endParaRPr lang="en-IN" dirty="0"/>
+          </a:p>
+        </p:txBody>
+      </p:sp>
+    </p:spTree>
+  </p:cSld>
+  <p:clrMapOvr>
+    <a:masterClrMapping/>
+  </p:clrMapOvr>
+  <p:timing>
+    <p:tnLst>
+      <p:par>
+        <p:cTn id="1" dur="indefinite" restart="never" nodeType="tmRoot"/>
+      </p:par>
+    </p:tnLst>
+  </p:timing>
+</p:sld>
+</file>
+
+<file path=ppt/slides/slide12.xml><?xml version="1.0" encoding="utf-8"?>
+<p:sld xmlns:a="http://schemas.openxmlformats.org/drawingml/2006/main" xmlns:r="http://schemas.openxmlformats.org/officeDocument/2006/relationships" xmlns:p="http://schemas.openxmlformats.org/presentationml/2006/main">
+  <p:cSld>
+    <p:spTree>
+      <p:nvGrpSpPr>
+        <p:cNvPr id="1" name=""/>
+        <p:cNvGrpSpPr/>
+        <p:nvPr/>
+      </p:nvGrpSpPr>
+      <p:grpSpPr>
+        <a:xfrm>
+          <a:off x="0" y="0"/>
+          <a:ext cx="0" cy="0"/>
+          <a:chOff x="0" y="0"/>
+          <a:chExt cx="0" cy="0"/>
+        </a:xfrm>
+      </p:grpSpPr>
+      <p:sp>
+        <p:nvSpPr>
+          <p:cNvPr id="2" name="Title 1"/>
+          <p:cNvSpPr>
+            <a:spLocks noGrp="1"/>
+          </p:cNvSpPr>
+          <p:nvPr>
+            <p:ph type="title"/>
+          </p:nvPr>
+        </p:nvSpPr>
+        <p:spPr/>
+        <p:txBody>
+          <a:bodyPr/>
+          <a:lstStyle/>
+          <a:p>
+            <a:endParaRPr lang="en-IN" dirty="0"/>
+          </a:p>
+        </p:txBody>
+      </p:sp>
+      <p:sp>
+        <p:nvSpPr>
+          <p:cNvPr id="3" name="Content Placeholder 2"/>
+          <p:cNvSpPr>
+            <a:spLocks noGrp="1"/>
+          </p:cNvSpPr>
+          <p:nvPr>
+            <p:ph idx="1"/>
+          </p:nvPr>
+        </p:nvSpPr>
+        <p:spPr/>
+        <p:txBody>
+          <a:bodyPr/>
+          <a:lstStyle/>
+          <a:p>
+            <a:endParaRPr lang="en-IN"/>
+          </a:p>
+        </p:txBody>
+      </p:sp>
+      <p:pic>
+        <p:nvPicPr>
+          <p:cNvPr id="4" name="Picture 3"/>
+          <p:cNvPicPr>
+            <a:picLocks noChangeAspect="1" noChangeArrowheads="1"/>
+          </p:cNvPicPr>
+          <p:nvPr/>
+        </p:nvPicPr>
+        <p:blipFill>
+          <a:blip r:embed="rId2" cstate="print"/>
+          <a:srcRect/>
+          <a:stretch>
+            <a:fillRect/>
+          </a:stretch>
+        </p:blipFill>
+        <p:spPr bwMode="auto">
+          <a:xfrm>
+            <a:off x="971600" y="2636912"/>
+            <a:ext cx="5782195" cy="3068960"/>
+          </a:xfrm>
+          <a:prstGeom prst="rect">
+            <a:avLst/>
+          </a:prstGeom>
+          <a:noFill/>
+          <a:ln w="9525">
+            <a:noFill/>
+            <a:miter lim="800000"/>
+            <a:headEnd/>
+            <a:tailEnd/>
+          </a:ln>
+        </p:spPr>
+      </p:pic>
+    </p:spTree>
+  </p:cSld>
+  <p:clrMapOvr>
+    <a:masterClrMapping/>
+  </p:clrMapOvr>
+  <p:timing>
+    <p:tnLst>
+      <p:par>
+        <p:cTn id="1" dur="indefinite" restart="never" nodeType="tmRoot"/>
+      </p:par>
+    </p:tnLst>
+  </p:timing>
+</p:sld>
+</file>
+
+<file path=ppt/slides/slide13.xml><?xml version="1.0" encoding="utf-8"?>
+<p:sld xmlns:a="http://schemas.openxmlformats.org/drawingml/2006/main" xmlns:r="http://schemas.openxmlformats.org/officeDocument/2006/relationships" xmlns:p="http://schemas.openxmlformats.org/presentationml/2006/main">
+  <p:cSld>
+    <p:spTree>
+      <p:nvGrpSpPr>
+        <p:cNvPr id="1" name=""/>
+        <p:cNvGrpSpPr/>
+        <p:nvPr/>
+      </p:nvGrpSpPr>
+      <p:grpSpPr>
+        <a:xfrm>
+          <a:off x="0" y="0"/>
+          <a:ext cx="0" cy="0"/>
+          <a:chOff x="0" y="0"/>
+          <a:chExt cx="0" cy="0"/>
+        </a:xfrm>
+      </p:grpSpPr>
+      <p:sp>
+        <p:nvSpPr>
+          <p:cNvPr id="2" name="Title 1"/>
+          <p:cNvSpPr>
+            <a:spLocks noGrp="1"/>
+          </p:cNvSpPr>
+          <p:nvPr>
+            <p:ph type="title"/>
+          </p:nvPr>
+        </p:nvSpPr>
+        <p:spPr/>
+        <p:txBody>
+          <a:bodyPr/>
+          <a:lstStyle/>
+          <a:p>
+            <a:r>
+              <a:rPr lang="en-IN" dirty="0" smtClean="0"/>
+              <a:t>Application of data</a:t>
+            </a:r>
+            <a:endParaRPr lang="en-IN" dirty="0"/>
+          </a:p>
+        </p:txBody>
+      </p:sp>
+      <p:sp>
+        <p:nvSpPr>
+          <p:cNvPr id="3" name="Content Placeholder 2"/>
+          <p:cNvSpPr>
+            <a:spLocks noGrp="1"/>
+          </p:cNvSpPr>
+          <p:nvPr>
+            <p:ph idx="1"/>
+          </p:nvPr>
+        </p:nvSpPr>
+        <p:spPr/>
+        <p:txBody>
+          <a:bodyPr/>
+          <a:lstStyle/>
+          <a:p>
+            <a:r>
+              <a:rPr lang="en-IN" dirty="0" smtClean="0"/>
+              <a:t>Using this data we can get precise value of aberration which further uses in reducing the aberration.</a:t>
+            </a:r>
+          </a:p>
+          <a:p>
+            <a:r>
+              <a:rPr lang="en-IN" dirty="0" smtClean="0"/>
+              <a:t>Uses in filter by putting screen/image plane at specific distance which varies with wavelengths.</a:t>
+            </a:r>
+            <a:endParaRPr lang="en-IN" dirty="0"/>
+          </a:p>
+        </p:txBody>
+      </p:sp>
+    </p:spTree>
+  </p:cSld>
+  <p:clrMapOvr>
+    <a:masterClrMapping/>
+  </p:clrMapOvr>
+  <p:timing>
+    <p:tnLst>
+      <p:par>
+        <p:cTn id="1" dur="indefinite" restart="never" nodeType="tmRoot"/>
+      </p:par>
+    </p:tnLst>
+  </p:timing>
+</p:sld>
+</file>
+
+<file path=ppt/slides/slide14.xml><?xml version="1.0" encoding="utf-8"?>
+<p:sld xmlns:a="http://schemas.openxmlformats.org/drawingml/2006/main" xmlns:r="http://schemas.openxmlformats.org/officeDocument/2006/relationships" xmlns:p="http://schemas.openxmlformats.org/presentationml/2006/main">
+  <p:cSld>
+    <p:spTree>
+      <p:nvGrpSpPr>
+        <p:cNvPr id="1" name=""/>
+        <p:cNvGrpSpPr/>
+        <p:nvPr/>
+      </p:nvGrpSpPr>
+      <p:grpSpPr>
+        <a:xfrm>
+          <a:off x="0" y="0"/>
+          <a:ext cx="0" cy="0"/>
+          <a:chOff x="0" y="0"/>
+          <a:chExt cx="0" cy="0"/>
+        </a:xfrm>
+      </p:grpSpPr>
+      <p:sp>
+        <p:nvSpPr>
+          <p:cNvPr id="2" name="Title 1"/>
+          <p:cNvSpPr>
+            <a:spLocks noGrp="1"/>
+          </p:cNvSpPr>
+          <p:nvPr>
+            <p:ph type="title"/>
+          </p:nvPr>
+        </p:nvSpPr>
+        <p:spPr/>
+        <p:txBody>
+          <a:bodyPr/>
+          <a:lstStyle/>
+          <a:p>
+            <a:r>
+              <a:rPr lang="en-IN" dirty="0" smtClean="0"/>
+              <a:t>Thermal analysis</a:t>
+            </a:r>
+            <a:endParaRPr lang="en-IN" dirty="0"/>
+          </a:p>
+        </p:txBody>
+      </p:sp>
+      <p:sp>
+        <p:nvSpPr>
+          <p:cNvPr id="3" name="Content Placeholder 2"/>
+          <p:cNvSpPr>
+            <a:spLocks noGrp="1"/>
+          </p:cNvSpPr>
+          <p:nvPr>
+            <p:ph idx="1"/>
+          </p:nvPr>
+        </p:nvSpPr>
+        <p:spPr/>
+        <p:txBody>
+          <a:bodyPr/>
+          <a:lstStyle/>
+          <a:p>
+            <a:endParaRPr lang="en-IN" dirty="0"/>
+          </a:p>
+        </p:txBody>
+      </p:sp>
+    </p:spTree>
+  </p:cSld>
+  <p:clrMapOvr>
+    <a:masterClrMapping/>
+  </p:clrMapOvr>
+  <p:timing>
+    <p:tnLst>
+      <p:par>
+        <p:cTn id="1" dur="indefinite" restart="never" nodeType="tmRoot"/>
+      </p:par>
+    </p:tnLst>
+  </p:timing>
 </p:sld>
 </file>
 
@@ -3188,11 +3964,7 @@
           <a:p>
             <a:r>
               <a:rPr lang="en-IN" dirty="0" smtClean="0"/>
-              <a:t>It depends on the material types/glass </a:t>
-            </a:r>
-            <a:r>
-              <a:rPr lang="en-IN" dirty="0" smtClean="0"/>
-              <a:t>type</a:t>
+              <a:t>It depends on the material types/glass type</a:t>
             </a:r>
           </a:p>
           <a:p>
@@ -3255,6 +4027,13 @@
   <p:clrMapOvr>
     <a:masterClrMapping/>
   </p:clrMapOvr>
+  <p:timing>
+    <p:tnLst>
+      <p:par>
+        <p:cTn id="1" dur="indefinite" restart="never" nodeType="tmRoot"/>
+      </p:par>
+    </p:tnLst>
+  </p:timing>
 </p:sld>
 </file>
 
@@ -3401,6 +4180,13 @@
   <p:clrMapOvr>
     <a:masterClrMapping/>
   </p:clrMapOvr>
+  <p:timing>
+    <p:tnLst>
+      <p:par>
+        <p:cTn id="1" dur="indefinite" restart="never" nodeType="tmRoot"/>
+      </p:par>
+    </p:tnLst>
+  </p:timing>
 </p:sld>
 </file>
 
@@ -3473,15 +4259,7 @@
             </a:pPr>
             <a:r>
               <a:rPr lang="en-IN" dirty="0" smtClean="0"/>
-              <a:t>(1) Refractive </a:t>
-            </a:r>
-            <a:r>
-              <a:rPr lang="en-IN" dirty="0" smtClean="0"/>
-              <a:t>index of substance increases with decreasing of </a:t>
-            </a:r>
-            <a:r>
-              <a:rPr lang="en-IN" dirty="0" smtClean="0"/>
-              <a:t>wavelength</a:t>
+              <a:t>(1) Refractive index of substance increases with decreasing of wavelength</a:t>
             </a:r>
           </a:p>
           <a:p>
@@ -3490,23 +4268,7 @@
             </a:pPr>
             <a:r>
               <a:rPr lang="en-IN" dirty="0" smtClean="0"/>
-              <a:t> </a:t>
-            </a:r>
-            <a:r>
-              <a:rPr lang="en-IN" dirty="0" smtClean="0"/>
-              <a:t>(</a:t>
-            </a:r>
-            <a:r>
-              <a:rPr lang="en-IN" dirty="0" smtClean="0"/>
-              <a:t>2) The </a:t>
-            </a:r>
-            <a:r>
-              <a:rPr lang="en-IN" dirty="0" smtClean="0"/>
-              <a:t>rate of increase becomes greater at shorter wavelength</a:t>
-            </a:r>
-            <a:r>
-              <a:rPr lang="en-IN" dirty="0" smtClean="0"/>
-              <a:t>.</a:t>
+              <a:t> (2) The rate of increase becomes greater at shorter wavelength.</a:t>
             </a:r>
           </a:p>
           <a:p>
@@ -3545,17 +4307,8 @@
             </a:r>
             <a:r>
               <a:rPr lang="en-IN" dirty="0" smtClean="0"/>
-              <a:t> number means that dispersion is high </a:t>
-            </a:r>
-            <a:r>
-              <a:rPr lang="en-IN" dirty="0" smtClean="0"/>
-              <a:t>and vice </a:t>
-            </a:r>
-            <a:r>
-              <a:rPr lang="en-IN" dirty="0" smtClean="0"/>
-              <a:t>versa. </a:t>
-            </a:r>
-            <a:endParaRPr lang="en-IN" dirty="0" smtClean="0"/>
+              <a:t> number means that dispersion is high and vice versa. </a:t>
+            </a:r>
           </a:p>
           <a:p>
             <a:endParaRPr lang="en-IN" dirty="0" smtClean="0"/>
@@ -3589,15 +4342,7 @@
             </a:r>
             <a:r>
               <a:rPr lang="en-IN" dirty="0" smtClean="0"/>
-              <a:t> are refractive </a:t>
-            </a:r>
-            <a:r>
-              <a:rPr lang="en-IN" dirty="0" smtClean="0"/>
-              <a:t>index of material at wavelengths </a:t>
-            </a:r>
-            <a:r>
-              <a:rPr lang="en-IN" dirty="0" smtClean="0"/>
-              <a:t>of </a:t>
+              <a:t> are refractive index of material at wavelengths of </a:t>
             </a:r>
             <a:r>
               <a:rPr lang="en-IN" dirty="0" err="1" smtClean="0"/>
@@ -3605,11 +4350,7 @@
             </a:r>
             <a:r>
               <a:rPr lang="en-IN" dirty="0" smtClean="0"/>
-              <a:t> </a:t>
-            </a:r>
-            <a:r>
-              <a:rPr lang="en-IN" dirty="0" smtClean="0"/>
-              <a:t>D,F and C lines(589.3 nm, 486.1 nm, 656.3 nm respectively).</a:t>
+              <a:t> D,F and C lines(589.3 nm, 486.1 nm, 656.3 nm respectively).</a:t>
             </a:r>
           </a:p>
           <a:p>
@@ -3623,15 +4364,7 @@
             </a:r>
             <a:r>
               <a:rPr lang="en-IN" dirty="0" smtClean="0"/>
-              <a:t> number </a:t>
-            </a:r>
-            <a:r>
-              <a:rPr lang="en-IN" dirty="0" smtClean="0"/>
-              <a:t>V &lt; 50 and crown glass has V &gt; 50</a:t>
-            </a:r>
-            <a:r>
-              <a:rPr lang="en-IN" dirty="0" smtClean="0"/>
-              <a:t>. </a:t>
+              <a:t> number V &lt; 50 and crown glass has V &gt; 50. </a:t>
             </a:r>
           </a:p>
           <a:p>
@@ -3677,6 +4410,13 @@
   <p:clrMapOvr>
     <a:masterClrMapping/>
   </p:clrMapOvr>
+  <p:timing>
+    <p:tnLst>
+      <p:par>
+        <p:cTn id="1" dur="indefinite" restart="never" nodeType="tmRoot"/>
+      </p:par>
+    </p:tnLst>
+  </p:timing>
 </p:sld>
 </file>
 
@@ -3709,10 +4449,16 @@
         </p:nvSpPr>
         <p:spPr/>
         <p:txBody>
-          <a:bodyPr/>
-          <a:lstStyle/>
-          <a:p>
-            <a:endParaRPr lang="en-IN"/>
+          <a:bodyPr>
+            <a:normAutofit fontScale="90000"/>
+          </a:bodyPr>
+          <a:lstStyle/>
+          <a:p>
+            <a:r>
+              <a:rPr lang="en-IN" dirty="0" smtClean="0"/>
+              <a:t>Find the dispersion relation through ZEMAX</a:t>
+            </a:r>
+            <a:endParaRPr lang="en-IN" dirty="0"/>
           </a:p>
         </p:txBody>
       </p:sp>
@@ -3726,12 +4472,166 @@
             <p:ph idx="1"/>
           </p:nvPr>
         </p:nvSpPr>
-        <p:spPr/>
-        <p:txBody>
-          <a:bodyPr/>
-          <a:lstStyle/>
-          <a:p>
-            <a:endParaRPr lang="en-IN"/>
+        <p:spPr>
+          <a:xfrm>
+            <a:off x="467544" y="1412776"/>
+            <a:ext cx="8229600" cy="5832648"/>
+          </a:xfrm>
+        </p:spPr>
+        <p:txBody>
+          <a:bodyPr>
+            <a:normAutofit fontScale="85000" lnSpcReduction="10000"/>
+          </a:bodyPr>
+          <a:lstStyle/>
+          <a:p>
+            <a:r>
+              <a:rPr lang="en-IN" dirty="0" smtClean="0"/>
+              <a:t>In </a:t>
+            </a:r>
+            <a:r>
+              <a:rPr lang="en-IN" dirty="0" smtClean="0"/>
+              <a:t>dispersion theory, different wavelengths have different refractive index</a:t>
+            </a:r>
+            <a:r>
+              <a:rPr lang="en-IN" dirty="0" smtClean="0"/>
+              <a:t>.</a:t>
+            </a:r>
+          </a:p>
+          <a:p>
+            <a:r>
+              <a:rPr lang="en-IN" dirty="0" smtClean="0"/>
+              <a:t> There are </a:t>
+            </a:r>
+            <a:r>
+              <a:rPr lang="en-IN" dirty="0" smtClean="0"/>
+              <a:t>experimentally verified constants values for all dispersion formula and </a:t>
+            </a:r>
+            <a:r>
+              <a:rPr lang="en-IN" dirty="0" smtClean="0"/>
+              <a:t>give the </a:t>
+            </a:r>
+            <a:r>
+              <a:rPr lang="en-IN" dirty="0" smtClean="0"/>
+              <a:t>relation between refractive index and wavelengths. There are some </a:t>
+            </a:r>
+            <a:r>
+              <a:rPr lang="en-IN" dirty="0" err="1" smtClean="0"/>
+              <a:t>catalogs</a:t>
+            </a:r>
+            <a:r>
+              <a:rPr lang="en-IN" dirty="0" smtClean="0"/>
+              <a:t> made </a:t>
+            </a:r>
+            <a:r>
+              <a:rPr lang="en-IN" dirty="0" smtClean="0"/>
+              <a:t>by manufacturer of glass which provides the details of the glass.</a:t>
+            </a:r>
+          </a:p>
+          <a:p>
+            <a:r>
+              <a:rPr lang="en-IN" dirty="0" smtClean="0"/>
+              <a:t>These </a:t>
+            </a:r>
+            <a:r>
+              <a:rPr lang="en-IN" dirty="0" err="1" smtClean="0"/>
+              <a:t>catalogs</a:t>
+            </a:r>
+            <a:r>
+              <a:rPr lang="en-IN" dirty="0" smtClean="0"/>
+              <a:t> provide the thermal and dispersion relation details.</a:t>
+            </a:r>
+          </a:p>
+          <a:p>
+            <a:r>
+              <a:rPr lang="en-IN" dirty="0" smtClean="0"/>
+              <a:t>Example of </a:t>
+            </a:r>
+            <a:r>
+              <a:rPr lang="en-IN" dirty="0" err="1" smtClean="0"/>
+              <a:t>catalogs</a:t>
+            </a:r>
+            <a:r>
+              <a:rPr lang="en-IN" dirty="0" smtClean="0"/>
+              <a:t> : </a:t>
+            </a:r>
+            <a:r>
+              <a:rPr lang="en-IN" dirty="0" err="1" smtClean="0"/>
+              <a:t>ohara</a:t>
+            </a:r>
+            <a:r>
+              <a:rPr lang="en-IN" dirty="0" smtClean="0"/>
+              <a:t>, </a:t>
+            </a:r>
+            <a:r>
+              <a:rPr lang="en-IN" dirty="0" err="1" smtClean="0"/>
+              <a:t>hoya</a:t>
+            </a:r>
+            <a:r>
+              <a:rPr lang="en-IN" dirty="0" smtClean="0"/>
+              <a:t>, </a:t>
+            </a:r>
+            <a:r>
+              <a:rPr lang="en-IN" dirty="0" err="1" smtClean="0"/>
+              <a:t>birefrin</a:t>
+            </a:r>
+            <a:r>
+              <a:rPr lang="en-IN" dirty="0" smtClean="0"/>
+              <a:t>-gent</a:t>
+            </a:r>
+            <a:r>
+              <a:rPr lang="en-IN" dirty="0" smtClean="0"/>
+              <a:t>, </a:t>
+            </a:r>
+            <a:r>
+              <a:rPr lang="en-IN" dirty="0" err="1" smtClean="0"/>
+              <a:t>hikari</a:t>
+            </a:r>
+            <a:r>
+              <a:rPr lang="en-IN" dirty="0" smtClean="0"/>
+              <a:t>, </a:t>
+            </a:r>
+            <a:r>
+              <a:rPr lang="en-IN" dirty="0" err="1" smtClean="0"/>
+              <a:t>sumita</a:t>
+            </a:r>
+            <a:r>
+              <a:rPr lang="en-IN" dirty="0" smtClean="0"/>
+              <a:t>, misc, infrared</a:t>
+            </a:r>
+          </a:p>
+          <a:p>
+            <a:r>
+              <a:rPr lang="en-IN" dirty="0" smtClean="0"/>
+              <a:t>Extension of the </a:t>
+            </a:r>
+            <a:r>
+              <a:rPr lang="en-IN" dirty="0" err="1" smtClean="0"/>
+              <a:t>catalog</a:t>
+            </a:r>
+            <a:r>
+              <a:rPr lang="en-IN" dirty="0" smtClean="0"/>
+              <a:t> </a:t>
+            </a:r>
+            <a:r>
+              <a:rPr lang="en-IN" dirty="0" smtClean="0"/>
+              <a:t>is AGF which </a:t>
+            </a:r>
+            <a:r>
+              <a:rPr lang="en-IN" dirty="0" smtClean="0"/>
+              <a:t>is basically ANSII file. It could </a:t>
+            </a:r>
+            <a:r>
+              <a:rPr lang="en-IN" dirty="0" smtClean="0"/>
+              <a:t>open with </a:t>
+            </a:r>
+            <a:r>
+              <a:rPr lang="en-IN" dirty="0" smtClean="0"/>
+              <a:t>notepad with texts. </a:t>
+            </a:r>
+            <a:br>
+              <a:rPr lang="en-IN" dirty="0" smtClean="0"/>
+            </a:br>
+            <a:endParaRPr lang="en-IN" dirty="0"/>
           </a:p>
         </p:txBody>
       </p:sp>
@@ -3740,6 +4640,533 @@
   <p:clrMapOvr>
     <a:masterClrMapping/>
   </p:clrMapOvr>
+  <p:timing>
+    <p:tnLst>
+      <p:par>
+        <p:cTn id="1" dur="indefinite" restart="never" nodeType="tmRoot"/>
+      </p:par>
+    </p:tnLst>
+  </p:timing>
+</p:sld>
+</file>
+
+<file path=ppt/slides/slide6.xml><?xml version="1.0" encoding="utf-8"?>
+<p:sld xmlns:a="http://schemas.openxmlformats.org/drawingml/2006/main" xmlns:r="http://schemas.openxmlformats.org/officeDocument/2006/relationships" xmlns:p="http://schemas.openxmlformats.org/presentationml/2006/main">
+  <p:cSld>
+    <p:spTree>
+      <p:nvGrpSpPr>
+        <p:cNvPr id="1" name=""/>
+        <p:cNvGrpSpPr/>
+        <p:nvPr/>
+      </p:nvGrpSpPr>
+      <p:grpSpPr>
+        <a:xfrm>
+          <a:off x="0" y="0"/>
+          <a:ext cx="0" cy="0"/>
+          <a:chOff x="0" y="0"/>
+          <a:chExt cx="0" cy="0"/>
+        </a:xfrm>
+      </p:grpSpPr>
+      <p:sp>
+        <p:nvSpPr>
+          <p:cNvPr id="2" name="Title 1"/>
+          <p:cNvSpPr>
+            <a:spLocks noGrp="1"/>
+          </p:cNvSpPr>
+          <p:nvPr>
+            <p:ph type="title"/>
+          </p:nvPr>
+        </p:nvSpPr>
+        <p:spPr/>
+        <p:txBody>
+          <a:bodyPr/>
+          <a:lstStyle/>
+          <a:p>
+            <a:r>
+              <a:rPr lang="en-IN" dirty="0" smtClean="0"/>
+              <a:t>Dispersion formulas</a:t>
+            </a:r>
+            <a:endParaRPr lang="en-IN" dirty="0"/>
+          </a:p>
+        </p:txBody>
+      </p:sp>
+      <p:pic>
+        <p:nvPicPr>
+          <p:cNvPr id="4" name="Content Placeholder 3" descr="Capture.JPG"/>
+          <p:cNvPicPr>
+            <a:picLocks noGrp="1" noChangeAspect="1"/>
+          </p:cNvPicPr>
+          <p:nvPr>
+            <p:ph idx="1"/>
+          </p:nvPr>
+        </p:nvPicPr>
+        <p:blipFill>
+          <a:blip r:embed="rId2" cstate="print"/>
+          <a:stretch>
+            <a:fillRect/>
+          </a:stretch>
+        </p:blipFill>
+        <p:spPr>
+          <a:xfrm>
+            <a:off x="2123728" y="1241376"/>
+            <a:ext cx="5163839" cy="5616624"/>
+          </a:xfrm>
+        </p:spPr>
+      </p:pic>
+    </p:spTree>
+  </p:cSld>
+  <p:clrMapOvr>
+    <a:masterClrMapping/>
+  </p:clrMapOvr>
+  <p:timing>
+    <p:tnLst>
+      <p:par>
+        <p:cTn id="1" dur="indefinite" restart="never" nodeType="tmRoot"/>
+      </p:par>
+    </p:tnLst>
+  </p:timing>
+</p:sld>
+</file>
+
+<file path=ppt/slides/slide7.xml><?xml version="1.0" encoding="utf-8"?>
+<p:sld xmlns:a="http://schemas.openxmlformats.org/drawingml/2006/main" xmlns:r="http://schemas.openxmlformats.org/officeDocument/2006/relationships" xmlns:p="http://schemas.openxmlformats.org/presentationml/2006/main">
+  <p:cSld>
+    <p:spTree>
+      <p:nvGrpSpPr>
+        <p:cNvPr id="1" name=""/>
+        <p:cNvGrpSpPr/>
+        <p:nvPr/>
+      </p:nvGrpSpPr>
+      <p:grpSpPr>
+        <a:xfrm>
+          <a:off x="0" y="0"/>
+          <a:ext cx="0" cy="0"/>
+          <a:chOff x="0" y="0"/>
+          <a:chExt cx="0" cy="0"/>
+        </a:xfrm>
+      </p:grpSpPr>
+      <p:sp>
+        <p:nvSpPr>
+          <p:cNvPr id="2" name="Title 1"/>
+          <p:cNvSpPr>
+            <a:spLocks noGrp="1"/>
+          </p:cNvSpPr>
+          <p:nvPr>
+            <p:ph type="title"/>
+          </p:nvPr>
+        </p:nvSpPr>
+        <p:spPr/>
+        <p:txBody>
+          <a:bodyPr/>
+          <a:lstStyle/>
+          <a:p>
+            <a:r>
+              <a:rPr lang="en-IN" dirty="0" smtClean="0"/>
+              <a:t>How to read </a:t>
+            </a:r>
+            <a:r>
+              <a:rPr lang="en-IN" dirty="0" err="1" smtClean="0"/>
+              <a:t>catalogs</a:t>
+            </a:r>
+            <a:r>
+              <a:rPr lang="en-IN" dirty="0" smtClean="0"/>
+              <a:t> (N-BK7)</a:t>
+            </a:r>
+            <a:endParaRPr lang="en-IN" dirty="0"/>
+          </a:p>
+        </p:txBody>
+      </p:sp>
+      <p:sp>
+        <p:nvSpPr>
+          <p:cNvPr id="3" name="Content Placeholder 2"/>
+          <p:cNvSpPr>
+            <a:spLocks noGrp="1"/>
+          </p:cNvSpPr>
+          <p:nvPr>
+            <p:ph idx="1"/>
+          </p:nvPr>
+        </p:nvSpPr>
+        <p:spPr>
+          <a:xfrm>
+            <a:off x="457200" y="1600200"/>
+            <a:ext cx="8229600" cy="4925144"/>
+          </a:xfrm>
+        </p:spPr>
+        <p:txBody>
+          <a:bodyPr>
+            <a:normAutofit fontScale="70000" lnSpcReduction="20000"/>
+          </a:bodyPr>
+          <a:lstStyle/>
+          <a:p>
+            <a:r>
+              <a:rPr lang="en-IN" dirty="0" smtClean="0"/>
+              <a:t>NM N-BK7 2 517642.251 1.5168 64.17 0 1</a:t>
+            </a:r>
+          </a:p>
+          <a:p>
+            <a:r>
+              <a:rPr lang="en-IN" dirty="0" smtClean="0"/>
+              <a:t>GC step 0.5 available</a:t>
+            </a:r>
+          </a:p>
+          <a:p>
+            <a:r>
+              <a:rPr lang="en-IN" dirty="0" smtClean="0"/>
+              <a:t>ED 7.100000 8.300000 2.510000 -0.000900 0</a:t>
+            </a:r>
+          </a:p>
+          <a:p>
+            <a:r>
+              <a:rPr lang="en-IN" dirty="0" smtClean="0"/>
+              <a:t>CD 1.039612120E+00 6.000698670E-03 2.317923440E-01 2.001791440E-02</a:t>
+            </a:r>
+          </a:p>
+          <a:p>
+            <a:r>
+              <a:rPr lang="en-IN" dirty="0" smtClean="0"/>
+              <a:t>1.010469450E+00 1.035606530E+02 0.000000000E+00 </a:t>
+            </a:r>
+            <a:r>
+              <a:rPr lang="en-IN" dirty="0" err="1" smtClean="0"/>
+              <a:t>0.000000000E+00</a:t>
+            </a:r>
+            <a:endParaRPr lang="en-IN" dirty="0" smtClean="0"/>
+          </a:p>
+          <a:p>
+            <a:r>
+              <a:rPr lang="en-IN" dirty="0" smtClean="0"/>
+              <a:t>TD 1.860000E-06 1.310000E-08 -1.370000E-11 4.340000E-07 6.270000E-10</a:t>
+            </a:r>
+          </a:p>
+          <a:p>
+            <a:r>
+              <a:rPr lang="en-IN" dirty="0" smtClean="0"/>
+              <a:t>1.700000E-01 2.000000E+01</a:t>
+            </a:r>
+          </a:p>
+          <a:p>
+            <a:r>
+              <a:rPr lang="en-IN" dirty="0" smtClean="0"/>
+              <a:t>OD 1.0000 1.0000 0.0000 1.0000 2.3000 2.3000</a:t>
+            </a:r>
+          </a:p>
+          <a:p>
+            <a:r>
+              <a:rPr lang="en-IN" dirty="0" smtClean="0"/>
+              <a:t>LD 3.00000E-01 2.50000E+00</a:t>
+            </a:r>
+          </a:p>
+          <a:p>
+            <a:r>
+              <a:rPr lang="en-IN" dirty="0" smtClean="0"/>
+              <a:t>IT 3.00000E-01 5.00000E-02 2.50000E+01</a:t>
+            </a:r>
+          </a:p>
+          <a:p>
+            <a:r>
+              <a:rPr lang="en-IN" dirty="0" smtClean="0"/>
+              <a:t>IT 3.10000E-01 2.50000E-01 2.50000E+01</a:t>
+            </a:r>
+          </a:p>
+          <a:p>
+            <a:r>
+              <a:rPr lang="en-IN" dirty="0" smtClean="0"/>
+              <a:t>...................................................................</a:t>
+            </a:r>
+            <a:endParaRPr lang="en-IN" dirty="0"/>
+          </a:p>
+        </p:txBody>
+      </p:sp>
+    </p:spTree>
+  </p:cSld>
+  <p:clrMapOvr>
+    <a:masterClrMapping/>
+  </p:clrMapOvr>
+  <p:timing>
+    <p:tnLst>
+      <p:par>
+        <p:cTn id="1" dur="indefinite" restart="never" nodeType="tmRoot"/>
+      </p:par>
+    </p:tnLst>
+  </p:timing>
+</p:sld>
+</file>
+
+<file path=ppt/slides/slide8.xml><?xml version="1.0" encoding="utf-8"?>
+<p:sld xmlns:a="http://schemas.openxmlformats.org/drawingml/2006/main" xmlns:r="http://schemas.openxmlformats.org/officeDocument/2006/relationships" xmlns:p="http://schemas.openxmlformats.org/presentationml/2006/main">
+  <p:cSld>
+    <p:spTree>
+      <p:nvGrpSpPr>
+        <p:cNvPr id="1" name=""/>
+        <p:cNvGrpSpPr/>
+        <p:nvPr/>
+      </p:nvGrpSpPr>
+      <p:grpSpPr>
+        <a:xfrm>
+          <a:off x="0" y="0"/>
+          <a:ext cx="0" cy="0"/>
+          <a:chOff x="0" y="0"/>
+          <a:chExt cx="0" cy="0"/>
+        </a:xfrm>
+      </p:grpSpPr>
+      <p:sp>
+        <p:nvSpPr>
+          <p:cNvPr id="2" name="Title 1"/>
+          <p:cNvSpPr>
+            <a:spLocks noGrp="1"/>
+          </p:cNvSpPr>
+          <p:nvPr>
+            <p:ph type="title"/>
+          </p:nvPr>
+        </p:nvSpPr>
+        <p:spPr/>
+        <p:txBody>
+          <a:bodyPr/>
+          <a:lstStyle/>
+          <a:p>
+            <a:r>
+              <a:rPr lang="en-IN" dirty="0" smtClean="0"/>
+              <a:t>Python programming</a:t>
+            </a:r>
+            <a:endParaRPr lang="en-IN" dirty="0"/>
+          </a:p>
+        </p:txBody>
+      </p:sp>
+      <p:sp>
+        <p:nvSpPr>
+          <p:cNvPr id="3" name="Content Placeholder 2"/>
+          <p:cNvSpPr>
+            <a:spLocks noGrp="1"/>
+          </p:cNvSpPr>
+          <p:nvPr>
+            <p:ph idx="1"/>
+          </p:nvPr>
+        </p:nvSpPr>
+        <p:spPr/>
+        <p:txBody>
+          <a:bodyPr/>
+          <a:lstStyle/>
+          <a:p>
+            <a:r>
+              <a:rPr lang="en-IN" dirty="0" smtClean="0"/>
+              <a:t>With using of python, data extraction from </a:t>
+            </a:r>
+            <a:r>
+              <a:rPr lang="en-IN" dirty="0" err="1" smtClean="0"/>
+              <a:t>catalogs</a:t>
+            </a:r>
+            <a:r>
+              <a:rPr lang="en-IN" dirty="0" smtClean="0"/>
+              <a:t> becomes easy.</a:t>
+            </a:r>
+          </a:p>
+          <a:p>
+            <a:r>
+              <a:rPr lang="en-IN" dirty="0" smtClean="0"/>
+              <a:t>After getting input data of glass name from user, python runs the code through loops and logic codes and get data and all constants.</a:t>
+            </a:r>
+          </a:p>
+          <a:p>
+            <a:r>
+              <a:rPr lang="en-IN" dirty="0" smtClean="0"/>
+              <a:t>Using these constants and data, we can get plots and relation for dispersion and thermal analysis.</a:t>
+            </a:r>
+          </a:p>
+        </p:txBody>
+      </p:sp>
+    </p:spTree>
+  </p:cSld>
+  <p:clrMapOvr>
+    <a:masterClrMapping/>
+  </p:clrMapOvr>
+  <p:timing>
+    <p:tnLst>
+      <p:par>
+        <p:cTn id="1" dur="indefinite" restart="never" nodeType="tmRoot"/>
+      </p:par>
+    </p:tnLst>
+  </p:timing>
+</p:sld>
+</file>
+
+<file path=ppt/slides/slide9.xml><?xml version="1.0" encoding="utf-8"?>
+<p:sld xmlns:a="http://schemas.openxmlformats.org/drawingml/2006/main" xmlns:r="http://schemas.openxmlformats.org/officeDocument/2006/relationships" xmlns:p="http://schemas.openxmlformats.org/presentationml/2006/main">
+  <p:cSld>
+    <p:spTree>
+      <p:nvGrpSpPr>
+        <p:cNvPr id="1" name=""/>
+        <p:cNvGrpSpPr/>
+        <p:nvPr/>
+      </p:nvGrpSpPr>
+      <p:grpSpPr>
+        <a:xfrm>
+          <a:off x="0" y="0"/>
+          <a:ext cx="0" cy="0"/>
+          <a:chOff x="0" y="0"/>
+          <a:chExt cx="0" cy="0"/>
+        </a:xfrm>
+      </p:grpSpPr>
+      <p:sp>
+        <p:nvSpPr>
+          <p:cNvPr id="2" name="Title 1"/>
+          <p:cNvSpPr>
+            <a:spLocks noGrp="1"/>
+          </p:cNvSpPr>
+          <p:nvPr>
+            <p:ph type="title"/>
+          </p:nvPr>
+        </p:nvSpPr>
+        <p:spPr>
+          <a:xfrm>
+            <a:off x="467544" y="0"/>
+            <a:ext cx="8229600" cy="1143000"/>
+          </a:xfrm>
+        </p:spPr>
+        <p:txBody>
+          <a:bodyPr>
+            <a:normAutofit fontScale="90000"/>
+          </a:bodyPr>
+          <a:lstStyle/>
+          <a:p>
+            <a:r>
+              <a:rPr lang="en-IN" dirty="0" smtClean="0"/>
+              <a:t>Dispersion data for N-BK7 (</a:t>
+            </a:r>
+            <a:r>
+              <a:rPr lang="en-IN" dirty="0" err="1" smtClean="0"/>
+              <a:t>schott</a:t>
+            </a:r>
+            <a:r>
+              <a:rPr lang="en-IN" dirty="0" smtClean="0"/>
+              <a:t>) glass</a:t>
+            </a:r>
+            <a:endParaRPr lang="en-IN" dirty="0"/>
+          </a:p>
+        </p:txBody>
+      </p:sp>
+      <p:sp>
+        <p:nvSpPr>
+          <p:cNvPr id="3" name="Content Placeholder 2"/>
+          <p:cNvSpPr>
+            <a:spLocks noGrp="1"/>
+          </p:cNvSpPr>
+          <p:nvPr>
+            <p:ph idx="1"/>
+          </p:nvPr>
+        </p:nvSpPr>
+        <p:spPr>
+          <a:xfrm>
+            <a:off x="0" y="996752"/>
+            <a:ext cx="8229600" cy="5861248"/>
+          </a:xfrm>
+        </p:spPr>
+        <p:txBody>
+          <a:bodyPr/>
+          <a:lstStyle/>
+          <a:p>
+            <a:r>
+              <a:rPr lang="en-IN" dirty="0" smtClean="0"/>
+              <a:t>Name : N-BK7</a:t>
+            </a:r>
+          </a:p>
+          <a:p>
+            <a:r>
+              <a:rPr lang="en-IN" dirty="0" smtClean="0"/>
+              <a:t>Wavelength range : </a:t>
+            </a:r>
+            <a:r>
+              <a:rPr lang="pl-PL" dirty="0" smtClean="0"/>
+              <a:t>300 nm to 2500 </a:t>
+            </a:r>
+            <a:r>
+              <a:rPr lang="pl-PL" dirty="0" smtClean="0"/>
+              <a:t>nm</a:t>
+            </a:r>
+            <a:endParaRPr lang="en-IN" dirty="0" smtClean="0"/>
+          </a:p>
+          <a:p>
+            <a:r>
+              <a:rPr lang="en-IN" dirty="0" smtClean="0"/>
+              <a:t>RI for N-BK7 at </a:t>
+            </a:r>
+            <a:r>
+              <a:rPr lang="en-IN" dirty="0" smtClean="0"/>
+              <a:t>1060 nm wavelength is 1.5066875568966998 and we can get every value </a:t>
+            </a:r>
+            <a:r>
+              <a:rPr lang="en-IN" dirty="0" smtClean="0"/>
+              <a:t>by different </a:t>
+            </a:r>
+            <a:r>
+              <a:rPr lang="en-IN" dirty="0" smtClean="0"/>
+              <a:t>inputs. From the equation of </a:t>
+            </a:r>
+            <a:r>
+              <a:rPr lang="en-IN" dirty="0" err="1" smtClean="0"/>
+              <a:t>abbe</a:t>
+            </a:r>
+            <a:r>
+              <a:rPr lang="en-IN" dirty="0" smtClean="0"/>
+              <a:t> </a:t>
+            </a:r>
+            <a:r>
+              <a:rPr lang="en-IN" dirty="0" smtClean="0"/>
+              <a:t>number, </a:t>
+            </a:r>
+            <a:r>
+              <a:rPr lang="en-IN" dirty="0" smtClean="0"/>
+              <a:t>the value </a:t>
+            </a:r>
+            <a:r>
+              <a:rPr lang="en-IN" dirty="0" smtClean="0"/>
+              <a:t>for N-BK7 </a:t>
+            </a:r>
+            <a:r>
+              <a:rPr lang="en-IN" dirty="0" smtClean="0"/>
+              <a:t>is 64.13319920721142. </a:t>
+            </a:r>
+          </a:p>
+          <a:p>
+            <a:endParaRPr lang="en-IN" dirty="0"/>
+          </a:p>
+        </p:txBody>
+      </p:sp>
+      <p:pic>
+        <p:nvPicPr>
+          <p:cNvPr id="4" name="Picture 3" descr="Capture.JPG"/>
+          <p:cNvPicPr>
+            <a:picLocks noChangeAspect="1"/>
+          </p:cNvPicPr>
+          <p:nvPr/>
+        </p:nvPicPr>
+        <p:blipFill>
+          <a:blip r:embed="rId2" cstate="print"/>
+          <a:stretch>
+            <a:fillRect/>
+          </a:stretch>
+        </p:blipFill>
+        <p:spPr>
+          <a:xfrm>
+            <a:off x="4211960" y="4091186"/>
+            <a:ext cx="4047356" cy="2766814"/>
+          </a:xfrm>
+          <a:prstGeom prst="rect">
+            <a:avLst/>
+          </a:prstGeom>
+        </p:spPr>
+      </p:pic>
+    </p:spTree>
+  </p:cSld>
+  <p:clrMapOvr>
+    <a:masterClrMapping/>
+  </p:clrMapOvr>
+  <p:timing>
+    <p:tnLst>
+      <p:par>
+        <p:cTn id="1" dur="indefinite" restart="never" nodeType="tmRoot"/>
+      </p:par>
+    </p:tnLst>
+  </p:timing>
 </p:sld>
 </file>
 

</xml_diff>

<commit_message>
Made final aberration file for different models
</commit_message>
<xml_diff>
--- a/Optical analysis of different glass types.pptx
+++ b/Optical analysis of different glass types.pptx
@@ -17,12 +17,17 @@
     <p:sldId id="267" r:id="rId11"/>
     <p:sldId id="268" r:id="rId12"/>
     <p:sldId id="269" r:id="rId13"/>
-    <p:sldId id="265" r:id="rId14"/>
-    <p:sldId id="266" r:id="rId15"/>
-    <p:sldId id="270" r:id="rId16"/>
-    <p:sldId id="271" r:id="rId17"/>
-    <p:sldId id="272" r:id="rId18"/>
-    <p:sldId id="273" r:id="rId19"/>
+    <p:sldId id="266" r:id="rId14"/>
+    <p:sldId id="270" r:id="rId15"/>
+    <p:sldId id="271" r:id="rId16"/>
+    <p:sldId id="272" r:id="rId17"/>
+    <p:sldId id="273" r:id="rId18"/>
+    <p:sldId id="274" r:id="rId19"/>
+    <p:sldId id="275" r:id="rId20"/>
+    <p:sldId id="276" r:id="rId21"/>
+    <p:sldId id="277" r:id="rId22"/>
+    <p:sldId id="278" r:id="rId23"/>
+    <p:sldId id="265" r:id="rId24"/>
   </p:sldIdLst>
   <p:sldSz cx="9144000" cy="6858000" type="screen4x3"/>
   <p:notesSz cx="6858000" cy="9144000"/>
@@ -259,7 +264,7 @@
             <a:fld id="{F132C01E-37C7-443D-84DB-10E531638167}" type="datetimeFigureOut">
               <a:rPr lang="en-IN" smtClean="0"/>
               <a:pPr/>
-              <a:t>02-07-2019</a:t>
+              <a:t>04-07-2019</a:t>
             </a:fld>
             <a:endParaRPr lang="en-IN"/>
           </a:p>
@@ -574,7 +579,7 @@
             <a:fld id="{F132C01E-37C7-443D-84DB-10E531638167}" type="datetimeFigureOut">
               <a:rPr lang="en-IN" smtClean="0"/>
               <a:pPr/>
-              <a:t>02-07-2019</a:t>
+              <a:t>04-07-2019</a:t>
             </a:fld>
             <a:endParaRPr lang="en-IN"/>
           </a:p>
@@ -761,7 +766,7 @@
             <a:fld id="{F132C01E-37C7-443D-84DB-10E531638167}" type="datetimeFigureOut">
               <a:rPr lang="en-IN" smtClean="0"/>
               <a:pPr/>
-              <a:t>02-07-2019</a:t>
+              <a:t>04-07-2019</a:t>
             </a:fld>
             <a:endParaRPr lang="en-IN"/>
           </a:p>
@@ -938,7 +943,7 @@
             <a:fld id="{F132C01E-37C7-443D-84DB-10E531638167}" type="datetimeFigureOut">
               <a:rPr lang="en-IN" smtClean="0"/>
               <a:pPr/>
-              <a:t>02-07-2019</a:t>
+              <a:t>04-07-2019</a:t>
             </a:fld>
             <a:endParaRPr lang="en-IN"/>
           </a:p>
@@ -1208,7 +1213,7 @@
             <a:fld id="{F132C01E-37C7-443D-84DB-10E531638167}" type="datetimeFigureOut">
               <a:rPr lang="en-IN" smtClean="0"/>
               <a:pPr/>
-              <a:t>02-07-2019</a:t>
+              <a:t>04-07-2019</a:t>
             </a:fld>
             <a:endParaRPr lang="en-IN"/>
           </a:p>
@@ -1678,7 +1683,7 @@
             <a:fld id="{F132C01E-37C7-443D-84DB-10E531638167}" type="datetimeFigureOut">
               <a:rPr lang="en-IN" smtClean="0"/>
               <a:pPr/>
-              <a:t>02-07-2019</a:t>
+              <a:t>04-07-2019</a:t>
             </a:fld>
             <a:endParaRPr lang="en-IN"/>
           </a:p>
@@ -2169,7 +2174,7 @@
             <a:fld id="{F132C01E-37C7-443D-84DB-10E531638167}" type="datetimeFigureOut">
               <a:rPr lang="en-IN" smtClean="0"/>
               <a:pPr/>
-              <a:t>02-07-2019</a:t>
+              <a:t>04-07-2019</a:t>
             </a:fld>
             <a:endParaRPr lang="en-IN"/>
           </a:p>
@@ -2297,7 +2302,7 @@
             <a:fld id="{F132C01E-37C7-443D-84DB-10E531638167}" type="datetimeFigureOut">
               <a:rPr lang="en-IN" smtClean="0"/>
               <a:pPr/>
-              <a:t>02-07-2019</a:t>
+              <a:t>04-07-2019</a:t>
             </a:fld>
             <a:endParaRPr lang="en-IN"/>
           </a:p>
@@ -2443,7 +2448,7 @@
             <a:fld id="{F132C01E-37C7-443D-84DB-10E531638167}" type="datetimeFigureOut">
               <a:rPr lang="en-IN" smtClean="0"/>
               <a:pPr/>
-              <a:t>02-07-2019</a:t>
+              <a:t>04-07-2019</a:t>
             </a:fld>
             <a:endParaRPr lang="en-IN"/>
           </a:p>
@@ -2767,7 +2772,7 @@
             <a:fld id="{F132C01E-37C7-443D-84DB-10E531638167}" type="datetimeFigureOut">
               <a:rPr lang="en-IN" smtClean="0"/>
               <a:pPr/>
-              <a:t>02-07-2019</a:t>
+              <a:t>04-07-2019</a:t>
             </a:fld>
             <a:endParaRPr lang="en-IN"/>
           </a:p>
@@ -2903,7 +2908,7 @@
             <a:fld id="{F132C01E-37C7-443D-84DB-10E531638167}" type="datetimeFigureOut">
               <a:rPr lang="en-IN" smtClean="0"/>
               <a:pPr/>
-              <a:t>02-07-2019</a:t>
+              <a:t>04-07-2019</a:t>
             </a:fld>
             <a:endParaRPr lang="en-IN"/>
           </a:p>
@@ -3686,7 +3691,7 @@
             <a:fld id="{F132C01E-37C7-443D-84DB-10E531638167}" type="datetimeFigureOut">
               <a:rPr lang="en-IN" smtClean="0"/>
               <a:pPr/>
-              <a:t>02-07-2019</a:t>
+              <a:t>04-07-2019</a:t>
             </a:fld>
             <a:endParaRPr lang="en-IN"/>
           </a:p>
@@ -4200,7 +4205,15 @@
           <a:p>
             <a:r>
               <a:rPr lang="en-IN" dirty="0" smtClean="0"/>
-              <a:t>Optical analysis of different glass types</a:t>
+              <a:t>Optical </a:t>
+            </a:r>
+            <a:r>
+              <a:rPr lang="en-IN" dirty="0" smtClean="0"/>
+              <a:t>Analysis </a:t>
+            </a:r>
+            <a:r>
+              <a:rPr lang="en-IN" dirty="0" smtClean="0"/>
+              <a:t>of different glass types</a:t>
             </a:r>
             <a:endParaRPr lang="en-IN" dirty="0"/>
           </a:p>
@@ -4567,11 +4580,7 @@
             </a:pPr>
             <a:r>
               <a:rPr lang="en-IN" sz="2400" dirty="0" smtClean="0"/>
-              <a:t>Refractive index of S-LAH99 at 1060 nm wavelength is </a:t>
-            </a:r>
-            <a:r>
-              <a:rPr lang="en-IN" sz="2400" dirty="0" smtClean="0"/>
-              <a:t>1.9659499406949175</a:t>
+              <a:t>Refractive index of S-LAH99 at 1060 nm wavelength is 1.9659499406949175</a:t>
             </a:r>
           </a:p>
           <a:p>
@@ -4581,11 +4590,7 @@
             </a:pPr>
             <a:r>
               <a:rPr lang="en-IN" sz="2400" dirty="0" smtClean="0"/>
-              <a:t> </a:t>
-            </a:r>
-            <a:r>
-              <a:rPr lang="en-IN" sz="2400" dirty="0" smtClean="0"/>
-              <a:t>From the equation of </a:t>
+              <a:t> From the equation of </a:t>
             </a:r>
             <a:r>
               <a:rPr lang="en-IN" sz="2400" dirty="0" err="1" smtClean="0"/>
@@ -4644,7 +4649,11 @@
                                           </p:stCondLst>
                                         </p:cTn>
                                         <p:tgtEl>
-                                          <p:spTgt spid="2"/>
+                                          <p:spTgt spid="6">
+                                            <p:txEl>
+                                              <p:pRg st="0" end="0"/>
+                                            </p:txEl>
+                                          </p:spTgt>
                                         </p:tgtEl>
                                         <p:attrNameLst>
                                           <p:attrName>style.visibility</p:attrName>
@@ -4658,7 +4667,11 @@
                                       <p:cBhvr>
                                         <p:cTn id="7" dur="2000"/>
                                         <p:tgtEl>
-                                          <p:spTgt spid="2"/>
+                                          <p:spTgt spid="6">
+                                            <p:txEl>
+                                              <p:pRg st="0" end="0"/>
+                                            </p:txEl>
+                                          </p:spTgt>
                                         </p:tgtEl>
                                       </p:cBhvr>
                                     </p:animEffect>
@@ -4699,7 +4712,7 @@
                                         <p:tgtEl>
                                           <p:spTgt spid="6">
                                             <p:txEl>
-                                              <p:pRg st="0" end="0"/>
+                                              <p:pRg st="1" end="1"/>
                                             </p:txEl>
                                           </p:spTgt>
                                         </p:tgtEl>
@@ -4717,7 +4730,7 @@
                                         <p:tgtEl>
                                           <p:spTgt spid="6">
                                             <p:txEl>
-                                              <p:pRg st="0" end="0"/>
+                                              <p:pRg st="1" end="1"/>
                                             </p:txEl>
                                           </p:spTgt>
                                         </p:tgtEl>
@@ -4760,7 +4773,7 @@
                                         <p:tgtEl>
                                           <p:spTgt spid="6">
                                             <p:txEl>
-                                              <p:pRg st="1" end="1"/>
+                                              <p:pRg st="2" end="2"/>
                                             </p:txEl>
                                           </p:spTgt>
                                         </p:tgtEl>
@@ -4778,7 +4791,7 @@
                                         <p:tgtEl>
                                           <p:spTgt spid="6">
                                             <p:txEl>
-                                              <p:pRg st="1" end="1"/>
+                                              <p:pRg st="2" end="2"/>
                                             </p:txEl>
                                           </p:spTgt>
                                         </p:tgtEl>
@@ -4821,7 +4834,7 @@
                                         <p:tgtEl>
                                           <p:spTgt spid="6">
                                             <p:txEl>
-                                              <p:pRg st="2" end="2"/>
+                                              <p:pRg st="3" end="3"/>
                                             </p:txEl>
                                           </p:spTgt>
                                         </p:tgtEl>
@@ -4839,7 +4852,7 @@
                                         <p:tgtEl>
                                           <p:spTgt spid="6">
                                             <p:txEl>
-                                              <p:pRg st="2" end="2"/>
+                                              <p:pRg st="3" end="3"/>
                                             </p:txEl>
                                           </p:spTgt>
                                         </p:tgtEl>
@@ -4867,7 +4880,7 @@
                             </p:stCondLst>
                             <p:childTnLst>
                               <p:par>
-                                <p:cTn id="25" presetID="10" presetClass="entr" presetSubtype="0" fill="hold" grpId="0" nodeType="clickEffect">
+                                <p:cTn id="25" presetID="10" presetClass="entr" presetSubtype="0" fill="hold" nodeType="clickEffect">
                                   <p:stCondLst>
                                     <p:cond delay="0"/>
                                   </p:stCondLst>
@@ -4880,11 +4893,7 @@
                                           </p:stCondLst>
                                         </p:cTn>
                                         <p:tgtEl>
-                                          <p:spTgt spid="6">
-                                            <p:txEl>
-                                              <p:pRg st="3" end="3"/>
-                                            </p:txEl>
-                                          </p:spTgt>
+                                          <p:spTgt spid="1026"/>
                                         </p:tgtEl>
                                         <p:attrNameLst>
                                           <p:attrName>style.visibility</p:attrName>
@@ -4898,11 +4907,7 @@
                                       <p:cBhvr>
                                         <p:cTn id="27" dur="2000"/>
                                         <p:tgtEl>
-                                          <p:spTgt spid="6">
-                                            <p:txEl>
-                                              <p:pRg st="3" end="3"/>
-                                            </p:txEl>
-                                          </p:spTgt>
+                                          <p:spTgt spid="1026"/>
                                         </p:tgtEl>
                                       </p:cBhvr>
                                     </p:animEffect>
@@ -4928,7 +4933,7 @@
                             </p:stCondLst>
                             <p:childTnLst>
                               <p:par>
-                                <p:cTn id="30" presetID="10" presetClass="entr" presetSubtype="0" fill="hold" nodeType="clickEffect">
+                                <p:cTn id="30" presetID="10" presetClass="entr" presetSubtype="0" fill="hold" grpId="0" nodeType="clickEffect">
                                   <p:stCondLst>
                                     <p:cond delay="0"/>
                                   </p:stCondLst>
@@ -4941,7 +4946,7 @@
                                           </p:stCondLst>
                                         </p:cTn>
                                         <p:tgtEl>
-                                          <p:spTgt spid="1026"/>
+                                          <p:spTgt spid="2"/>
                                         </p:tgtEl>
                                         <p:attrNameLst>
                                           <p:attrName>style.visibility</p:attrName>
@@ -4955,7 +4960,7 @@
                                       <p:cBhvr>
                                         <p:cTn id="32" dur="2000"/>
                                         <p:tgtEl>
-                                          <p:spTgt spid="1026"/>
+                                          <p:spTgt spid="2"/>
                                         </p:tgtEl>
                                       </p:cBhvr>
                                     </p:animEffect>
@@ -5633,11 +5638,7 @@
           <a:p>
             <a:r>
               <a:rPr lang="en-IN" dirty="0" smtClean="0"/>
-              <a:t>Dispersion data for </a:t>
-            </a:r>
-            <a:r>
-              <a:rPr lang="en-IN" dirty="0" smtClean="0"/>
-              <a:t>K-SFLD14 (</a:t>
+              <a:t>Dispersion data for K-SFLD14 (</a:t>
             </a:r>
             <a:r>
               <a:rPr lang="en-IN" dirty="0" err="1" smtClean="0"/>
@@ -5683,28 +5684,15 @@
             </a:r>
             <a:r>
               <a:rPr lang="pl-PL" dirty="0" smtClean="0"/>
-              <a:t>400 nm to 1550 </a:t>
-            </a:r>
-            <a:r>
-              <a:rPr lang="pl-PL" dirty="0" smtClean="0"/>
-              <a:t>nm</a:t>
+              <a:t>400 nm to 1550 nm</a:t>
             </a:r>
             <a:endParaRPr lang="en-IN" dirty="0" smtClean="0"/>
           </a:p>
           <a:p>
             <a:r>
               <a:rPr lang="en-IN" dirty="0" smtClean="0"/>
-              <a:t>Refractive index of </a:t>
-            </a:r>
-            <a:r>
-              <a:rPr lang="en-IN" dirty="0" smtClean="0"/>
-              <a:t>K-SFLD14 at </a:t>
-            </a:r>
-            <a:r>
-              <a:rPr lang="en-IN" dirty="0" smtClean="0"/>
-              <a:t>1060 nm wavelength is 1.7327813923080453 </a:t>
-            </a:r>
-            <a:endParaRPr lang="en-IN" dirty="0" smtClean="0"/>
+              <a:t>Refractive index of K-SFLD14 at 1060 nm wavelength is 1.7327813923080453 </a:t>
+            </a:r>
           </a:p>
           <a:p>
             <a:r>
@@ -5715,7 +5703,6 @@
               <a:rPr lang="en-IN" dirty="0" smtClean="0"/>
               <a:t> number :  26.48690066758293</a:t>
             </a:r>
-            <a:endParaRPr lang="en-IN" dirty="0" smtClean="0"/>
           </a:p>
           <a:p>
             <a:endParaRPr lang="en-IN" dirty="0"/>
@@ -6173,274 +6160,6 @@
             <p:ph type="title"/>
           </p:nvPr>
         </p:nvSpPr>
-        <p:spPr/>
-        <p:txBody>
-          <a:bodyPr/>
-          <a:lstStyle/>
-          <a:p>
-            <a:r>
-              <a:rPr lang="en-IN" dirty="0" smtClean="0"/>
-              <a:t>Application of data</a:t>
-            </a:r>
-            <a:endParaRPr lang="en-IN" dirty="0"/>
-          </a:p>
-        </p:txBody>
-      </p:sp>
-      <p:sp>
-        <p:nvSpPr>
-          <p:cNvPr id="3" name="Content Placeholder 2"/>
-          <p:cNvSpPr>
-            <a:spLocks noGrp="1"/>
-          </p:cNvSpPr>
-          <p:nvPr>
-            <p:ph idx="1"/>
-          </p:nvPr>
-        </p:nvSpPr>
-        <p:spPr/>
-        <p:txBody>
-          <a:bodyPr/>
-          <a:lstStyle/>
-          <a:p>
-            <a:r>
-              <a:rPr lang="en-IN" dirty="0" smtClean="0"/>
-              <a:t>Using this data we can get precise value of aberration which further uses in reducing the aberration.</a:t>
-            </a:r>
-          </a:p>
-          <a:p>
-            <a:r>
-              <a:rPr lang="en-IN" dirty="0" smtClean="0"/>
-              <a:t>Uses in filter by putting screen/image plane at specific distance which varies with wavelengths.</a:t>
-            </a:r>
-            <a:endParaRPr lang="en-IN" dirty="0"/>
-          </a:p>
-        </p:txBody>
-      </p:sp>
-    </p:spTree>
-  </p:cSld>
-  <p:clrMapOvr>
-    <a:masterClrMapping/>
-  </p:clrMapOvr>
-  <p:timing>
-    <p:tnLst>
-      <p:par>
-        <p:cTn id="1" dur="indefinite" restart="never" nodeType="tmRoot">
-          <p:childTnLst>
-            <p:seq concurrent="1" nextAc="seek">
-              <p:cTn id="2" dur="indefinite" nodeType="mainSeq">
-                <p:childTnLst>
-                  <p:par>
-                    <p:cTn id="3" fill="hold">
-                      <p:stCondLst>
-                        <p:cond delay="indefinite"/>
-                      </p:stCondLst>
-                      <p:childTnLst>
-                        <p:par>
-                          <p:cTn id="4" fill="hold">
-                            <p:stCondLst>
-                              <p:cond delay="0"/>
-                            </p:stCondLst>
-                            <p:childTnLst>
-                              <p:par>
-                                <p:cTn id="5" presetID="10" presetClass="entr" presetSubtype="0" fill="hold" grpId="0" nodeType="clickEffect">
-                                  <p:stCondLst>
-                                    <p:cond delay="0"/>
-                                  </p:stCondLst>
-                                  <p:childTnLst>
-                                    <p:set>
-                                      <p:cBhvr>
-                                        <p:cTn id="6" dur="1" fill="hold">
-                                          <p:stCondLst>
-                                            <p:cond delay="0"/>
-                                          </p:stCondLst>
-                                        </p:cTn>
-                                        <p:tgtEl>
-                                          <p:spTgt spid="2"/>
-                                        </p:tgtEl>
-                                        <p:attrNameLst>
-                                          <p:attrName>style.visibility</p:attrName>
-                                        </p:attrNameLst>
-                                      </p:cBhvr>
-                                      <p:to>
-                                        <p:strVal val="visible"/>
-                                      </p:to>
-                                    </p:set>
-                                    <p:animEffect transition="in" filter="fade">
-                                      <p:cBhvr>
-                                        <p:cTn id="7" dur="2000"/>
-                                        <p:tgtEl>
-                                          <p:spTgt spid="2"/>
-                                        </p:tgtEl>
-                                      </p:cBhvr>
-                                    </p:animEffect>
-                                  </p:childTnLst>
-                                </p:cTn>
-                              </p:par>
-                            </p:childTnLst>
-                          </p:cTn>
-                        </p:par>
-                      </p:childTnLst>
-                    </p:cTn>
-                  </p:par>
-                  <p:par>
-                    <p:cTn id="8" fill="hold">
-                      <p:stCondLst>
-                        <p:cond delay="indefinite"/>
-                      </p:stCondLst>
-                      <p:childTnLst>
-                        <p:par>
-                          <p:cTn id="9" fill="hold">
-                            <p:stCondLst>
-                              <p:cond delay="0"/>
-                            </p:stCondLst>
-                            <p:childTnLst>
-                              <p:par>
-                                <p:cTn id="10" presetID="10" presetClass="entr" presetSubtype="0" fill="hold" grpId="0" nodeType="clickEffect">
-                                  <p:stCondLst>
-                                    <p:cond delay="0"/>
-                                  </p:stCondLst>
-                                  <p:childTnLst>
-                                    <p:set>
-                                      <p:cBhvr>
-                                        <p:cTn id="11" dur="1" fill="hold">
-                                          <p:stCondLst>
-                                            <p:cond delay="0"/>
-                                          </p:stCondLst>
-                                        </p:cTn>
-                                        <p:tgtEl>
-                                          <p:spTgt spid="3">
-                                            <p:txEl>
-                                              <p:pRg st="0" end="0"/>
-                                            </p:txEl>
-                                          </p:spTgt>
-                                        </p:tgtEl>
-                                        <p:attrNameLst>
-                                          <p:attrName>style.visibility</p:attrName>
-                                        </p:attrNameLst>
-                                      </p:cBhvr>
-                                      <p:to>
-                                        <p:strVal val="visible"/>
-                                      </p:to>
-                                    </p:set>
-                                    <p:animEffect transition="in" filter="fade">
-                                      <p:cBhvr>
-                                        <p:cTn id="12" dur="2000"/>
-                                        <p:tgtEl>
-                                          <p:spTgt spid="3">
-                                            <p:txEl>
-                                              <p:pRg st="0" end="0"/>
-                                            </p:txEl>
-                                          </p:spTgt>
-                                        </p:tgtEl>
-                                      </p:cBhvr>
-                                    </p:animEffect>
-                                  </p:childTnLst>
-                                </p:cTn>
-                              </p:par>
-                              <p:par>
-                                <p:cTn id="13" presetID="10" presetClass="entr" presetSubtype="0" fill="hold" grpId="0" nodeType="withEffect">
-                                  <p:stCondLst>
-                                    <p:cond delay="0"/>
-                                  </p:stCondLst>
-                                  <p:childTnLst>
-                                    <p:set>
-                                      <p:cBhvr>
-                                        <p:cTn id="14" dur="1" fill="hold">
-                                          <p:stCondLst>
-                                            <p:cond delay="0"/>
-                                          </p:stCondLst>
-                                        </p:cTn>
-                                        <p:tgtEl>
-                                          <p:spTgt spid="3">
-                                            <p:txEl>
-                                              <p:pRg st="1" end="1"/>
-                                            </p:txEl>
-                                          </p:spTgt>
-                                        </p:tgtEl>
-                                        <p:attrNameLst>
-                                          <p:attrName>style.visibility</p:attrName>
-                                        </p:attrNameLst>
-                                      </p:cBhvr>
-                                      <p:to>
-                                        <p:strVal val="visible"/>
-                                      </p:to>
-                                    </p:set>
-                                    <p:animEffect transition="in" filter="fade">
-                                      <p:cBhvr>
-                                        <p:cTn id="15" dur="2000"/>
-                                        <p:tgtEl>
-                                          <p:spTgt spid="3">
-                                            <p:txEl>
-                                              <p:pRg st="1" end="1"/>
-                                            </p:txEl>
-                                          </p:spTgt>
-                                        </p:tgtEl>
-                                      </p:cBhvr>
-                                    </p:animEffect>
-                                  </p:childTnLst>
-                                </p:cTn>
-                              </p:par>
-                            </p:childTnLst>
-                          </p:cTn>
-                        </p:par>
-                      </p:childTnLst>
-                    </p:cTn>
-                  </p:par>
-                </p:childTnLst>
-              </p:cTn>
-              <p:prevCondLst>
-                <p:cond evt="onPrev" delay="0">
-                  <p:tgtEl>
-                    <p:sldTgt/>
-                  </p:tgtEl>
-                </p:cond>
-              </p:prevCondLst>
-              <p:nextCondLst>
-                <p:cond evt="onNext" delay="0">
-                  <p:tgtEl>
-                    <p:sldTgt/>
-                  </p:tgtEl>
-                </p:cond>
-              </p:nextCondLst>
-            </p:seq>
-          </p:childTnLst>
-        </p:cTn>
-      </p:par>
-    </p:tnLst>
-    <p:bldLst>
-      <p:bldP spid="2" grpId="0"/>
-      <p:bldP spid="3" grpId="0" build="allAtOnce"/>
-    </p:bldLst>
-  </p:timing>
-</p:sld>
-</file>
-
-<file path=ppt/slides/slide14.xml><?xml version="1.0" encoding="utf-8"?>
-<p:sld xmlns:a="http://schemas.openxmlformats.org/drawingml/2006/main" xmlns:r="http://schemas.openxmlformats.org/officeDocument/2006/relationships" xmlns:p="http://schemas.openxmlformats.org/presentationml/2006/main">
-  <p:cSld>
-    <p:spTree>
-      <p:nvGrpSpPr>
-        <p:cNvPr id="1" name=""/>
-        <p:cNvGrpSpPr/>
-        <p:nvPr/>
-      </p:nvGrpSpPr>
-      <p:grpSpPr>
-        <a:xfrm>
-          <a:off x="0" y="0"/>
-          <a:ext cx="0" cy="0"/>
-          <a:chOff x="0" y="0"/>
-          <a:chExt cx="0" cy="0"/>
-        </a:xfrm>
-      </p:grpSpPr>
-      <p:sp>
-        <p:nvSpPr>
-          <p:cNvPr id="2" name="Title 1"/>
-          <p:cNvSpPr>
-            <a:spLocks noGrp="1"/>
-          </p:cNvSpPr>
-          <p:nvPr>
-            <p:ph type="title"/>
-          </p:nvPr>
-        </p:nvSpPr>
         <p:spPr>
           <a:xfrm>
             <a:off x="1115616" y="0"/>
@@ -6489,49 +6208,13 @@
           <a:p>
             <a:r>
               <a:rPr lang="en-IN" dirty="0" smtClean="0"/>
-              <a:t>It also depends </a:t>
-            </a:r>
+              <a:t>It also depends on pressure of surroundings so that gives the two part of refractive index (1)Absolute refractive index and (2) Relative refractive index.</a:t>
+            </a:r>
+          </a:p>
+          <a:p>
             <a:r>
               <a:rPr lang="en-IN" dirty="0" smtClean="0"/>
-              <a:t>on pressure </a:t>
-            </a:r>
-            <a:r>
-              <a:rPr lang="en-IN" dirty="0" smtClean="0"/>
-              <a:t>of surroundings so that would give the two part of refractive </a:t>
-            </a:r>
-            <a:r>
-              <a:rPr lang="en-IN" dirty="0" smtClean="0"/>
-              <a:t>index (1)Absolute </a:t>
-            </a:r>
-            <a:r>
-              <a:rPr lang="en-IN" dirty="0" smtClean="0"/>
-              <a:t>refractive </a:t>
-            </a:r>
-            <a:r>
-              <a:rPr lang="en-IN" dirty="0" smtClean="0"/>
-              <a:t>index and (2</a:t>
-            </a:r>
-            <a:r>
-              <a:rPr lang="en-IN" dirty="0" smtClean="0"/>
-              <a:t>) Relative refractive </a:t>
-            </a:r>
-            <a:r>
-              <a:rPr lang="en-IN" dirty="0" smtClean="0"/>
-              <a:t>index.</a:t>
-            </a:r>
-          </a:p>
-          <a:p>
-            <a:r>
-              <a:rPr lang="en-IN" dirty="0" smtClean="0"/>
-              <a:t>For thermal analysis, the data is given in the </a:t>
-            </a:r>
-            <a:r>
-              <a:rPr lang="en-IN" dirty="0" err="1" smtClean="0"/>
-              <a:t>catalogs</a:t>
-            </a:r>
-            <a:r>
-              <a:rPr lang="en-IN" dirty="0" smtClean="0"/>
-              <a:t> for appropriate constants.  The rate of change of absolute refractive index is given by,</a:t>
+              <a:t>For thermal analysis, the data is given in the catalogues for appropriate constants.  The change of rate of absolute refractive index is given by,</a:t>
             </a:r>
           </a:p>
           <a:p>
@@ -6897,7 +6580,7 @@
 </p:sld>
 </file>
 
-<file path=ppt/slides/slide15.xml><?xml version="1.0" encoding="utf-8"?>
+<file path=ppt/slides/slide14.xml><?xml version="1.0" encoding="utf-8"?>
 <p:sld xmlns:a="http://schemas.openxmlformats.org/drawingml/2006/main" xmlns:r="http://schemas.openxmlformats.org/officeDocument/2006/relationships" xmlns:p="http://schemas.openxmlformats.org/presentationml/2006/main">
   <p:cSld>
     <p:spTree>
@@ -6926,7 +6609,7 @@
         </p:nvSpPr>
         <p:spPr>
           <a:xfrm>
-            <a:off x="755576" y="0"/>
+            <a:off x="683568" y="-315416"/>
             <a:ext cx="7962088" cy="1143000"/>
           </a:xfrm>
         </p:spPr>
@@ -6960,23 +6643,7 @@
           <a:p>
             <a:r>
               <a:rPr lang="en-IN" dirty="0" smtClean="0"/>
-              <a:t>T0 is reference temperature which is given in </a:t>
-            </a:r>
-            <a:r>
-              <a:rPr lang="en-IN" dirty="0" err="1" smtClean="0"/>
-              <a:t>catalogs</a:t>
-            </a:r>
-            <a:r>
-              <a:rPr lang="en-IN" dirty="0" smtClean="0"/>
-              <a:t>.  All the RI data from </a:t>
-            </a:r>
-            <a:r>
-              <a:rPr lang="en-IN" dirty="0" err="1" smtClean="0"/>
-              <a:t>catalogs</a:t>
-            </a:r>
-            <a:r>
-              <a:rPr lang="en-IN" dirty="0" smtClean="0"/>
-              <a:t> are with condition of pressure as 103250 Pa and reference temperature T0.</a:t>
+              <a:t>T0 is reference temperature which is given in catalogues.  All the RI data from catalogues are with condition of pressure as 103250 Pa and reference temperature T0.</a:t>
             </a:r>
           </a:p>
           <a:p>
@@ -7212,7 +6879,7 @@
 </p:sld>
 </file>
 
-<file path=ppt/slides/slide16.xml><?xml version="1.0" encoding="utf-8"?>
+<file path=ppt/slides/slide15.xml><?xml version="1.0" encoding="utf-8"?>
 <p:sld xmlns:a="http://schemas.openxmlformats.org/drawingml/2006/main" xmlns:r="http://schemas.openxmlformats.org/officeDocument/2006/relationships" xmlns:p="http://schemas.openxmlformats.org/presentationml/2006/main">
   <p:cSld>
     <p:spTree>
@@ -7380,10 +7047,317 @@
   <p:clrMapOvr>
     <a:masterClrMapping/>
   </p:clrMapOvr>
+  <p:timing>
+    <p:tnLst>
+      <p:par>
+        <p:cTn id="1" dur="indefinite" restart="never" nodeType="tmRoot">
+          <p:childTnLst>
+            <p:seq concurrent="1" nextAc="seek">
+              <p:cTn id="2" dur="indefinite" nodeType="mainSeq">
+                <p:childTnLst>
+                  <p:par>
+                    <p:cTn id="3" fill="hold">
+                      <p:stCondLst>
+                        <p:cond delay="indefinite"/>
+                      </p:stCondLst>
+                      <p:childTnLst>
+                        <p:par>
+                          <p:cTn id="4" fill="hold">
+                            <p:stCondLst>
+                              <p:cond delay="0"/>
+                            </p:stCondLst>
+                            <p:childTnLst>
+                              <p:par>
+                                <p:cTn id="5" presetID="10" presetClass="entr" presetSubtype="0" fill="hold" grpId="0" nodeType="clickEffect">
+                                  <p:stCondLst>
+                                    <p:cond delay="0"/>
+                                  </p:stCondLst>
+                                  <p:childTnLst>
+                                    <p:set>
+                                      <p:cBhvr>
+                                        <p:cTn id="6" dur="1" fill="hold">
+                                          <p:stCondLst>
+                                            <p:cond delay="0"/>
+                                          </p:stCondLst>
+                                        </p:cTn>
+                                        <p:tgtEl>
+                                          <p:spTgt spid="2"/>
+                                        </p:tgtEl>
+                                        <p:attrNameLst>
+                                          <p:attrName>style.visibility</p:attrName>
+                                        </p:attrNameLst>
+                                      </p:cBhvr>
+                                      <p:to>
+                                        <p:strVal val="visible"/>
+                                      </p:to>
+                                    </p:set>
+                                    <p:animEffect transition="in" filter="fade">
+                                      <p:cBhvr>
+                                        <p:cTn id="7" dur="2000"/>
+                                        <p:tgtEl>
+                                          <p:spTgt spid="2"/>
+                                        </p:tgtEl>
+                                      </p:cBhvr>
+                                    </p:animEffect>
+                                  </p:childTnLst>
+                                </p:cTn>
+                              </p:par>
+                            </p:childTnLst>
+                          </p:cTn>
+                        </p:par>
+                      </p:childTnLst>
+                    </p:cTn>
+                  </p:par>
+                  <p:par>
+                    <p:cTn id="8" fill="hold">
+                      <p:stCondLst>
+                        <p:cond delay="indefinite"/>
+                      </p:stCondLst>
+                      <p:childTnLst>
+                        <p:par>
+                          <p:cTn id="9" fill="hold">
+                            <p:stCondLst>
+                              <p:cond delay="0"/>
+                            </p:stCondLst>
+                            <p:childTnLst>
+                              <p:par>
+                                <p:cTn id="10" presetID="10" presetClass="entr" presetSubtype="0" fill="hold" nodeType="clickEffect">
+                                  <p:stCondLst>
+                                    <p:cond delay="0"/>
+                                  </p:stCondLst>
+                                  <p:childTnLst>
+                                    <p:set>
+                                      <p:cBhvr>
+                                        <p:cTn id="11" dur="1" fill="hold">
+                                          <p:stCondLst>
+                                            <p:cond delay="0"/>
+                                          </p:stCondLst>
+                                        </p:cTn>
+                                        <p:tgtEl>
+                                          <p:spTgt spid="2050"/>
+                                        </p:tgtEl>
+                                        <p:attrNameLst>
+                                          <p:attrName>style.visibility</p:attrName>
+                                        </p:attrNameLst>
+                                      </p:cBhvr>
+                                      <p:to>
+                                        <p:strVal val="visible"/>
+                                      </p:to>
+                                    </p:set>
+                                    <p:animEffect transition="in" filter="fade">
+                                      <p:cBhvr>
+                                        <p:cTn id="12" dur="2000"/>
+                                        <p:tgtEl>
+                                          <p:spTgt spid="2050"/>
+                                        </p:tgtEl>
+                                      </p:cBhvr>
+                                    </p:animEffect>
+                                  </p:childTnLst>
+                                </p:cTn>
+                              </p:par>
+                            </p:childTnLst>
+                          </p:cTn>
+                        </p:par>
+                      </p:childTnLst>
+                    </p:cTn>
+                  </p:par>
+                  <p:par>
+                    <p:cTn id="13" fill="hold">
+                      <p:stCondLst>
+                        <p:cond delay="indefinite"/>
+                      </p:stCondLst>
+                      <p:childTnLst>
+                        <p:par>
+                          <p:cTn id="14" fill="hold">
+                            <p:stCondLst>
+                              <p:cond delay="0"/>
+                            </p:stCondLst>
+                            <p:childTnLst>
+                              <p:par>
+                                <p:cTn id="15" presetID="10" presetClass="entr" presetSubtype="0" fill="hold" nodeType="clickEffect">
+                                  <p:stCondLst>
+                                    <p:cond delay="0"/>
+                                  </p:stCondLst>
+                                  <p:childTnLst>
+                                    <p:set>
+                                      <p:cBhvr>
+                                        <p:cTn id="16" dur="1" fill="hold">
+                                          <p:stCondLst>
+                                            <p:cond delay="0"/>
+                                          </p:stCondLst>
+                                        </p:cTn>
+                                        <p:tgtEl>
+                                          <p:spTgt spid="7"/>
+                                        </p:tgtEl>
+                                        <p:attrNameLst>
+                                          <p:attrName>style.visibility</p:attrName>
+                                        </p:attrNameLst>
+                                      </p:cBhvr>
+                                      <p:to>
+                                        <p:strVal val="visible"/>
+                                      </p:to>
+                                    </p:set>
+                                    <p:animEffect transition="in" filter="fade">
+                                      <p:cBhvr>
+                                        <p:cTn id="17" dur="2000"/>
+                                        <p:tgtEl>
+                                          <p:spTgt spid="7"/>
+                                        </p:tgtEl>
+                                      </p:cBhvr>
+                                    </p:animEffect>
+                                  </p:childTnLst>
+                                </p:cTn>
+                              </p:par>
+                            </p:childTnLst>
+                          </p:cTn>
+                        </p:par>
+                      </p:childTnLst>
+                    </p:cTn>
+                  </p:par>
+                  <p:par>
+                    <p:cTn id="18" fill="hold">
+                      <p:stCondLst>
+                        <p:cond delay="indefinite"/>
+                      </p:stCondLst>
+                      <p:childTnLst>
+                        <p:par>
+                          <p:cTn id="19" fill="hold">
+                            <p:stCondLst>
+                              <p:cond delay="0"/>
+                            </p:stCondLst>
+                            <p:childTnLst>
+                              <p:par>
+                                <p:cTn id="20" presetID="10" presetClass="entr" presetSubtype="0" fill="hold" nodeType="clickEffect">
+                                  <p:stCondLst>
+                                    <p:cond delay="0"/>
+                                  </p:stCondLst>
+                                  <p:childTnLst>
+                                    <p:set>
+                                      <p:cBhvr>
+                                        <p:cTn id="21" dur="1" fill="hold">
+                                          <p:stCondLst>
+                                            <p:cond delay="0"/>
+                                          </p:stCondLst>
+                                        </p:cTn>
+                                        <p:tgtEl>
+                                          <p:spTgt spid="8"/>
+                                        </p:tgtEl>
+                                        <p:attrNameLst>
+                                          <p:attrName>style.visibility</p:attrName>
+                                        </p:attrNameLst>
+                                      </p:cBhvr>
+                                      <p:to>
+                                        <p:strVal val="visible"/>
+                                      </p:to>
+                                    </p:set>
+                                    <p:animEffect transition="in" filter="fade">
+                                      <p:cBhvr>
+                                        <p:cTn id="22" dur="2000"/>
+                                        <p:tgtEl>
+                                          <p:spTgt spid="8"/>
+                                        </p:tgtEl>
+                                      </p:cBhvr>
+                                    </p:animEffect>
+                                  </p:childTnLst>
+                                </p:cTn>
+                              </p:par>
+                            </p:childTnLst>
+                          </p:cTn>
+                        </p:par>
+                      </p:childTnLst>
+                    </p:cTn>
+                  </p:par>
+                  <p:par>
+                    <p:cTn id="23" fill="hold">
+                      <p:stCondLst>
+                        <p:cond delay="indefinite"/>
+                      </p:stCondLst>
+                      <p:childTnLst>
+                        <p:par>
+                          <p:cTn id="24" fill="hold">
+                            <p:stCondLst>
+                              <p:cond delay="0"/>
+                            </p:stCondLst>
+                            <p:childTnLst>
+                              <p:par>
+                                <p:cTn id="25" presetID="10" presetClass="entr" presetSubtype="0" fill="hold" grpId="0" nodeType="clickEffect">
+                                  <p:stCondLst>
+                                    <p:cond delay="0"/>
+                                  </p:stCondLst>
+                                  <p:childTnLst>
+                                    <p:set>
+                                      <p:cBhvr>
+                                        <p:cTn id="26" dur="1" fill="hold">
+                                          <p:stCondLst>
+                                            <p:cond delay="0"/>
+                                          </p:stCondLst>
+                                        </p:cTn>
+                                        <p:tgtEl>
+                                          <p:spTgt spid="9">
+                                            <p:txEl>
+                                              <p:pRg st="0" end="0"/>
+                                            </p:txEl>
+                                          </p:spTgt>
+                                        </p:tgtEl>
+                                        <p:attrNameLst>
+                                          <p:attrName>style.visibility</p:attrName>
+                                        </p:attrNameLst>
+                                      </p:cBhvr>
+                                      <p:to>
+                                        <p:strVal val="visible"/>
+                                      </p:to>
+                                    </p:set>
+                                    <p:animEffect transition="in" filter="fade">
+                                      <p:cBhvr>
+                                        <p:cTn id="27" dur="2000"/>
+                                        <p:tgtEl>
+                                          <p:spTgt spid="9">
+                                            <p:txEl>
+                                              <p:pRg st="0" end="0"/>
+                                            </p:txEl>
+                                          </p:spTgt>
+                                        </p:tgtEl>
+                                      </p:cBhvr>
+                                    </p:animEffect>
+                                  </p:childTnLst>
+                                </p:cTn>
+                              </p:par>
+                            </p:childTnLst>
+                          </p:cTn>
+                        </p:par>
+                      </p:childTnLst>
+                    </p:cTn>
+                  </p:par>
+                </p:childTnLst>
+              </p:cTn>
+              <p:prevCondLst>
+                <p:cond evt="onPrev" delay="0">
+                  <p:tgtEl>
+                    <p:sldTgt/>
+                  </p:tgtEl>
+                </p:cond>
+              </p:prevCondLst>
+              <p:nextCondLst>
+                <p:cond evt="onNext" delay="0">
+                  <p:tgtEl>
+                    <p:sldTgt/>
+                  </p:tgtEl>
+                </p:cond>
+              </p:nextCondLst>
+            </p:seq>
+          </p:childTnLst>
+        </p:cTn>
+      </p:par>
+    </p:tnLst>
+    <p:bldLst>
+      <p:bldP spid="2" grpId="0"/>
+      <p:bldP spid="9" grpId="0" build="allAtOnce"/>
+    </p:bldLst>
+  </p:timing>
 </p:sld>
 </file>
 
-<file path=ppt/slides/slide17.xml><?xml version="1.0" encoding="utf-8"?>
+<file path=ppt/slides/slide16.xml><?xml version="1.0" encoding="utf-8"?>
 <p:sld xmlns:a="http://schemas.openxmlformats.org/drawingml/2006/main" xmlns:r="http://schemas.openxmlformats.org/officeDocument/2006/relationships" xmlns:p="http://schemas.openxmlformats.org/presentationml/2006/main">
   <p:cSld>
     <p:spTree>
@@ -7568,6 +7542,866 @@
   <p:clrMapOvr>
     <a:masterClrMapping/>
   </p:clrMapOvr>
+  <p:timing>
+    <p:tnLst>
+      <p:par>
+        <p:cTn id="1" dur="indefinite" restart="never" nodeType="tmRoot">
+          <p:childTnLst>
+            <p:seq concurrent="1" nextAc="seek">
+              <p:cTn id="2" dur="indefinite" nodeType="mainSeq">
+                <p:childTnLst>
+                  <p:par>
+                    <p:cTn id="3" fill="hold">
+                      <p:stCondLst>
+                        <p:cond delay="indefinite"/>
+                      </p:stCondLst>
+                      <p:childTnLst>
+                        <p:par>
+                          <p:cTn id="4" fill="hold">
+                            <p:stCondLst>
+                              <p:cond delay="0"/>
+                            </p:stCondLst>
+                            <p:childTnLst>
+                              <p:par>
+                                <p:cTn id="5" presetID="10" presetClass="entr" presetSubtype="0" fill="hold" nodeType="clickEffect">
+                                  <p:stCondLst>
+                                    <p:cond delay="0"/>
+                                  </p:stCondLst>
+                                  <p:childTnLst>
+                                    <p:set>
+                                      <p:cBhvr>
+                                        <p:cTn id="6" dur="1" fill="hold">
+                                          <p:stCondLst>
+                                            <p:cond delay="0"/>
+                                          </p:stCondLst>
+                                        </p:cTn>
+                                        <p:tgtEl>
+                                          <p:spTgt spid="3074"/>
+                                        </p:tgtEl>
+                                        <p:attrNameLst>
+                                          <p:attrName>style.visibility</p:attrName>
+                                        </p:attrNameLst>
+                                      </p:cBhvr>
+                                      <p:to>
+                                        <p:strVal val="visible"/>
+                                      </p:to>
+                                    </p:set>
+                                    <p:animEffect transition="in" filter="fade">
+                                      <p:cBhvr>
+                                        <p:cTn id="7" dur="2000"/>
+                                        <p:tgtEl>
+                                          <p:spTgt spid="3074"/>
+                                        </p:tgtEl>
+                                      </p:cBhvr>
+                                    </p:animEffect>
+                                  </p:childTnLst>
+                                </p:cTn>
+                              </p:par>
+                            </p:childTnLst>
+                          </p:cTn>
+                        </p:par>
+                      </p:childTnLst>
+                    </p:cTn>
+                  </p:par>
+                  <p:par>
+                    <p:cTn id="8" fill="hold">
+                      <p:stCondLst>
+                        <p:cond delay="indefinite"/>
+                      </p:stCondLst>
+                      <p:childTnLst>
+                        <p:par>
+                          <p:cTn id="9" fill="hold">
+                            <p:stCondLst>
+                              <p:cond delay="0"/>
+                            </p:stCondLst>
+                            <p:childTnLst>
+                              <p:par>
+                                <p:cTn id="10" presetID="10" presetClass="entr" presetSubtype="0" fill="hold" grpId="0" nodeType="clickEffect">
+                                  <p:stCondLst>
+                                    <p:cond delay="0"/>
+                                  </p:stCondLst>
+                                  <p:childTnLst>
+                                    <p:set>
+                                      <p:cBhvr>
+                                        <p:cTn id="11" dur="1" fill="hold">
+                                          <p:stCondLst>
+                                            <p:cond delay="0"/>
+                                          </p:stCondLst>
+                                        </p:cTn>
+                                        <p:tgtEl>
+                                          <p:spTgt spid="6">
+                                            <p:txEl>
+                                              <p:pRg st="0" end="0"/>
+                                            </p:txEl>
+                                          </p:spTgt>
+                                        </p:tgtEl>
+                                        <p:attrNameLst>
+                                          <p:attrName>style.visibility</p:attrName>
+                                        </p:attrNameLst>
+                                      </p:cBhvr>
+                                      <p:to>
+                                        <p:strVal val="visible"/>
+                                      </p:to>
+                                    </p:set>
+                                    <p:animEffect transition="in" filter="fade">
+                                      <p:cBhvr>
+                                        <p:cTn id="12" dur="2000"/>
+                                        <p:tgtEl>
+                                          <p:spTgt spid="6">
+                                            <p:txEl>
+                                              <p:pRg st="0" end="0"/>
+                                            </p:txEl>
+                                          </p:spTgt>
+                                        </p:tgtEl>
+                                      </p:cBhvr>
+                                    </p:animEffect>
+                                  </p:childTnLst>
+                                </p:cTn>
+                              </p:par>
+                              <p:par>
+                                <p:cTn id="13" presetID="10" presetClass="entr" presetSubtype="0" fill="hold" grpId="0" nodeType="withEffect">
+                                  <p:stCondLst>
+                                    <p:cond delay="0"/>
+                                  </p:stCondLst>
+                                  <p:childTnLst>
+                                    <p:set>
+                                      <p:cBhvr>
+                                        <p:cTn id="14" dur="1" fill="hold">
+                                          <p:stCondLst>
+                                            <p:cond delay="0"/>
+                                          </p:stCondLst>
+                                        </p:cTn>
+                                        <p:tgtEl>
+                                          <p:spTgt spid="6">
+                                            <p:txEl>
+                                              <p:pRg st="1" end="1"/>
+                                            </p:txEl>
+                                          </p:spTgt>
+                                        </p:tgtEl>
+                                        <p:attrNameLst>
+                                          <p:attrName>style.visibility</p:attrName>
+                                        </p:attrNameLst>
+                                      </p:cBhvr>
+                                      <p:to>
+                                        <p:strVal val="visible"/>
+                                      </p:to>
+                                    </p:set>
+                                    <p:animEffect transition="in" filter="fade">
+                                      <p:cBhvr>
+                                        <p:cTn id="15" dur="2000"/>
+                                        <p:tgtEl>
+                                          <p:spTgt spid="6">
+                                            <p:txEl>
+                                              <p:pRg st="1" end="1"/>
+                                            </p:txEl>
+                                          </p:spTgt>
+                                        </p:tgtEl>
+                                      </p:cBhvr>
+                                    </p:animEffect>
+                                  </p:childTnLst>
+                                </p:cTn>
+                              </p:par>
+                            </p:childTnLst>
+                          </p:cTn>
+                        </p:par>
+                      </p:childTnLst>
+                    </p:cTn>
+                  </p:par>
+                  <p:par>
+                    <p:cTn id="16" fill="hold">
+                      <p:stCondLst>
+                        <p:cond delay="indefinite"/>
+                      </p:stCondLst>
+                      <p:childTnLst>
+                        <p:par>
+                          <p:cTn id="17" fill="hold">
+                            <p:stCondLst>
+                              <p:cond delay="0"/>
+                            </p:stCondLst>
+                            <p:childTnLst>
+                              <p:par>
+                                <p:cTn id="18" presetID="10" presetClass="entr" presetSubtype="0" fill="hold" nodeType="clickEffect">
+                                  <p:stCondLst>
+                                    <p:cond delay="0"/>
+                                  </p:stCondLst>
+                                  <p:childTnLst>
+                                    <p:set>
+                                      <p:cBhvr>
+                                        <p:cTn id="19" dur="1" fill="hold">
+                                          <p:stCondLst>
+                                            <p:cond delay="0"/>
+                                          </p:stCondLst>
+                                        </p:cTn>
+                                        <p:tgtEl>
+                                          <p:spTgt spid="7"/>
+                                        </p:tgtEl>
+                                        <p:attrNameLst>
+                                          <p:attrName>style.visibility</p:attrName>
+                                        </p:attrNameLst>
+                                      </p:cBhvr>
+                                      <p:to>
+                                        <p:strVal val="visible"/>
+                                      </p:to>
+                                    </p:set>
+                                    <p:animEffect transition="in" filter="fade">
+                                      <p:cBhvr>
+                                        <p:cTn id="20" dur="2000"/>
+                                        <p:tgtEl>
+                                          <p:spTgt spid="7"/>
+                                        </p:tgtEl>
+                                      </p:cBhvr>
+                                    </p:animEffect>
+                                  </p:childTnLst>
+                                </p:cTn>
+                              </p:par>
+                            </p:childTnLst>
+                          </p:cTn>
+                        </p:par>
+                      </p:childTnLst>
+                    </p:cTn>
+                  </p:par>
+                  <p:par>
+                    <p:cTn id="21" fill="hold">
+                      <p:stCondLst>
+                        <p:cond delay="indefinite"/>
+                      </p:stCondLst>
+                      <p:childTnLst>
+                        <p:par>
+                          <p:cTn id="22" fill="hold">
+                            <p:stCondLst>
+                              <p:cond delay="0"/>
+                            </p:stCondLst>
+                            <p:childTnLst>
+                              <p:par>
+                                <p:cTn id="23" presetID="10" presetClass="entr" presetSubtype="0" fill="hold" grpId="0" nodeType="clickEffect">
+                                  <p:stCondLst>
+                                    <p:cond delay="0"/>
+                                  </p:stCondLst>
+                                  <p:childTnLst>
+                                    <p:set>
+                                      <p:cBhvr>
+                                        <p:cTn id="24" dur="1" fill="hold">
+                                          <p:stCondLst>
+                                            <p:cond delay="0"/>
+                                          </p:stCondLst>
+                                        </p:cTn>
+                                        <p:tgtEl>
+                                          <p:spTgt spid="8">
+                                            <p:txEl>
+                                              <p:pRg st="0" end="0"/>
+                                            </p:txEl>
+                                          </p:spTgt>
+                                        </p:tgtEl>
+                                        <p:attrNameLst>
+                                          <p:attrName>style.visibility</p:attrName>
+                                        </p:attrNameLst>
+                                      </p:cBhvr>
+                                      <p:to>
+                                        <p:strVal val="visible"/>
+                                      </p:to>
+                                    </p:set>
+                                    <p:animEffect transition="in" filter="fade">
+                                      <p:cBhvr>
+                                        <p:cTn id="25" dur="2000"/>
+                                        <p:tgtEl>
+                                          <p:spTgt spid="8">
+                                            <p:txEl>
+                                              <p:pRg st="0" end="0"/>
+                                            </p:txEl>
+                                          </p:spTgt>
+                                        </p:tgtEl>
+                                      </p:cBhvr>
+                                    </p:animEffect>
+                                  </p:childTnLst>
+                                </p:cTn>
+                              </p:par>
+                            </p:childTnLst>
+                          </p:cTn>
+                        </p:par>
+                      </p:childTnLst>
+                    </p:cTn>
+                  </p:par>
+                </p:childTnLst>
+              </p:cTn>
+              <p:prevCondLst>
+                <p:cond evt="onPrev" delay="0">
+                  <p:tgtEl>
+                    <p:sldTgt/>
+                  </p:tgtEl>
+                </p:cond>
+              </p:prevCondLst>
+              <p:nextCondLst>
+                <p:cond evt="onNext" delay="0">
+                  <p:tgtEl>
+                    <p:sldTgt/>
+                  </p:tgtEl>
+                </p:cond>
+              </p:nextCondLst>
+            </p:seq>
+          </p:childTnLst>
+        </p:cTn>
+      </p:par>
+    </p:tnLst>
+    <p:bldLst>
+      <p:bldP spid="6" grpId="0" build="allAtOnce"/>
+      <p:bldP spid="8" grpId="0" build="allAtOnce"/>
+    </p:bldLst>
+  </p:timing>
+</p:sld>
+</file>
+
+<file path=ppt/slides/slide17.xml><?xml version="1.0" encoding="utf-8"?>
+<p:sld xmlns:a="http://schemas.openxmlformats.org/drawingml/2006/main" xmlns:r="http://schemas.openxmlformats.org/officeDocument/2006/relationships" xmlns:p="http://schemas.openxmlformats.org/presentationml/2006/main">
+  <p:cSld>
+    <p:spTree>
+      <p:nvGrpSpPr>
+        <p:cNvPr id="1" name=""/>
+        <p:cNvGrpSpPr/>
+        <p:nvPr/>
+      </p:nvGrpSpPr>
+      <p:grpSpPr>
+        <a:xfrm>
+          <a:off x="0" y="0"/>
+          <a:ext cx="0" cy="0"/>
+          <a:chOff x="0" y="0"/>
+          <a:chExt cx="0" cy="0"/>
+        </a:xfrm>
+      </p:grpSpPr>
+      <p:sp>
+        <p:nvSpPr>
+          <p:cNvPr id="2" name="Title 1"/>
+          <p:cNvSpPr>
+            <a:spLocks noGrp="1"/>
+          </p:cNvSpPr>
+          <p:nvPr>
+            <p:ph type="title"/>
+          </p:nvPr>
+        </p:nvSpPr>
+        <p:spPr>
+          <a:xfrm>
+            <a:off x="179512" y="0"/>
+            <a:ext cx="7498080" cy="1143000"/>
+          </a:xfrm>
+        </p:spPr>
+        <p:txBody>
+          <a:bodyPr/>
+          <a:lstStyle/>
+          <a:p>
+            <a:r>
+              <a:rPr lang="en-IN" dirty="0" smtClean="0"/>
+              <a:t>Thermal analysis of N-BK7</a:t>
+            </a:r>
+            <a:endParaRPr lang="en-IN" dirty="0"/>
+          </a:p>
+        </p:txBody>
+      </p:sp>
+      <p:pic>
+        <p:nvPicPr>
+          <p:cNvPr id="4" name="Content Placeholder 3" descr="n_abs_derivative_vs_temperatureN-BK7_2.png"/>
+          <p:cNvPicPr>
+            <a:picLocks noGrp="1" noChangeAspect="1"/>
+          </p:cNvPicPr>
+          <p:nvPr>
+            <p:ph idx="1"/>
+          </p:nvPr>
+        </p:nvPicPr>
+        <p:blipFill>
+          <a:blip r:embed="rId2" cstate="print"/>
+          <a:stretch>
+            <a:fillRect/>
+          </a:stretch>
+        </p:blipFill>
+        <p:spPr>
+          <a:xfrm>
+            <a:off x="0" y="1268760"/>
+            <a:ext cx="4499992" cy="3024336"/>
+          </a:xfrm>
+        </p:spPr>
+      </p:pic>
+      <p:pic>
+        <p:nvPicPr>
+          <p:cNvPr id="5" name="Picture 4" descr="n_rel_derivative_vs_temperatureN-BK7_2.png"/>
+          <p:cNvPicPr>
+            <a:picLocks noChangeAspect="1"/>
+          </p:cNvPicPr>
+          <p:nvPr/>
+        </p:nvPicPr>
+        <p:blipFill>
+          <a:blip r:embed="rId3" cstate="print"/>
+          <a:stretch>
+            <a:fillRect/>
+          </a:stretch>
+        </p:blipFill>
+        <p:spPr>
+          <a:xfrm>
+            <a:off x="4355976" y="1268760"/>
+            <a:ext cx="4464496" cy="2909337"/>
+          </a:xfrm>
+          <a:prstGeom prst="rect">
+            <a:avLst/>
+          </a:prstGeom>
+        </p:spPr>
+      </p:pic>
+      <p:sp>
+        <p:nvSpPr>
+          <p:cNvPr id="7" name="TextBox 6"/>
+          <p:cNvSpPr txBox="1"/>
+          <p:nvPr/>
+        </p:nvSpPr>
+        <p:spPr>
+          <a:xfrm>
+            <a:off x="0" y="4293096"/>
+            <a:ext cx="9144000" cy="3108543"/>
+          </a:xfrm>
+          <a:prstGeom prst="rect">
+            <a:avLst/>
+          </a:prstGeom>
+          <a:noFill/>
+        </p:spPr>
+        <p:txBody>
+          <a:bodyPr wrap="square" rtlCol="0">
+            <a:spAutoFit/>
+          </a:bodyPr>
+          <a:lstStyle/>
+          <a:p>
+            <a:pPr>
+              <a:buFont typeface="Arial" pitchFamily="34" charset="0"/>
+              <a:buChar char="•"/>
+            </a:pPr>
+            <a:r>
+              <a:rPr lang="en-IN" sz="2800" dirty="0" smtClean="0"/>
+              <a:t>The rate for 560 nm is greater than 1060 nm wavelength. Here the temperature range is -100 to 140 </a:t>
+            </a:r>
+            <a:r>
+              <a:rPr lang="en-IN" sz="2800" dirty="0" err="1" smtClean="0"/>
+              <a:t>celsius</a:t>
+            </a:r>
+            <a:r>
+              <a:rPr lang="en-IN" sz="2800" dirty="0" smtClean="0"/>
+              <a:t> in the first figure.</a:t>
+            </a:r>
+          </a:p>
+          <a:p>
+            <a:pPr>
+              <a:buFont typeface="Arial" pitchFamily="34" charset="0"/>
+              <a:buChar char="•"/>
+            </a:pPr>
+            <a:r>
+              <a:rPr lang="en-IN" sz="2800" dirty="0" smtClean="0"/>
+              <a:t>The rate is decreasing till 0 </a:t>
+            </a:r>
+            <a:r>
+              <a:rPr lang="en-IN" sz="2800" dirty="0" err="1" smtClean="0"/>
+              <a:t>celsius</a:t>
+            </a:r>
+            <a:r>
+              <a:rPr lang="en-IN" sz="2800" dirty="0" smtClean="0"/>
+              <a:t> and increasing</a:t>
+            </a:r>
+          </a:p>
+          <a:p>
+            <a:r>
+              <a:rPr lang="en-IN" sz="2800" dirty="0" smtClean="0"/>
+              <a:t>after that in the second figure.  (Pressure = 10320 Pa)</a:t>
+            </a:r>
+          </a:p>
+          <a:p>
+            <a:pPr>
+              <a:buFont typeface="Arial" pitchFamily="34" charset="0"/>
+              <a:buChar char="•"/>
+            </a:pPr>
+            <a:endParaRPr lang="en-IN" sz="2800" dirty="0" smtClean="0"/>
+          </a:p>
+          <a:p>
+            <a:pPr>
+              <a:buFont typeface="Arial" pitchFamily="34" charset="0"/>
+              <a:buChar char="•"/>
+            </a:pPr>
+            <a:endParaRPr lang="en-IN" sz="2800" dirty="0"/>
+          </a:p>
+        </p:txBody>
+      </p:sp>
+    </p:spTree>
+  </p:cSld>
+  <p:clrMapOvr>
+    <a:masterClrMapping/>
+  </p:clrMapOvr>
+  <p:timing>
+    <p:tnLst>
+      <p:par>
+        <p:cTn id="1" dur="indefinite" restart="never" nodeType="tmRoot">
+          <p:childTnLst>
+            <p:seq concurrent="1" nextAc="seek">
+              <p:cTn id="2" dur="indefinite" nodeType="mainSeq">
+                <p:childTnLst>
+                  <p:par>
+                    <p:cTn id="3" fill="hold">
+                      <p:stCondLst>
+                        <p:cond delay="indefinite"/>
+                      </p:stCondLst>
+                      <p:childTnLst>
+                        <p:par>
+                          <p:cTn id="4" fill="hold">
+                            <p:stCondLst>
+                              <p:cond delay="0"/>
+                            </p:stCondLst>
+                            <p:childTnLst>
+                              <p:par>
+                                <p:cTn id="5" presetID="10" presetClass="entr" presetSubtype="0" fill="hold" grpId="0" nodeType="clickEffect">
+                                  <p:stCondLst>
+                                    <p:cond delay="0"/>
+                                  </p:stCondLst>
+                                  <p:childTnLst>
+                                    <p:set>
+                                      <p:cBhvr>
+                                        <p:cTn id="6" dur="1" fill="hold">
+                                          <p:stCondLst>
+                                            <p:cond delay="0"/>
+                                          </p:stCondLst>
+                                        </p:cTn>
+                                        <p:tgtEl>
+                                          <p:spTgt spid="2"/>
+                                        </p:tgtEl>
+                                        <p:attrNameLst>
+                                          <p:attrName>style.visibility</p:attrName>
+                                        </p:attrNameLst>
+                                      </p:cBhvr>
+                                      <p:to>
+                                        <p:strVal val="visible"/>
+                                      </p:to>
+                                    </p:set>
+                                    <p:animEffect transition="in" filter="fade">
+                                      <p:cBhvr>
+                                        <p:cTn id="7" dur="2000"/>
+                                        <p:tgtEl>
+                                          <p:spTgt spid="2"/>
+                                        </p:tgtEl>
+                                      </p:cBhvr>
+                                    </p:animEffect>
+                                  </p:childTnLst>
+                                </p:cTn>
+                              </p:par>
+                            </p:childTnLst>
+                          </p:cTn>
+                        </p:par>
+                      </p:childTnLst>
+                    </p:cTn>
+                  </p:par>
+                  <p:par>
+                    <p:cTn id="8" fill="hold">
+                      <p:stCondLst>
+                        <p:cond delay="indefinite"/>
+                      </p:stCondLst>
+                      <p:childTnLst>
+                        <p:par>
+                          <p:cTn id="9" fill="hold">
+                            <p:stCondLst>
+                              <p:cond delay="0"/>
+                            </p:stCondLst>
+                            <p:childTnLst>
+                              <p:par>
+                                <p:cTn id="10" presetID="10" presetClass="entr" presetSubtype="0" fill="hold" nodeType="clickEffect">
+                                  <p:stCondLst>
+                                    <p:cond delay="0"/>
+                                  </p:stCondLst>
+                                  <p:childTnLst>
+                                    <p:set>
+                                      <p:cBhvr>
+                                        <p:cTn id="11" dur="1" fill="hold">
+                                          <p:stCondLst>
+                                            <p:cond delay="0"/>
+                                          </p:stCondLst>
+                                        </p:cTn>
+                                        <p:tgtEl>
+                                          <p:spTgt spid="4"/>
+                                        </p:tgtEl>
+                                        <p:attrNameLst>
+                                          <p:attrName>style.visibility</p:attrName>
+                                        </p:attrNameLst>
+                                      </p:cBhvr>
+                                      <p:to>
+                                        <p:strVal val="visible"/>
+                                      </p:to>
+                                    </p:set>
+                                    <p:animEffect transition="in" filter="fade">
+                                      <p:cBhvr>
+                                        <p:cTn id="12" dur="2000"/>
+                                        <p:tgtEl>
+                                          <p:spTgt spid="4"/>
+                                        </p:tgtEl>
+                                      </p:cBhvr>
+                                    </p:animEffect>
+                                  </p:childTnLst>
+                                </p:cTn>
+                              </p:par>
+                            </p:childTnLst>
+                          </p:cTn>
+                        </p:par>
+                      </p:childTnLst>
+                    </p:cTn>
+                  </p:par>
+                  <p:par>
+                    <p:cTn id="13" fill="hold">
+                      <p:stCondLst>
+                        <p:cond delay="indefinite"/>
+                      </p:stCondLst>
+                      <p:childTnLst>
+                        <p:par>
+                          <p:cTn id="14" fill="hold">
+                            <p:stCondLst>
+                              <p:cond delay="0"/>
+                            </p:stCondLst>
+                            <p:childTnLst>
+                              <p:par>
+                                <p:cTn id="15" presetID="10" presetClass="entr" presetSubtype="0" fill="hold" nodeType="clickEffect">
+                                  <p:stCondLst>
+                                    <p:cond delay="0"/>
+                                  </p:stCondLst>
+                                  <p:childTnLst>
+                                    <p:set>
+                                      <p:cBhvr>
+                                        <p:cTn id="16" dur="1" fill="hold">
+                                          <p:stCondLst>
+                                            <p:cond delay="0"/>
+                                          </p:stCondLst>
+                                        </p:cTn>
+                                        <p:tgtEl>
+                                          <p:spTgt spid="5"/>
+                                        </p:tgtEl>
+                                        <p:attrNameLst>
+                                          <p:attrName>style.visibility</p:attrName>
+                                        </p:attrNameLst>
+                                      </p:cBhvr>
+                                      <p:to>
+                                        <p:strVal val="visible"/>
+                                      </p:to>
+                                    </p:set>
+                                    <p:animEffect transition="in" filter="fade">
+                                      <p:cBhvr>
+                                        <p:cTn id="17" dur="2000"/>
+                                        <p:tgtEl>
+                                          <p:spTgt spid="5"/>
+                                        </p:tgtEl>
+                                      </p:cBhvr>
+                                    </p:animEffect>
+                                  </p:childTnLst>
+                                </p:cTn>
+                              </p:par>
+                            </p:childTnLst>
+                          </p:cTn>
+                        </p:par>
+                      </p:childTnLst>
+                    </p:cTn>
+                  </p:par>
+                  <p:par>
+                    <p:cTn id="18" fill="hold">
+                      <p:stCondLst>
+                        <p:cond delay="indefinite"/>
+                      </p:stCondLst>
+                      <p:childTnLst>
+                        <p:par>
+                          <p:cTn id="19" fill="hold">
+                            <p:stCondLst>
+                              <p:cond delay="0"/>
+                            </p:stCondLst>
+                            <p:childTnLst>
+                              <p:par>
+                                <p:cTn id="20" presetID="10" presetClass="entr" presetSubtype="0" fill="hold" grpId="0" nodeType="clickEffect">
+                                  <p:stCondLst>
+                                    <p:cond delay="0"/>
+                                  </p:stCondLst>
+                                  <p:childTnLst>
+                                    <p:set>
+                                      <p:cBhvr>
+                                        <p:cTn id="21" dur="1" fill="hold">
+                                          <p:stCondLst>
+                                            <p:cond delay="0"/>
+                                          </p:stCondLst>
+                                        </p:cTn>
+                                        <p:tgtEl>
+                                          <p:spTgt spid="7">
+                                            <p:txEl>
+                                              <p:pRg st="0" end="0"/>
+                                            </p:txEl>
+                                          </p:spTgt>
+                                        </p:tgtEl>
+                                        <p:attrNameLst>
+                                          <p:attrName>style.visibility</p:attrName>
+                                        </p:attrNameLst>
+                                      </p:cBhvr>
+                                      <p:to>
+                                        <p:strVal val="visible"/>
+                                      </p:to>
+                                    </p:set>
+                                    <p:animEffect transition="in" filter="fade">
+                                      <p:cBhvr>
+                                        <p:cTn id="22" dur="2000"/>
+                                        <p:tgtEl>
+                                          <p:spTgt spid="7">
+                                            <p:txEl>
+                                              <p:pRg st="0" end="0"/>
+                                            </p:txEl>
+                                          </p:spTgt>
+                                        </p:tgtEl>
+                                      </p:cBhvr>
+                                    </p:animEffect>
+                                  </p:childTnLst>
+                                </p:cTn>
+                              </p:par>
+                            </p:childTnLst>
+                          </p:cTn>
+                        </p:par>
+                      </p:childTnLst>
+                    </p:cTn>
+                  </p:par>
+                  <p:par>
+                    <p:cTn id="23" fill="hold">
+                      <p:stCondLst>
+                        <p:cond delay="indefinite"/>
+                      </p:stCondLst>
+                      <p:childTnLst>
+                        <p:par>
+                          <p:cTn id="24" fill="hold">
+                            <p:stCondLst>
+                              <p:cond delay="0"/>
+                            </p:stCondLst>
+                            <p:childTnLst>
+                              <p:par>
+                                <p:cTn id="25" presetID="10" presetClass="entr" presetSubtype="0" fill="hold" grpId="0" nodeType="clickEffect">
+                                  <p:stCondLst>
+                                    <p:cond delay="0"/>
+                                  </p:stCondLst>
+                                  <p:childTnLst>
+                                    <p:set>
+                                      <p:cBhvr>
+                                        <p:cTn id="26" dur="1" fill="hold">
+                                          <p:stCondLst>
+                                            <p:cond delay="0"/>
+                                          </p:stCondLst>
+                                        </p:cTn>
+                                        <p:tgtEl>
+                                          <p:spTgt spid="7">
+                                            <p:txEl>
+                                              <p:pRg st="1" end="1"/>
+                                            </p:txEl>
+                                          </p:spTgt>
+                                        </p:tgtEl>
+                                        <p:attrNameLst>
+                                          <p:attrName>style.visibility</p:attrName>
+                                        </p:attrNameLst>
+                                      </p:cBhvr>
+                                      <p:to>
+                                        <p:strVal val="visible"/>
+                                      </p:to>
+                                    </p:set>
+                                    <p:animEffect transition="in" filter="fade">
+                                      <p:cBhvr>
+                                        <p:cTn id="27" dur="2000"/>
+                                        <p:tgtEl>
+                                          <p:spTgt spid="7">
+                                            <p:txEl>
+                                              <p:pRg st="1" end="1"/>
+                                            </p:txEl>
+                                          </p:spTgt>
+                                        </p:tgtEl>
+                                      </p:cBhvr>
+                                    </p:animEffect>
+                                  </p:childTnLst>
+                                </p:cTn>
+                              </p:par>
+                            </p:childTnLst>
+                          </p:cTn>
+                        </p:par>
+                      </p:childTnLst>
+                    </p:cTn>
+                  </p:par>
+                  <p:par>
+                    <p:cTn id="28" fill="hold">
+                      <p:stCondLst>
+                        <p:cond delay="indefinite"/>
+                      </p:stCondLst>
+                      <p:childTnLst>
+                        <p:par>
+                          <p:cTn id="29" fill="hold">
+                            <p:stCondLst>
+                              <p:cond delay="0"/>
+                            </p:stCondLst>
+                            <p:childTnLst>
+                              <p:par>
+                                <p:cTn id="30" presetID="10" presetClass="entr" presetSubtype="0" fill="hold" grpId="0" nodeType="clickEffect">
+                                  <p:stCondLst>
+                                    <p:cond delay="0"/>
+                                  </p:stCondLst>
+                                  <p:childTnLst>
+                                    <p:set>
+                                      <p:cBhvr>
+                                        <p:cTn id="31" dur="1" fill="hold">
+                                          <p:stCondLst>
+                                            <p:cond delay="0"/>
+                                          </p:stCondLst>
+                                        </p:cTn>
+                                        <p:tgtEl>
+                                          <p:spTgt spid="7">
+                                            <p:txEl>
+                                              <p:pRg st="2" end="2"/>
+                                            </p:txEl>
+                                          </p:spTgt>
+                                        </p:tgtEl>
+                                        <p:attrNameLst>
+                                          <p:attrName>style.visibility</p:attrName>
+                                        </p:attrNameLst>
+                                      </p:cBhvr>
+                                      <p:to>
+                                        <p:strVal val="visible"/>
+                                      </p:to>
+                                    </p:set>
+                                    <p:animEffect transition="in" filter="fade">
+                                      <p:cBhvr>
+                                        <p:cTn id="32" dur="2000"/>
+                                        <p:tgtEl>
+                                          <p:spTgt spid="7">
+                                            <p:txEl>
+                                              <p:pRg st="2" end="2"/>
+                                            </p:txEl>
+                                          </p:spTgt>
+                                        </p:tgtEl>
+                                      </p:cBhvr>
+                                    </p:animEffect>
+                                  </p:childTnLst>
+                                </p:cTn>
+                              </p:par>
+                            </p:childTnLst>
+                          </p:cTn>
+                        </p:par>
+                      </p:childTnLst>
+                    </p:cTn>
+                  </p:par>
+                </p:childTnLst>
+              </p:cTn>
+              <p:prevCondLst>
+                <p:cond evt="onPrev" delay="0">
+                  <p:tgtEl>
+                    <p:sldTgt/>
+                  </p:tgtEl>
+                </p:cond>
+              </p:prevCondLst>
+              <p:nextCondLst>
+                <p:cond evt="onNext" delay="0">
+                  <p:tgtEl>
+                    <p:sldTgt/>
+                  </p:tgtEl>
+                </p:cond>
+              </p:nextCondLst>
+            </p:seq>
+          </p:childTnLst>
+        </p:cTn>
+      </p:par>
+    </p:tnLst>
+    <p:bldLst>
+      <p:bldP spid="2" grpId="0"/>
+      <p:bldP spid="7" grpId="0" build="p"/>
+    </p:bldLst>
+  </p:timing>
 </p:sld>
 </file>
 
@@ -7598,12 +8432,29 @@
             <p:ph type="title"/>
           </p:nvPr>
         </p:nvSpPr>
-        <p:spPr/>
+        <p:spPr>
+          <a:xfrm>
+            <a:off x="899592" y="-315416"/>
+            <a:ext cx="7498080" cy="1143000"/>
+          </a:xfrm>
+        </p:spPr>
         <p:txBody>
           <a:bodyPr/>
           <a:lstStyle/>
           <a:p>
-            <a:endParaRPr lang="en-IN"/>
+            <a:r>
+              <a:rPr lang="en-IN" dirty="0" smtClean="0"/>
+              <a:t>Refractive index </a:t>
+            </a:r>
+            <a:r>
+              <a:rPr lang="en-IN" dirty="0" err="1" smtClean="0"/>
+              <a:t>vs</a:t>
+            </a:r>
+            <a:r>
+              <a:rPr lang="en-IN" dirty="0" smtClean="0"/>
+              <a:t> Temperature</a:t>
+            </a:r>
+            <a:endParaRPr lang="en-IN" dirty="0"/>
           </a:p>
         </p:txBody>
       </p:sp>
@@ -7622,7 +8473,75 @@
           <a:bodyPr/>
           <a:lstStyle/>
           <a:p>
-            <a:endParaRPr lang="en-IN"/>
+            <a:endParaRPr lang="en-IN" dirty="0"/>
+          </a:p>
+        </p:txBody>
+      </p:sp>
+      <p:pic>
+        <p:nvPicPr>
+          <p:cNvPr id="4" name="Picture 3" descr="n_vs_temperatureN-BK7_2.png"/>
+          <p:cNvPicPr>
+            <a:picLocks noChangeAspect="1"/>
+          </p:cNvPicPr>
+          <p:nvPr/>
+        </p:nvPicPr>
+        <p:blipFill>
+          <a:blip r:embed="rId2" cstate="print"/>
+          <a:stretch>
+            <a:fillRect/>
+          </a:stretch>
+        </p:blipFill>
+        <p:spPr>
+          <a:xfrm>
+            <a:off x="899592" y="548680"/>
+            <a:ext cx="6804248" cy="5112568"/>
+          </a:xfrm>
+          <a:prstGeom prst="rect">
+            <a:avLst/>
+          </a:prstGeom>
+        </p:spPr>
+      </p:pic>
+      <p:sp>
+        <p:nvSpPr>
+          <p:cNvPr id="6" name="TextBox 5"/>
+          <p:cNvSpPr txBox="1"/>
+          <p:nvPr/>
+        </p:nvSpPr>
+        <p:spPr>
+          <a:xfrm>
+            <a:off x="971600" y="5805264"/>
+            <a:ext cx="7704856" cy="954107"/>
+          </a:xfrm>
+          <a:prstGeom prst="rect">
+            <a:avLst/>
+          </a:prstGeom>
+          <a:noFill/>
+        </p:spPr>
+        <p:txBody>
+          <a:bodyPr wrap="square" rtlCol="0">
+            <a:spAutoFit/>
+          </a:bodyPr>
+          <a:lstStyle/>
+          <a:p>
+            <a:pPr>
+              <a:buFont typeface="Arial" pitchFamily="34" charset="0"/>
+              <a:buChar char="•"/>
+            </a:pPr>
+            <a:r>
+              <a:rPr lang="en-IN" sz="2800" dirty="0" smtClean="0"/>
+              <a:t>Green colour for pressure 90000 Pa</a:t>
+            </a:r>
+          </a:p>
+          <a:p>
+            <a:pPr>
+              <a:buFont typeface="Arial" pitchFamily="34" charset="0"/>
+              <a:buChar char="•"/>
+            </a:pPr>
+            <a:r>
+              <a:rPr lang="en-IN" sz="2800" dirty="0" smtClean="0"/>
+              <a:t>Blue colour for pressure 103250 Pa</a:t>
+            </a:r>
+            <a:endParaRPr lang="en-IN" sz="2800" dirty="0"/>
           </a:p>
         </p:txBody>
       </p:sp>
@@ -7631,6 +8550,770 @@
   <p:clrMapOvr>
     <a:masterClrMapping/>
   </p:clrMapOvr>
+  <p:timing>
+    <p:tnLst>
+      <p:par>
+        <p:cTn id="1" dur="indefinite" restart="never" nodeType="tmRoot">
+          <p:childTnLst>
+            <p:seq concurrent="1" nextAc="seek">
+              <p:cTn id="2" dur="indefinite" nodeType="mainSeq">
+                <p:childTnLst>
+                  <p:par>
+                    <p:cTn id="3" fill="hold">
+                      <p:stCondLst>
+                        <p:cond delay="indefinite"/>
+                      </p:stCondLst>
+                      <p:childTnLst>
+                        <p:par>
+                          <p:cTn id="4" fill="hold">
+                            <p:stCondLst>
+                              <p:cond delay="0"/>
+                            </p:stCondLst>
+                            <p:childTnLst>
+                              <p:par>
+                                <p:cTn id="5" presetID="10" presetClass="entr" presetSubtype="0" fill="hold" grpId="0" nodeType="clickEffect">
+                                  <p:stCondLst>
+                                    <p:cond delay="0"/>
+                                  </p:stCondLst>
+                                  <p:childTnLst>
+                                    <p:set>
+                                      <p:cBhvr>
+                                        <p:cTn id="6" dur="1" fill="hold">
+                                          <p:stCondLst>
+                                            <p:cond delay="0"/>
+                                          </p:stCondLst>
+                                        </p:cTn>
+                                        <p:tgtEl>
+                                          <p:spTgt spid="2"/>
+                                        </p:tgtEl>
+                                        <p:attrNameLst>
+                                          <p:attrName>style.visibility</p:attrName>
+                                        </p:attrNameLst>
+                                      </p:cBhvr>
+                                      <p:to>
+                                        <p:strVal val="visible"/>
+                                      </p:to>
+                                    </p:set>
+                                    <p:animEffect transition="in" filter="fade">
+                                      <p:cBhvr>
+                                        <p:cTn id="7" dur="2000"/>
+                                        <p:tgtEl>
+                                          <p:spTgt spid="2"/>
+                                        </p:tgtEl>
+                                      </p:cBhvr>
+                                    </p:animEffect>
+                                  </p:childTnLst>
+                                </p:cTn>
+                              </p:par>
+                            </p:childTnLst>
+                          </p:cTn>
+                        </p:par>
+                      </p:childTnLst>
+                    </p:cTn>
+                  </p:par>
+                  <p:par>
+                    <p:cTn id="8" fill="hold">
+                      <p:stCondLst>
+                        <p:cond delay="indefinite"/>
+                      </p:stCondLst>
+                      <p:childTnLst>
+                        <p:par>
+                          <p:cTn id="9" fill="hold">
+                            <p:stCondLst>
+                              <p:cond delay="0"/>
+                            </p:stCondLst>
+                            <p:childTnLst>
+                              <p:par>
+                                <p:cTn id="10" presetID="10" presetClass="entr" presetSubtype="0" fill="hold" nodeType="clickEffect">
+                                  <p:stCondLst>
+                                    <p:cond delay="0"/>
+                                  </p:stCondLst>
+                                  <p:childTnLst>
+                                    <p:set>
+                                      <p:cBhvr>
+                                        <p:cTn id="11" dur="1" fill="hold">
+                                          <p:stCondLst>
+                                            <p:cond delay="0"/>
+                                          </p:stCondLst>
+                                        </p:cTn>
+                                        <p:tgtEl>
+                                          <p:spTgt spid="4"/>
+                                        </p:tgtEl>
+                                        <p:attrNameLst>
+                                          <p:attrName>style.visibility</p:attrName>
+                                        </p:attrNameLst>
+                                      </p:cBhvr>
+                                      <p:to>
+                                        <p:strVal val="visible"/>
+                                      </p:to>
+                                    </p:set>
+                                    <p:animEffect transition="in" filter="fade">
+                                      <p:cBhvr>
+                                        <p:cTn id="12" dur="2000"/>
+                                        <p:tgtEl>
+                                          <p:spTgt spid="4"/>
+                                        </p:tgtEl>
+                                      </p:cBhvr>
+                                    </p:animEffect>
+                                  </p:childTnLst>
+                                </p:cTn>
+                              </p:par>
+                            </p:childTnLst>
+                          </p:cTn>
+                        </p:par>
+                      </p:childTnLst>
+                    </p:cTn>
+                  </p:par>
+                  <p:par>
+                    <p:cTn id="13" fill="hold">
+                      <p:stCondLst>
+                        <p:cond delay="indefinite"/>
+                      </p:stCondLst>
+                      <p:childTnLst>
+                        <p:par>
+                          <p:cTn id="14" fill="hold">
+                            <p:stCondLst>
+                              <p:cond delay="0"/>
+                            </p:stCondLst>
+                            <p:childTnLst>
+                              <p:par>
+                                <p:cTn id="15" presetID="10" presetClass="entr" presetSubtype="0" fill="hold" grpId="0" nodeType="clickEffect">
+                                  <p:stCondLst>
+                                    <p:cond delay="0"/>
+                                  </p:stCondLst>
+                                  <p:childTnLst>
+                                    <p:set>
+                                      <p:cBhvr>
+                                        <p:cTn id="16" dur="1" fill="hold">
+                                          <p:stCondLst>
+                                            <p:cond delay="0"/>
+                                          </p:stCondLst>
+                                        </p:cTn>
+                                        <p:tgtEl>
+                                          <p:spTgt spid="6">
+                                            <p:txEl>
+                                              <p:pRg st="0" end="0"/>
+                                            </p:txEl>
+                                          </p:spTgt>
+                                        </p:tgtEl>
+                                        <p:attrNameLst>
+                                          <p:attrName>style.visibility</p:attrName>
+                                        </p:attrNameLst>
+                                      </p:cBhvr>
+                                      <p:to>
+                                        <p:strVal val="visible"/>
+                                      </p:to>
+                                    </p:set>
+                                    <p:animEffect transition="in" filter="fade">
+                                      <p:cBhvr>
+                                        <p:cTn id="17" dur="2000"/>
+                                        <p:tgtEl>
+                                          <p:spTgt spid="6">
+                                            <p:txEl>
+                                              <p:pRg st="0" end="0"/>
+                                            </p:txEl>
+                                          </p:spTgt>
+                                        </p:tgtEl>
+                                      </p:cBhvr>
+                                    </p:animEffect>
+                                  </p:childTnLst>
+                                </p:cTn>
+                              </p:par>
+                              <p:par>
+                                <p:cTn id="18" presetID="10" presetClass="entr" presetSubtype="0" fill="hold" grpId="0" nodeType="withEffect">
+                                  <p:stCondLst>
+                                    <p:cond delay="0"/>
+                                  </p:stCondLst>
+                                  <p:childTnLst>
+                                    <p:set>
+                                      <p:cBhvr>
+                                        <p:cTn id="19" dur="1" fill="hold">
+                                          <p:stCondLst>
+                                            <p:cond delay="0"/>
+                                          </p:stCondLst>
+                                        </p:cTn>
+                                        <p:tgtEl>
+                                          <p:spTgt spid="6">
+                                            <p:txEl>
+                                              <p:pRg st="1" end="1"/>
+                                            </p:txEl>
+                                          </p:spTgt>
+                                        </p:tgtEl>
+                                        <p:attrNameLst>
+                                          <p:attrName>style.visibility</p:attrName>
+                                        </p:attrNameLst>
+                                      </p:cBhvr>
+                                      <p:to>
+                                        <p:strVal val="visible"/>
+                                      </p:to>
+                                    </p:set>
+                                    <p:animEffect transition="in" filter="fade">
+                                      <p:cBhvr>
+                                        <p:cTn id="20" dur="2000"/>
+                                        <p:tgtEl>
+                                          <p:spTgt spid="6">
+                                            <p:txEl>
+                                              <p:pRg st="1" end="1"/>
+                                            </p:txEl>
+                                          </p:spTgt>
+                                        </p:tgtEl>
+                                      </p:cBhvr>
+                                    </p:animEffect>
+                                  </p:childTnLst>
+                                </p:cTn>
+                              </p:par>
+                            </p:childTnLst>
+                          </p:cTn>
+                        </p:par>
+                      </p:childTnLst>
+                    </p:cTn>
+                  </p:par>
+                </p:childTnLst>
+              </p:cTn>
+              <p:prevCondLst>
+                <p:cond evt="onPrev" delay="0">
+                  <p:tgtEl>
+                    <p:sldTgt/>
+                  </p:tgtEl>
+                </p:cond>
+              </p:prevCondLst>
+              <p:nextCondLst>
+                <p:cond evt="onNext" delay="0">
+                  <p:tgtEl>
+                    <p:sldTgt/>
+                  </p:tgtEl>
+                </p:cond>
+              </p:nextCondLst>
+            </p:seq>
+          </p:childTnLst>
+        </p:cTn>
+      </p:par>
+    </p:tnLst>
+    <p:bldLst>
+      <p:bldP spid="2" grpId="0"/>
+      <p:bldP spid="6" grpId="0" build="allAtOnce"/>
+    </p:bldLst>
+  </p:timing>
+</p:sld>
+</file>
+
+<file path=ppt/slides/slide19.xml><?xml version="1.0" encoding="utf-8"?>
+<p:sld xmlns:a="http://schemas.openxmlformats.org/drawingml/2006/main" xmlns:r="http://schemas.openxmlformats.org/officeDocument/2006/relationships" xmlns:p="http://schemas.openxmlformats.org/presentationml/2006/main">
+  <p:cSld>
+    <p:spTree>
+      <p:nvGrpSpPr>
+        <p:cNvPr id="1" name=""/>
+        <p:cNvGrpSpPr/>
+        <p:nvPr/>
+      </p:nvGrpSpPr>
+      <p:grpSpPr>
+        <a:xfrm>
+          <a:off x="0" y="0"/>
+          <a:ext cx="0" cy="0"/>
+          <a:chOff x="0" y="0"/>
+          <a:chExt cx="0" cy="0"/>
+        </a:xfrm>
+      </p:grpSpPr>
+      <p:sp>
+        <p:nvSpPr>
+          <p:cNvPr id="2" name="Title 1"/>
+          <p:cNvSpPr>
+            <a:spLocks noGrp="1"/>
+          </p:cNvSpPr>
+          <p:nvPr>
+            <p:ph type="title"/>
+          </p:nvPr>
+        </p:nvSpPr>
+        <p:spPr>
+          <a:xfrm>
+            <a:off x="251520" y="-243408"/>
+            <a:ext cx="7498080" cy="1143000"/>
+          </a:xfrm>
+        </p:spPr>
+        <p:txBody>
+          <a:bodyPr/>
+          <a:lstStyle/>
+          <a:p>
+            <a:r>
+              <a:rPr lang="en-IN" dirty="0" smtClean="0"/>
+              <a:t>N-BK7 (RI with temperature)</a:t>
+            </a:r>
+            <a:endParaRPr lang="en-IN" dirty="0"/>
+          </a:p>
+        </p:txBody>
+      </p:sp>
+      <p:sp>
+        <p:nvSpPr>
+          <p:cNvPr id="3" name="Content Placeholder 2"/>
+          <p:cNvSpPr>
+            <a:spLocks noGrp="1"/>
+          </p:cNvSpPr>
+          <p:nvPr>
+            <p:ph idx="1"/>
+          </p:nvPr>
+        </p:nvSpPr>
+        <p:spPr>
+          <a:xfrm>
+            <a:off x="0" y="692696"/>
+            <a:ext cx="9144000" cy="6165304"/>
+          </a:xfrm>
+        </p:spPr>
+        <p:txBody>
+          <a:bodyPr>
+            <a:normAutofit fontScale="92500" lnSpcReduction="20000"/>
+          </a:bodyPr>
+          <a:lstStyle/>
+          <a:p>
+            <a:r>
+              <a:rPr lang="en-IN" dirty="0" smtClean="0"/>
+              <a:t>Refractive index for wavelength 1060nm at reference temperature 20 </a:t>
+            </a:r>
+            <a:r>
+              <a:rPr lang="en-IN" dirty="0" err="1" smtClean="0"/>
+              <a:t>celsius</a:t>
+            </a:r>
+            <a:r>
+              <a:rPr lang="en-IN" dirty="0" smtClean="0"/>
+              <a:t> and pressure 103250 is 1.5066875568966998 </a:t>
+            </a:r>
+          </a:p>
+          <a:p>
+            <a:r>
+              <a:rPr lang="en-IN" dirty="0" smtClean="0"/>
+              <a:t>At 40 </a:t>
+            </a:r>
+            <a:r>
+              <a:rPr lang="en-IN" dirty="0" err="1" smtClean="0"/>
+              <a:t>celsius</a:t>
+            </a:r>
+            <a:r>
+              <a:rPr lang="en-IN" dirty="0" smtClean="0"/>
+              <a:t> and pressure 103250 is 1.506727581074728</a:t>
+            </a:r>
+          </a:p>
+          <a:p>
+            <a:endParaRPr lang="en-IN" dirty="0" smtClean="0"/>
+          </a:p>
+          <a:p>
+            <a:r>
+              <a:rPr lang="en-IN" dirty="0" smtClean="0"/>
+              <a:t>With same temperature 40 but at different pressure 90000 Pa, RI is 1.5067772329259013</a:t>
+            </a:r>
+          </a:p>
+          <a:p>
+            <a:r>
+              <a:rPr lang="en-IN" dirty="0" smtClean="0"/>
+              <a:t>Reason :  Pressure applies on lens surface inward while temperature of glass applies the force outward because of thermal expansion. </a:t>
+            </a:r>
+          </a:p>
+          <a:p>
+            <a:r>
+              <a:rPr lang="en-IN" dirty="0" smtClean="0"/>
+              <a:t>So if we keep the temperature constant and decrease the pressure then temperature effect will dominate and refractive would be greater than the high pressure condition.</a:t>
+            </a:r>
+          </a:p>
+          <a:p>
+            <a:endParaRPr lang="en-IN" dirty="0"/>
+          </a:p>
+        </p:txBody>
+      </p:sp>
+    </p:spTree>
+  </p:cSld>
+  <p:clrMapOvr>
+    <a:masterClrMapping/>
+  </p:clrMapOvr>
+  <p:timing>
+    <p:tnLst>
+      <p:par>
+        <p:cTn id="1" dur="indefinite" restart="never" nodeType="tmRoot">
+          <p:childTnLst>
+            <p:seq concurrent="1" nextAc="seek">
+              <p:cTn id="2" dur="indefinite" nodeType="mainSeq">
+                <p:childTnLst>
+                  <p:par>
+                    <p:cTn id="3" fill="hold">
+                      <p:stCondLst>
+                        <p:cond delay="indefinite"/>
+                      </p:stCondLst>
+                      <p:childTnLst>
+                        <p:par>
+                          <p:cTn id="4" fill="hold">
+                            <p:stCondLst>
+                              <p:cond delay="0"/>
+                            </p:stCondLst>
+                            <p:childTnLst>
+                              <p:par>
+                                <p:cTn id="5" presetID="10" presetClass="entr" presetSubtype="0" fill="hold" grpId="0" nodeType="clickEffect">
+                                  <p:stCondLst>
+                                    <p:cond delay="0"/>
+                                  </p:stCondLst>
+                                  <p:childTnLst>
+                                    <p:set>
+                                      <p:cBhvr>
+                                        <p:cTn id="6" dur="1" fill="hold">
+                                          <p:stCondLst>
+                                            <p:cond delay="0"/>
+                                          </p:stCondLst>
+                                        </p:cTn>
+                                        <p:tgtEl>
+                                          <p:spTgt spid="2"/>
+                                        </p:tgtEl>
+                                        <p:attrNameLst>
+                                          <p:attrName>style.visibility</p:attrName>
+                                        </p:attrNameLst>
+                                      </p:cBhvr>
+                                      <p:to>
+                                        <p:strVal val="visible"/>
+                                      </p:to>
+                                    </p:set>
+                                    <p:animEffect transition="in" filter="fade">
+                                      <p:cBhvr>
+                                        <p:cTn id="7" dur="2000"/>
+                                        <p:tgtEl>
+                                          <p:spTgt spid="2"/>
+                                        </p:tgtEl>
+                                      </p:cBhvr>
+                                    </p:animEffect>
+                                  </p:childTnLst>
+                                </p:cTn>
+                              </p:par>
+                            </p:childTnLst>
+                          </p:cTn>
+                        </p:par>
+                      </p:childTnLst>
+                    </p:cTn>
+                  </p:par>
+                  <p:par>
+                    <p:cTn id="8" fill="hold">
+                      <p:stCondLst>
+                        <p:cond delay="indefinite"/>
+                      </p:stCondLst>
+                      <p:childTnLst>
+                        <p:par>
+                          <p:cTn id="9" fill="hold">
+                            <p:stCondLst>
+                              <p:cond delay="0"/>
+                            </p:stCondLst>
+                            <p:childTnLst>
+                              <p:par>
+                                <p:cTn id="10" presetID="10" presetClass="entr" presetSubtype="0" fill="hold" grpId="0" nodeType="clickEffect">
+                                  <p:stCondLst>
+                                    <p:cond delay="0"/>
+                                  </p:stCondLst>
+                                  <p:childTnLst>
+                                    <p:set>
+                                      <p:cBhvr>
+                                        <p:cTn id="11" dur="1" fill="hold">
+                                          <p:stCondLst>
+                                            <p:cond delay="0"/>
+                                          </p:stCondLst>
+                                        </p:cTn>
+                                        <p:tgtEl>
+                                          <p:spTgt spid="3">
+                                            <p:txEl>
+                                              <p:pRg st="0" end="0"/>
+                                            </p:txEl>
+                                          </p:spTgt>
+                                        </p:tgtEl>
+                                        <p:attrNameLst>
+                                          <p:attrName>style.visibility</p:attrName>
+                                        </p:attrNameLst>
+                                      </p:cBhvr>
+                                      <p:to>
+                                        <p:strVal val="visible"/>
+                                      </p:to>
+                                    </p:set>
+                                    <p:animEffect transition="in" filter="fade">
+                                      <p:cBhvr>
+                                        <p:cTn id="12" dur="2000"/>
+                                        <p:tgtEl>
+                                          <p:spTgt spid="3">
+                                            <p:txEl>
+                                              <p:pRg st="0" end="0"/>
+                                            </p:txEl>
+                                          </p:spTgt>
+                                        </p:tgtEl>
+                                      </p:cBhvr>
+                                    </p:animEffect>
+                                  </p:childTnLst>
+                                </p:cTn>
+                              </p:par>
+                            </p:childTnLst>
+                          </p:cTn>
+                        </p:par>
+                      </p:childTnLst>
+                    </p:cTn>
+                  </p:par>
+                  <p:par>
+                    <p:cTn id="13" fill="hold">
+                      <p:stCondLst>
+                        <p:cond delay="indefinite"/>
+                      </p:stCondLst>
+                      <p:childTnLst>
+                        <p:par>
+                          <p:cTn id="14" fill="hold">
+                            <p:stCondLst>
+                              <p:cond delay="0"/>
+                            </p:stCondLst>
+                            <p:childTnLst>
+                              <p:par>
+                                <p:cTn id="15" presetID="10" presetClass="entr" presetSubtype="0" fill="hold" grpId="0" nodeType="clickEffect">
+                                  <p:stCondLst>
+                                    <p:cond delay="0"/>
+                                  </p:stCondLst>
+                                  <p:childTnLst>
+                                    <p:set>
+                                      <p:cBhvr>
+                                        <p:cTn id="16" dur="1" fill="hold">
+                                          <p:stCondLst>
+                                            <p:cond delay="0"/>
+                                          </p:stCondLst>
+                                        </p:cTn>
+                                        <p:tgtEl>
+                                          <p:spTgt spid="3">
+                                            <p:txEl>
+                                              <p:pRg st="1" end="1"/>
+                                            </p:txEl>
+                                          </p:spTgt>
+                                        </p:tgtEl>
+                                        <p:attrNameLst>
+                                          <p:attrName>style.visibility</p:attrName>
+                                        </p:attrNameLst>
+                                      </p:cBhvr>
+                                      <p:to>
+                                        <p:strVal val="visible"/>
+                                      </p:to>
+                                    </p:set>
+                                    <p:animEffect transition="in" filter="fade">
+                                      <p:cBhvr>
+                                        <p:cTn id="17" dur="2000"/>
+                                        <p:tgtEl>
+                                          <p:spTgt spid="3">
+                                            <p:txEl>
+                                              <p:pRg st="1" end="1"/>
+                                            </p:txEl>
+                                          </p:spTgt>
+                                        </p:tgtEl>
+                                      </p:cBhvr>
+                                    </p:animEffect>
+                                  </p:childTnLst>
+                                </p:cTn>
+                              </p:par>
+                            </p:childTnLst>
+                          </p:cTn>
+                        </p:par>
+                      </p:childTnLst>
+                    </p:cTn>
+                  </p:par>
+                  <p:par>
+                    <p:cTn id="18" fill="hold">
+                      <p:stCondLst>
+                        <p:cond delay="indefinite"/>
+                      </p:stCondLst>
+                      <p:childTnLst>
+                        <p:par>
+                          <p:cTn id="19" fill="hold">
+                            <p:stCondLst>
+                              <p:cond delay="0"/>
+                            </p:stCondLst>
+                            <p:childTnLst>
+                              <p:par>
+                                <p:cTn id="20" presetID="10" presetClass="entr" presetSubtype="0" fill="hold" grpId="0" nodeType="clickEffect">
+                                  <p:stCondLst>
+                                    <p:cond delay="0"/>
+                                  </p:stCondLst>
+                                  <p:childTnLst>
+                                    <p:set>
+                                      <p:cBhvr>
+                                        <p:cTn id="21" dur="1" fill="hold">
+                                          <p:stCondLst>
+                                            <p:cond delay="0"/>
+                                          </p:stCondLst>
+                                        </p:cTn>
+                                        <p:tgtEl>
+                                          <p:spTgt spid="3">
+                                            <p:txEl>
+                                              <p:pRg st="3" end="3"/>
+                                            </p:txEl>
+                                          </p:spTgt>
+                                        </p:tgtEl>
+                                        <p:attrNameLst>
+                                          <p:attrName>style.visibility</p:attrName>
+                                        </p:attrNameLst>
+                                      </p:cBhvr>
+                                      <p:to>
+                                        <p:strVal val="visible"/>
+                                      </p:to>
+                                    </p:set>
+                                    <p:animEffect transition="in" filter="fade">
+                                      <p:cBhvr>
+                                        <p:cTn id="22" dur="2000"/>
+                                        <p:tgtEl>
+                                          <p:spTgt spid="3">
+                                            <p:txEl>
+                                              <p:pRg st="3" end="3"/>
+                                            </p:txEl>
+                                          </p:spTgt>
+                                        </p:tgtEl>
+                                      </p:cBhvr>
+                                    </p:animEffect>
+                                  </p:childTnLst>
+                                </p:cTn>
+                              </p:par>
+                            </p:childTnLst>
+                          </p:cTn>
+                        </p:par>
+                      </p:childTnLst>
+                    </p:cTn>
+                  </p:par>
+                  <p:par>
+                    <p:cTn id="23" fill="hold">
+                      <p:stCondLst>
+                        <p:cond delay="indefinite"/>
+                      </p:stCondLst>
+                      <p:childTnLst>
+                        <p:par>
+                          <p:cTn id="24" fill="hold">
+                            <p:stCondLst>
+                              <p:cond delay="0"/>
+                            </p:stCondLst>
+                            <p:childTnLst>
+                              <p:par>
+                                <p:cTn id="25" presetID="10" presetClass="entr" presetSubtype="0" fill="hold" grpId="0" nodeType="clickEffect">
+                                  <p:stCondLst>
+                                    <p:cond delay="0"/>
+                                  </p:stCondLst>
+                                  <p:childTnLst>
+                                    <p:set>
+                                      <p:cBhvr>
+                                        <p:cTn id="26" dur="1" fill="hold">
+                                          <p:stCondLst>
+                                            <p:cond delay="0"/>
+                                          </p:stCondLst>
+                                        </p:cTn>
+                                        <p:tgtEl>
+                                          <p:spTgt spid="3">
+                                            <p:txEl>
+                                              <p:pRg st="4" end="4"/>
+                                            </p:txEl>
+                                          </p:spTgt>
+                                        </p:tgtEl>
+                                        <p:attrNameLst>
+                                          <p:attrName>style.visibility</p:attrName>
+                                        </p:attrNameLst>
+                                      </p:cBhvr>
+                                      <p:to>
+                                        <p:strVal val="visible"/>
+                                      </p:to>
+                                    </p:set>
+                                    <p:animEffect transition="in" filter="fade">
+                                      <p:cBhvr>
+                                        <p:cTn id="27" dur="2000"/>
+                                        <p:tgtEl>
+                                          <p:spTgt spid="3">
+                                            <p:txEl>
+                                              <p:pRg st="4" end="4"/>
+                                            </p:txEl>
+                                          </p:spTgt>
+                                        </p:tgtEl>
+                                      </p:cBhvr>
+                                    </p:animEffect>
+                                  </p:childTnLst>
+                                </p:cTn>
+                              </p:par>
+                            </p:childTnLst>
+                          </p:cTn>
+                        </p:par>
+                      </p:childTnLst>
+                    </p:cTn>
+                  </p:par>
+                  <p:par>
+                    <p:cTn id="28" fill="hold">
+                      <p:stCondLst>
+                        <p:cond delay="indefinite"/>
+                      </p:stCondLst>
+                      <p:childTnLst>
+                        <p:par>
+                          <p:cTn id="29" fill="hold">
+                            <p:stCondLst>
+                              <p:cond delay="0"/>
+                            </p:stCondLst>
+                            <p:childTnLst>
+                              <p:par>
+                                <p:cTn id="30" presetID="10" presetClass="entr" presetSubtype="0" fill="hold" grpId="0" nodeType="clickEffect">
+                                  <p:stCondLst>
+                                    <p:cond delay="0"/>
+                                  </p:stCondLst>
+                                  <p:childTnLst>
+                                    <p:set>
+                                      <p:cBhvr>
+                                        <p:cTn id="31" dur="1" fill="hold">
+                                          <p:stCondLst>
+                                            <p:cond delay="0"/>
+                                          </p:stCondLst>
+                                        </p:cTn>
+                                        <p:tgtEl>
+                                          <p:spTgt spid="3">
+                                            <p:txEl>
+                                              <p:pRg st="5" end="5"/>
+                                            </p:txEl>
+                                          </p:spTgt>
+                                        </p:tgtEl>
+                                        <p:attrNameLst>
+                                          <p:attrName>style.visibility</p:attrName>
+                                        </p:attrNameLst>
+                                      </p:cBhvr>
+                                      <p:to>
+                                        <p:strVal val="visible"/>
+                                      </p:to>
+                                    </p:set>
+                                    <p:animEffect transition="in" filter="fade">
+                                      <p:cBhvr>
+                                        <p:cTn id="32" dur="2000"/>
+                                        <p:tgtEl>
+                                          <p:spTgt spid="3">
+                                            <p:txEl>
+                                              <p:pRg st="5" end="5"/>
+                                            </p:txEl>
+                                          </p:spTgt>
+                                        </p:tgtEl>
+                                      </p:cBhvr>
+                                    </p:animEffect>
+                                  </p:childTnLst>
+                                </p:cTn>
+                              </p:par>
+                            </p:childTnLst>
+                          </p:cTn>
+                        </p:par>
+                      </p:childTnLst>
+                    </p:cTn>
+                  </p:par>
+                </p:childTnLst>
+              </p:cTn>
+              <p:prevCondLst>
+                <p:cond evt="onPrev" delay="0">
+                  <p:tgtEl>
+                    <p:sldTgt/>
+                  </p:tgtEl>
+                </p:cond>
+              </p:prevCondLst>
+              <p:nextCondLst>
+                <p:cond evt="onNext" delay="0">
+                  <p:tgtEl>
+                    <p:sldTgt/>
+                  </p:tgtEl>
+                </p:cond>
+              </p:nextCondLst>
+            </p:seq>
+          </p:childTnLst>
+        </p:cTn>
+      </p:par>
+    </p:tnLst>
+    <p:bldLst>
+      <p:bldP spid="2" grpId="0"/>
+      <p:bldP spid="3" grpId="0" build="p"/>
+    </p:bldLst>
+  </p:timing>
 </p:sld>
 </file>
 
@@ -7693,7 +9376,7 @@
           <a:p>
             <a:r>
               <a:rPr lang="en-IN" dirty="0" smtClean="0"/>
-              <a:t>Light disperse through medium</a:t>
+              <a:t>Light disperses through medium</a:t>
             </a:r>
           </a:p>
           <a:p>
@@ -7755,7 +9438,7 @@
         </p:blipFill>
         <p:spPr>
           <a:xfrm>
-            <a:off x="6300192" y="548680"/>
+            <a:off x="5004048" y="3861048"/>
             <a:ext cx="2160239" cy="809427"/>
           </a:xfrm>
           <a:prstGeom prst="rect">
@@ -8211,6 +9894,1424 @@
     <p:bldLst>
       <p:bldP spid="2" grpId="0"/>
       <p:bldP spid="3" grpId="0" build="p"/>
+    </p:bldLst>
+  </p:timing>
+</p:sld>
+</file>
+
+<file path=ppt/slides/slide20.xml><?xml version="1.0" encoding="utf-8"?>
+<p:sld xmlns:a="http://schemas.openxmlformats.org/drawingml/2006/main" xmlns:r="http://schemas.openxmlformats.org/officeDocument/2006/relationships" xmlns:p="http://schemas.openxmlformats.org/presentationml/2006/main">
+  <p:cSld>
+    <p:spTree>
+      <p:nvGrpSpPr>
+        <p:cNvPr id="1" name=""/>
+        <p:cNvGrpSpPr/>
+        <p:nvPr/>
+      </p:nvGrpSpPr>
+      <p:grpSpPr>
+        <a:xfrm>
+          <a:off x="0" y="0"/>
+          <a:ext cx="0" cy="0"/>
+          <a:chOff x="0" y="0"/>
+          <a:chExt cx="0" cy="0"/>
+        </a:xfrm>
+      </p:grpSpPr>
+      <p:sp>
+        <p:nvSpPr>
+          <p:cNvPr id="2" name="Title 1"/>
+          <p:cNvSpPr>
+            <a:spLocks noGrp="1"/>
+          </p:cNvSpPr>
+          <p:nvPr>
+            <p:ph type="title"/>
+          </p:nvPr>
+        </p:nvSpPr>
+        <p:spPr>
+          <a:xfrm>
+            <a:off x="0" y="0"/>
+            <a:ext cx="7498080" cy="836712"/>
+          </a:xfrm>
+        </p:spPr>
+        <p:txBody>
+          <a:bodyPr/>
+          <a:lstStyle/>
+          <a:p>
+            <a:r>
+              <a:rPr lang="en-IN" dirty="0" smtClean="0"/>
+              <a:t>K-SFLD 14</a:t>
+            </a:r>
+            <a:endParaRPr lang="en-IN" dirty="0"/>
+          </a:p>
+        </p:txBody>
+      </p:sp>
+      <p:pic>
+        <p:nvPicPr>
+          <p:cNvPr id="6" name="Content Placeholder 5" descr="n_abs_derivative_vs_temperatureK-SFLD14_1.png"/>
+          <p:cNvPicPr>
+            <a:picLocks noGrp="1" noChangeAspect="1"/>
+          </p:cNvPicPr>
+          <p:nvPr>
+            <p:ph idx="1"/>
+          </p:nvPr>
+        </p:nvPicPr>
+        <p:blipFill>
+          <a:blip r:embed="rId2" cstate="print"/>
+          <a:stretch>
+            <a:fillRect/>
+          </a:stretch>
+        </p:blipFill>
+        <p:spPr>
+          <a:xfrm>
+            <a:off x="0" y="620688"/>
+            <a:ext cx="4608512" cy="3082369"/>
+          </a:xfrm>
+        </p:spPr>
+      </p:pic>
+      <p:pic>
+        <p:nvPicPr>
+          <p:cNvPr id="7" name="Picture 6" descr="n_rel_derivative_vs_temperatureK-SFLD14_1.png"/>
+          <p:cNvPicPr>
+            <a:picLocks noChangeAspect="1"/>
+          </p:cNvPicPr>
+          <p:nvPr/>
+        </p:nvPicPr>
+        <p:blipFill>
+          <a:blip r:embed="rId3" cstate="print"/>
+          <a:stretch>
+            <a:fillRect/>
+          </a:stretch>
+        </p:blipFill>
+        <p:spPr>
+          <a:xfrm>
+            <a:off x="4391472" y="692696"/>
+            <a:ext cx="4752528" cy="3010361"/>
+          </a:xfrm>
+          <a:prstGeom prst="rect">
+            <a:avLst/>
+          </a:prstGeom>
+        </p:spPr>
+      </p:pic>
+      <p:sp>
+        <p:nvSpPr>
+          <p:cNvPr id="8" name="TextBox 7"/>
+          <p:cNvSpPr txBox="1"/>
+          <p:nvPr/>
+        </p:nvSpPr>
+        <p:spPr>
+          <a:xfrm>
+            <a:off x="0" y="3717033"/>
+            <a:ext cx="9144000" cy="4401205"/>
+          </a:xfrm>
+          <a:prstGeom prst="rect">
+            <a:avLst/>
+          </a:prstGeom>
+          <a:noFill/>
+        </p:spPr>
+        <p:txBody>
+          <a:bodyPr wrap="square" rtlCol="0">
+            <a:spAutoFit/>
+          </a:bodyPr>
+          <a:lstStyle/>
+          <a:p>
+            <a:pPr>
+              <a:buFont typeface="Arial" pitchFamily="34" charset="0"/>
+              <a:buChar char="•"/>
+            </a:pPr>
+            <a:r>
+              <a:rPr lang="en-IN" sz="2800" dirty="0" smtClean="0"/>
+              <a:t>The rate for 560 nm is greater than 1060 nm wavelength in the figure 1.  Here the temperature range is between -100 and 140 </a:t>
+            </a:r>
+            <a:r>
+              <a:rPr lang="en-IN" sz="2800" dirty="0" err="1" smtClean="0"/>
+              <a:t>celsius</a:t>
+            </a:r>
+            <a:r>
+              <a:rPr lang="en-IN" sz="2800" dirty="0" smtClean="0"/>
+              <a:t>.</a:t>
+            </a:r>
+          </a:p>
+          <a:p>
+            <a:pPr>
+              <a:buFont typeface="Arial" pitchFamily="34" charset="0"/>
+              <a:buChar char="•"/>
+            </a:pPr>
+            <a:r>
+              <a:rPr lang="en-IN" sz="2800" dirty="0" smtClean="0"/>
+              <a:t>The rate is decreasing till 30 to 40 </a:t>
+            </a:r>
+            <a:r>
+              <a:rPr lang="en-IN" sz="2800" dirty="0" err="1" smtClean="0"/>
+              <a:t>celcius</a:t>
+            </a:r>
+            <a:r>
+              <a:rPr lang="en-IN" sz="2800" dirty="0" smtClean="0"/>
+              <a:t> and increasing after that. Here the rate is in negative and positive portion. That means that at some point refractive index does not change very much at that temperature in the figure 2. </a:t>
+            </a:r>
+          </a:p>
+          <a:p>
+            <a:pPr>
+              <a:buFont typeface="Arial" pitchFamily="34" charset="0"/>
+              <a:buChar char="•"/>
+            </a:pPr>
+            <a:endParaRPr lang="en-IN" sz="2800" dirty="0" smtClean="0"/>
+          </a:p>
+          <a:p>
+            <a:pPr>
+              <a:buFont typeface="Arial" pitchFamily="34" charset="0"/>
+              <a:buChar char="•"/>
+            </a:pPr>
+            <a:endParaRPr lang="en-IN" sz="2800" dirty="0" smtClean="0"/>
+          </a:p>
+          <a:p>
+            <a:endParaRPr lang="en-IN" sz="2800" dirty="0"/>
+          </a:p>
+        </p:txBody>
+      </p:sp>
+    </p:spTree>
+  </p:cSld>
+  <p:clrMapOvr>
+    <a:masterClrMapping/>
+  </p:clrMapOvr>
+  <p:timing>
+    <p:tnLst>
+      <p:par>
+        <p:cTn id="1" dur="indefinite" restart="never" nodeType="tmRoot">
+          <p:childTnLst>
+            <p:seq concurrent="1" nextAc="seek">
+              <p:cTn id="2" dur="indefinite" nodeType="mainSeq">
+                <p:childTnLst>
+                  <p:par>
+                    <p:cTn id="3" fill="hold">
+                      <p:stCondLst>
+                        <p:cond delay="indefinite"/>
+                      </p:stCondLst>
+                      <p:childTnLst>
+                        <p:par>
+                          <p:cTn id="4" fill="hold">
+                            <p:stCondLst>
+                              <p:cond delay="0"/>
+                            </p:stCondLst>
+                            <p:childTnLst>
+                              <p:par>
+                                <p:cTn id="5" presetID="10" presetClass="entr" presetSubtype="0" fill="hold" grpId="0" nodeType="clickEffect">
+                                  <p:stCondLst>
+                                    <p:cond delay="0"/>
+                                  </p:stCondLst>
+                                  <p:childTnLst>
+                                    <p:set>
+                                      <p:cBhvr>
+                                        <p:cTn id="6" dur="1" fill="hold">
+                                          <p:stCondLst>
+                                            <p:cond delay="0"/>
+                                          </p:stCondLst>
+                                        </p:cTn>
+                                        <p:tgtEl>
+                                          <p:spTgt spid="2"/>
+                                        </p:tgtEl>
+                                        <p:attrNameLst>
+                                          <p:attrName>style.visibility</p:attrName>
+                                        </p:attrNameLst>
+                                      </p:cBhvr>
+                                      <p:to>
+                                        <p:strVal val="visible"/>
+                                      </p:to>
+                                    </p:set>
+                                    <p:animEffect transition="in" filter="fade">
+                                      <p:cBhvr>
+                                        <p:cTn id="7" dur="2000"/>
+                                        <p:tgtEl>
+                                          <p:spTgt spid="2"/>
+                                        </p:tgtEl>
+                                      </p:cBhvr>
+                                    </p:animEffect>
+                                  </p:childTnLst>
+                                </p:cTn>
+                              </p:par>
+                            </p:childTnLst>
+                          </p:cTn>
+                        </p:par>
+                      </p:childTnLst>
+                    </p:cTn>
+                  </p:par>
+                  <p:par>
+                    <p:cTn id="8" fill="hold">
+                      <p:stCondLst>
+                        <p:cond delay="indefinite"/>
+                      </p:stCondLst>
+                      <p:childTnLst>
+                        <p:par>
+                          <p:cTn id="9" fill="hold">
+                            <p:stCondLst>
+                              <p:cond delay="0"/>
+                            </p:stCondLst>
+                            <p:childTnLst>
+                              <p:par>
+                                <p:cTn id="10" presetID="10" presetClass="entr" presetSubtype="0" fill="hold" nodeType="clickEffect">
+                                  <p:stCondLst>
+                                    <p:cond delay="0"/>
+                                  </p:stCondLst>
+                                  <p:childTnLst>
+                                    <p:set>
+                                      <p:cBhvr>
+                                        <p:cTn id="11" dur="1" fill="hold">
+                                          <p:stCondLst>
+                                            <p:cond delay="0"/>
+                                          </p:stCondLst>
+                                        </p:cTn>
+                                        <p:tgtEl>
+                                          <p:spTgt spid="6"/>
+                                        </p:tgtEl>
+                                        <p:attrNameLst>
+                                          <p:attrName>style.visibility</p:attrName>
+                                        </p:attrNameLst>
+                                      </p:cBhvr>
+                                      <p:to>
+                                        <p:strVal val="visible"/>
+                                      </p:to>
+                                    </p:set>
+                                    <p:animEffect transition="in" filter="fade">
+                                      <p:cBhvr>
+                                        <p:cTn id="12" dur="2000"/>
+                                        <p:tgtEl>
+                                          <p:spTgt spid="6"/>
+                                        </p:tgtEl>
+                                      </p:cBhvr>
+                                    </p:animEffect>
+                                  </p:childTnLst>
+                                </p:cTn>
+                              </p:par>
+                            </p:childTnLst>
+                          </p:cTn>
+                        </p:par>
+                      </p:childTnLst>
+                    </p:cTn>
+                  </p:par>
+                  <p:par>
+                    <p:cTn id="13" fill="hold">
+                      <p:stCondLst>
+                        <p:cond delay="indefinite"/>
+                      </p:stCondLst>
+                      <p:childTnLst>
+                        <p:par>
+                          <p:cTn id="14" fill="hold">
+                            <p:stCondLst>
+                              <p:cond delay="0"/>
+                            </p:stCondLst>
+                            <p:childTnLst>
+                              <p:par>
+                                <p:cTn id="15" presetID="10" presetClass="entr" presetSubtype="0" fill="hold" nodeType="clickEffect">
+                                  <p:stCondLst>
+                                    <p:cond delay="0"/>
+                                  </p:stCondLst>
+                                  <p:childTnLst>
+                                    <p:set>
+                                      <p:cBhvr>
+                                        <p:cTn id="16" dur="1" fill="hold">
+                                          <p:stCondLst>
+                                            <p:cond delay="0"/>
+                                          </p:stCondLst>
+                                        </p:cTn>
+                                        <p:tgtEl>
+                                          <p:spTgt spid="7"/>
+                                        </p:tgtEl>
+                                        <p:attrNameLst>
+                                          <p:attrName>style.visibility</p:attrName>
+                                        </p:attrNameLst>
+                                      </p:cBhvr>
+                                      <p:to>
+                                        <p:strVal val="visible"/>
+                                      </p:to>
+                                    </p:set>
+                                    <p:animEffect transition="in" filter="fade">
+                                      <p:cBhvr>
+                                        <p:cTn id="17" dur="2000"/>
+                                        <p:tgtEl>
+                                          <p:spTgt spid="7"/>
+                                        </p:tgtEl>
+                                      </p:cBhvr>
+                                    </p:animEffect>
+                                  </p:childTnLst>
+                                </p:cTn>
+                              </p:par>
+                            </p:childTnLst>
+                          </p:cTn>
+                        </p:par>
+                      </p:childTnLst>
+                    </p:cTn>
+                  </p:par>
+                  <p:par>
+                    <p:cTn id="18" fill="hold">
+                      <p:stCondLst>
+                        <p:cond delay="indefinite"/>
+                      </p:stCondLst>
+                      <p:childTnLst>
+                        <p:par>
+                          <p:cTn id="19" fill="hold">
+                            <p:stCondLst>
+                              <p:cond delay="0"/>
+                            </p:stCondLst>
+                            <p:childTnLst>
+                              <p:par>
+                                <p:cTn id="20" presetID="10" presetClass="entr" presetSubtype="0" fill="hold" grpId="0" nodeType="clickEffect">
+                                  <p:stCondLst>
+                                    <p:cond delay="0"/>
+                                  </p:stCondLst>
+                                  <p:childTnLst>
+                                    <p:set>
+                                      <p:cBhvr>
+                                        <p:cTn id="21" dur="1" fill="hold">
+                                          <p:stCondLst>
+                                            <p:cond delay="0"/>
+                                          </p:stCondLst>
+                                        </p:cTn>
+                                        <p:tgtEl>
+                                          <p:spTgt spid="8">
+                                            <p:txEl>
+                                              <p:pRg st="0" end="0"/>
+                                            </p:txEl>
+                                          </p:spTgt>
+                                        </p:tgtEl>
+                                        <p:attrNameLst>
+                                          <p:attrName>style.visibility</p:attrName>
+                                        </p:attrNameLst>
+                                      </p:cBhvr>
+                                      <p:to>
+                                        <p:strVal val="visible"/>
+                                      </p:to>
+                                    </p:set>
+                                    <p:animEffect transition="in" filter="fade">
+                                      <p:cBhvr>
+                                        <p:cTn id="22" dur="2000"/>
+                                        <p:tgtEl>
+                                          <p:spTgt spid="8">
+                                            <p:txEl>
+                                              <p:pRg st="0" end="0"/>
+                                            </p:txEl>
+                                          </p:spTgt>
+                                        </p:tgtEl>
+                                      </p:cBhvr>
+                                    </p:animEffect>
+                                  </p:childTnLst>
+                                </p:cTn>
+                              </p:par>
+                            </p:childTnLst>
+                          </p:cTn>
+                        </p:par>
+                      </p:childTnLst>
+                    </p:cTn>
+                  </p:par>
+                  <p:par>
+                    <p:cTn id="23" fill="hold">
+                      <p:stCondLst>
+                        <p:cond delay="indefinite"/>
+                      </p:stCondLst>
+                      <p:childTnLst>
+                        <p:par>
+                          <p:cTn id="24" fill="hold">
+                            <p:stCondLst>
+                              <p:cond delay="0"/>
+                            </p:stCondLst>
+                            <p:childTnLst>
+                              <p:par>
+                                <p:cTn id="25" presetID="10" presetClass="entr" presetSubtype="0" fill="hold" grpId="0" nodeType="clickEffect">
+                                  <p:stCondLst>
+                                    <p:cond delay="0"/>
+                                  </p:stCondLst>
+                                  <p:childTnLst>
+                                    <p:set>
+                                      <p:cBhvr>
+                                        <p:cTn id="26" dur="1" fill="hold">
+                                          <p:stCondLst>
+                                            <p:cond delay="0"/>
+                                          </p:stCondLst>
+                                        </p:cTn>
+                                        <p:tgtEl>
+                                          <p:spTgt spid="8">
+                                            <p:txEl>
+                                              <p:pRg st="1" end="1"/>
+                                            </p:txEl>
+                                          </p:spTgt>
+                                        </p:tgtEl>
+                                        <p:attrNameLst>
+                                          <p:attrName>style.visibility</p:attrName>
+                                        </p:attrNameLst>
+                                      </p:cBhvr>
+                                      <p:to>
+                                        <p:strVal val="visible"/>
+                                      </p:to>
+                                    </p:set>
+                                    <p:animEffect transition="in" filter="fade">
+                                      <p:cBhvr>
+                                        <p:cTn id="27" dur="2000"/>
+                                        <p:tgtEl>
+                                          <p:spTgt spid="8">
+                                            <p:txEl>
+                                              <p:pRg st="1" end="1"/>
+                                            </p:txEl>
+                                          </p:spTgt>
+                                        </p:tgtEl>
+                                      </p:cBhvr>
+                                    </p:animEffect>
+                                  </p:childTnLst>
+                                </p:cTn>
+                              </p:par>
+                            </p:childTnLst>
+                          </p:cTn>
+                        </p:par>
+                      </p:childTnLst>
+                    </p:cTn>
+                  </p:par>
+                </p:childTnLst>
+              </p:cTn>
+              <p:prevCondLst>
+                <p:cond evt="onPrev" delay="0">
+                  <p:tgtEl>
+                    <p:sldTgt/>
+                  </p:tgtEl>
+                </p:cond>
+              </p:prevCondLst>
+              <p:nextCondLst>
+                <p:cond evt="onNext" delay="0">
+                  <p:tgtEl>
+                    <p:sldTgt/>
+                  </p:tgtEl>
+                </p:cond>
+              </p:nextCondLst>
+            </p:seq>
+          </p:childTnLst>
+        </p:cTn>
+      </p:par>
+    </p:tnLst>
+    <p:bldLst>
+      <p:bldP spid="2" grpId="0"/>
+      <p:bldP spid="8" grpId="0" build="p"/>
+    </p:bldLst>
+  </p:timing>
+</p:sld>
+</file>
+
+<file path=ppt/slides/slide21.xml><?xml version="1.0" encoding="utf-8"?>
+<p:sld xmlns:a="http://schemas.openxmlformats.org/drawingml/2006/main" xmlns:r="http://schemas.openxmlformats.org/officeDocument/2006/relationships" xmlns:p="http://schemas.openxmlformats.org/presentationml/2006/main">
+  <p:cSld>
+    <p:spTree>
+      <p:nvGrpSpPr>
+        <p:cNvPr id="1" name=""/>
+        <p:cNvGrpSpPr/>
+        <p:nvPr/>
+      </p:nvGrpSpPr>
+      <p:grpSpPr>
+        <a:xfrm>
+          <a:off x="0" y="0"/>
+          <a:ext cx="0" cy="0"/>
+          <a:chOff x="0" y="0"/>
+          <a:chExt cx="0" cy="0"/>
+        </a:xfrm>
+      </p:grpSpPr>
+      <p:sp>
+        <p:nvSpPr>
+          <p:cNvPr id="2" name="Title 1"/>
+          <p:cNvSpPr>
+            <a:spLocks noGrp="1"/>
+          </p:cNvSpPr>
+          <p:nvPr>
+            <p:ph type="title"/>
+          </p:nvPr>
+        </p:nvSpPr>
+        <p:spPr>
+          <a:xfrm>
+            <a:off x="0" y="-315416"/>
+            <a:ext cx="7498080" cy="1143000"/>
+          </a:xfrm>
+        </p:spPr>
+        <p:txBody>
+          <a:bodyPr/>
+          <a:lstStyle/>
+          <a:p>
+            <a:r>
+              <a:rPr lang="en-IN" dirty="0" smtClean="0"/>
+              <a:t>RI </a:t>
+            </a:r>
+            <a:r>
+              <a:rPr lang="en-IN" dirty="0" err="1" smtClean="0"/>
+              <a:t>vs</a:t>
+            </a:r>
+            <a:r>
+              <a:rPr lang="en-IN" dirty="0" smtClean="0"/>
+              <a:t> Temperature</a:t>
+            </a:r>
+            <a:endParaRPr lang="en-IN" dirty="0"/>
+          </a:p>
+        </p:txBody>
+      </p:sp>
+      <p:pic>
+        <p:nvPicPr>
+          <p:cNvPr id="4" name="Content Placeholder 3" descr="n_vs_temperatureK-SFLD14_1.png"/>
+          <p:cNvPicPr>
+            <a:picLocks noGrp="1" noChangeAspect="1"/>
+          </p:cNvPicPr>
+          <p:nvPr>
+            <p:ph idx="1"/>
+          </p:nvPr>
+        </p:nvPicPr>
+        <p:blipFill>
+          <a:blip r:embed="rId2" cstate="print"/>
+          <a:stretch>
+            <a:fillRect/>
+          </a:stretch>
+        </p:blipFill>
+        <p:spPr>
+          <a:xfrm>
+            <a:off x="1187624" y="764704"/>
+            <a:ext cx="6516216" cy="4800600"/>
+          </a:xfrm>
+        </p:spPr>
+      </p:pic>
+      <p:sp>
+        <p:nvSpPr>
+          <p:cNvPr id="5" name="TextBox 4"/>
+          <p:cNvSpPr txBox="1"/>
+          <p:nvPr/>
+        </p:nvSpPr>
+        <p:spPr>
+          <a:xfrm>
+            <a:off x="323528" y="5445224"/>
+            <a:ext cx="8064896" cy="1384995"/>
+          </a:xfrm>
+          <a:prstGeom prst="rect">
+            <a:avLst/>
+          </a:prstGeom>
+          <a:noFill/>
+        </p:spPr>
+        <p:txBody>
+          <a:bodyPr wrap="square" rtlCol="0">
+            <a:spAutoFit/>
+          </a:bodyPr>
+          <a:lstStyle/>
+          <a:p>
+            <a:pPr>
+              <a:buFont typeface="Arial" pitchFamily="34" charset="0"/>
+              <a:buChar char="•"/>
+            </a:pPr>
+            <a:r>
+              <a:rPr lang="en-IN" sz="2800" dirty="0" smtClean="0"/>
+              <a:t>Light blue colour for pressure at P=90000 Pa and red colour for pressure P = 103250 Pa</a:t>
+            </a:r>
+          </a:p>
+          <a:p>
+            <a:pPr>
+              <a:buFont typeface="Arial" pitchFamily="34" charset="0"/>
+              <a:buChar char="•"/>
+            </a:pPr>
+            <a:endParaRPr lang="en-IN" sz="2800" dirty="0"/>
+          </a:p>
+        </p:txBody>
+      </p:sp>
+    </p:spTree>
+  </p:cSld>
+  <p:clrMapOvr>
+    <a:masterClrMapping/>
+  </p:clrMapOvr>
+  <p:timing>
+    <p:tnLst>
+      <p:par>
+        <p:cTn id="1" dur="indefinite" restart="never" nodeType="tmRoot">
+          <p:childTnLst>
+            <p:seq concurrent="1" nextAc="seek">
+              <p:cTn id="2" dur="indefinite" nodeType="mainSeq">
+                <p:childTnLst>
+                  <p:par>
+                    <p:cTn id="3" fill="hold">
+                      <p:stCondLst>
+                        <p:cond delay="indefinite"/>
+                      </p:stCondLst>
+                      <p:childTnLst>
+                        <p:par>
+                          <p:cTn id="4" fill="hold">
+                            <p:stCondLst>
+                              <p:cond delay="0"/>
+                            </p:stCondLst>
+                            <p:childTnLst>
+                              <p:par>
+                                <p:cTn id="5" presetID="10" presetClass="entr" presetSubtype="0" fill="hold" grpId="0" nodeType="clickEffect">
+                                  <p:stCondLst>
+                                    <p:cond delay="0"/>
+                                  </p:stCondLst>
+                                  <p:childTnLst>
+                                    <p:set>
+                                      <p:cBhvr>
+                                        <p:cTn id="6" dur="1" fill="hold">
+                                          <p:stCondLst>
+                                            <p:cond delay="0"/>
+                                          </p:stCondLst>
+                                        </p:cTn>
+                                        <p:tgtEl>
+                                          <p:spTgt spid="2"/>
+                                        </p:tgtEl>
+                                        <p:attrNameLst>
+                                          <p:attrName>style.visibility</p:attrName>
+                                        </p:attrNameLst>
+                                      </p:cBhvr>
+                                      <p:to>
+                                        <p:strVal val="visible"/>
+                                      </p:to>
+                                    </p:set>
+                                    <p:animEffect transition="in" filter="fade">
+                                      <p:cBhvr>
+                                        <p:cTn id="7" dur="2000"/>
+                                        <p:tgtEl>
+                                          <p:spTgt spid="2"/>
+                                        </p:tgtEl>
+                                      </p:cBhvr>
+                                    </p:animEffect>
+                                  </p:childTnLst>
+                                </p:cTn>
+                              </p:par>
+                            </p:childTnLst>
+                          </p:cTn>
+                        </p:par>
+                      </p:childTnLst>
+                    </p:cTn>
+                  </p:par>
+                  <p:par>
+                    <p:cTn id="8" fill="hold">
+                      <p:stCondLst>
+                        <p:cond delay="indefinite"/>
+                      </p:stCondLst>
+                      <p:childTnLst>
+                        <p:par>
+                          <p:cTn id="9" fill="hold">
+                            <p:stCondLst>
+                              <p:cond delay="0"/>
+                            </p:stCondLst>
+                            <p:childTnLst>
+                              <p:par>
+                                <p:cTn id="10" presetID="10" presetClass="entr" presetSubtype="0" fill="hold" nodeType="clickEffect">
+                                  <p:stCondLst>
+                                    <p:cond delay="0"/>
+                                  </p:stCondLst>
+                                  <p:childTnLst>
+                                    <p:set>
+                                      <p:cBhvr>
+                                        <p:cTn id="11" dur="1" fill="hold">
+                                          <p:stCondLst>
+                                            <p:cond delay="0"/>
+                                          </p:stCondLst>
+                                        </p:cTn>
+                                        <p:tgtEl>
+                                          <p:spTgt spid="4"/>
+                                        </p:tgtEl>
+                                        <p:attrNameLst>
+                                          <p:attrName>style.visibility</p:attrName>
+                                        </p:attrNameLst>
+                                      </p:cBhvr>
+                                      <p:to>
+                                        <p:strVal val="visible"/>
+                                      </p:to>
+                                    </p:set>
+                                    <p:animEffect transition="in" filter="fade">
+                                      <p:cBhvr>
+                                        <p:cTn id="12" dur="2000"/>
+                                        <p:tgtEl>
+                                          <p:spTgt spid="4"/>
+                                        </p:tgtEl>
+                                      </p:cBhvr>
+                                    </p:animEffect>
+                                  </p:childTnLst>
+                                </p:cTn>
+                              </p:par>
+                            </p:childTnLst>
+                          </p:cTn>
+                        </p:par>
+                      </p:childTnLst>
+                    </p:cTn>
+                  </p:par>
+                  <p:par>
+                    <p:cTn id="13" fill="hold">
+                      <p:stCondLst>
+                        <p:cond delay="indefinite"/>
+                      </p:stCondLst>
+                      <p:childTnLst>
+                        <p:par>
+                          <p:cTn id="14" fill="hold">
+                            <p:stCondLst>
+                              <p:cond delay="0"/>
+                            </p:stCondLst>
+                            <p:childTnLst>
+                              <p:par>
+                                <p:cTn id="15" presetID="10" presetClass="entr" presetSubtype="0" fill="hold" grpId="0" nodeType="clickEffect">
+                                  <p:stCondLst>
+                                    <p:cond delay="0"/>
+                                  </p:stCondLst>
+                                  <p:childTnLst>
+                                    <p:set>
+                                      <p:cBhvr>
+                                        <p:cTn id="16" dur="1" fill="hold">
+                                          <p:stCondLst>
+                                            <p:cond delay="0"/>
+                                          </p:stCondLst>
+                                        </p:cTn>
+                                        <p:tgtEl>
+                                          <p:spTgt spid="5">
+                                            <p:txEl>
+                                              <p:pRg st="0" end="0"/>
+                                            </p:txEl>
+                                          </p:spTgt>
+                                        </p:tgtEl>
+                                        <p:attrNameLst>
+                                          <p:attrName>style.visibility</p:attrName>
+                                        </p:attrNameLst>
+                                      </p:cBhvr>
+                                      <p:to>
+                                        <p:strVal val="visible"/>
+                                      </p:to>
+                                    </p:set>
+                                    <p:animEffect transition="in" filter="fade">
+                                      <p:cBhvr>
+                                        <p:cTn id="17" dur="2000"/>
+                                        <p:tgtEl>
+                                          <p:spTgt spid="5">
+                                            <p:txEl>
+                                              <p:pRg st="0" end="0"/>
+                                            </p:txEl>
+                                          </p:spTgt>
+                                        </p:tgtEl>
+                                      </p:cBhvr>
+                                    </p:animEffect>
+                                  </p:childTnLst>
+                                </p:cTn>
+                              </p:par>
+                            </p:childTnLst>
+                          </p:cTn>
+                        </p:par>
+                      </p:childTnLst>
+                    </p:cTn>
+                  </p:par>
+                </p:childTnLst>
+              </p:cTn>
+              <p:prevCondLst>
+                <p:cond evt="onPrev" delay="0">
+                  <p:tgtEl>
+                    <p:sldTgt/>
+                  </p:tgtEl>
+                </p:cond>
+              </p:prevCondLst>
+              <p:nextCondLst>
+                <p:cond evt="onNext" delay="0">
+                  <p:tgtEl>
+                    <p:sldTgt/>
+                  </p:tgtEl>
+                </p:cond>
+              </p:nextCondLst>
+            </p:seq>
+          </p:childTnLst>
+        </p:cTn>
+      </p:par>
+    </p:tnLst>
+    <p:bldLst>
+      <p:bldP spid="2" grpId="0"/>
+      <p:bldP spid="5" grpId="0" build="allAtOnce"/>
+    </p:bldLst>
+  </p:timing>
+</p:sld>
+</file>
+
+<file path=ppt/slides/slide22.xml><?xml version="1.0" encoding="utf-8"?>
+<p:sld xmlns:a="http://schemas.openxmlformats.org/drawingml/2006/main" xmlns:r="http://schemas.openxmlformats.org/officeDocument/2006/relationships" xmlns:p="http://schemas.openxmlformats.org/presentationml/2006/main">
+  <p:cSld>
+    <p:spTree>
+      <p:nvGrpSpPr>
+        <p:cNvPr id="1" name=""/>
+        <p:cNvGrpSpPr/>
+        <p:nvPr/>
+      </p:nvGrpSpPr>
+      <p:grpSpPr>
+        <a:xfrm>
+          <a:off x="0" y="0"/>
+          <a:ext cx="0" cy="0"/>
+          <a:chOff x="0" y="0"/>
+          <a:chExt cx="0" cy="0"/>
+        </a:xfrm>
+      </p:grpSpPr>
+      <p:sp>
+        <p:nvSpPr>
+          <p:cNvPr id="2" name="Title 1"/>
+          <p:cNvSpPr>
+            <a:spLocks noGrp="1"/>
+          </p:cNvSpPr>
+          <p:nvPr>
+            <p:ph type="title"/>
+          </p:nvPr>
+        </p:nvSpPr>
+        <p:spPr>
+          <a:xfrm>
+            <a:off x="0" y="-243408"/>
+            <a:ext cx="7498080" cy="1143000"/>
+          </a:xfrm>
+        </p:spPr>
+        <p:txBody>
+          <a:bodyPr/>
+          <a:lstStyle/>
+          <a:p>
+            <a:r>
+              <a:rPr lang="en-IN" dirty="0" smtClean="0"/>
+              <a:t>K-SFLD 14</a:t>
+            </a:r>
+            <a:endParaRPr lang="en-IN" dirty="0"/>
+          </a:p>
+        </p:txBody>
+      </p:sp>
+      <p:sp>
+        <p:nvSpPr>
+          <p:cNvPr id="3" name="Content Placeholder 2"/>
+          <p:cNvSpPr>
+            <a:spLocks noGrp="1"/>
+          </p:cNvSpPr>
+          <p:nvPr>
+            <p:ph idx="1"/>
+          </p:nvPr>
+        </p:nvSpPr>
+        <p:spPr>
+          <a:xfrm>
+            <a:off x="0" y="1097360"/>
+            <a:ext cx="9144000" cy="5760640"/>
+          </a:xfrm>
+        </p:spPr>
+        <p:txBody>
+          <a:bodyPr/>
+          <a:lstStyle/>
+          <a:p>
+            <a:r>
+              <a:rPr lang="en-IN" dirty="0" smtClean="0"/>
+              <a:t>Refractive index for wavelength 1060nm at reference temperature 20 </a:t>
+            </a:r>
+            <a:r>
+              <a:rPr lang="en-IN" dirty="0" err="1" smtClean="0"/>
+              <a:t>celsius</a:t>
+            </a:r>
+            <a:r>
+              <a:rPr lang="en-IN" dirty="0" smtClean="0"/>
+              <a:t> and pressure 103250 is 1.7327813923080453.</a:t>
+            </a:r>
+          </a:p>
+          <a:p>
+            <a:r>
+              <a:rPr lang="en-IN" dirty="0" smtClean="0"/>
+              <a:t>At 40 </a:t>
+            </a:r>
+            <a:r>
+              <a:rPr lang="en-IN" dirty="0" err="1" smtClean="0"/>
+              <a:t>celsius</a:t>
+            </a:r>
+            <a:r>
+              <a:rPr lang="en-IN" dirty="0" smtClean="0"/>
+              <a:t> and pressure 103250 is 1.7327685035899263.</a:t>
+            </a:r>
+          </a:p>
+          <a:p>
+            <a:endParaRPr lang="en-IN" dirty="0" smtClean="0"/>
+          </a:p>
+          <a:p>
+            <a:r>
+              <a:rPr lang="en-IN" dirty="0" smtClean="0"/>
+              <a:t>With same temperature 40 but at different pressure 90000 Pa, RI is 1.7328256042662116.</a:t>
+            </a:r>
+          </a:p>
+          <a:p>
+            <a:endParaRPr lang="en-IN" dirty="0"/>
+          </a:p>
+        </p:txBody>
+      </p:sp>
+    </p:spTree>
+  </p:cSld>
+  <p:clrMapOvr>
+    <a:masterClrMapping/>
+  </p:clrMapOvr>
+  <p:timing>
+    <p:tnLst>
+      <p:par>
+        <p:cTn id="1" dur="indefinite" restart="never" nodeType="tmRoot">
+          <p:childTnLst>
+            <p:seq concurrent="1" nextAc="seek">
+              <p:cTn id="2" dur="indefinite" nodeType="mainSeq">
+                <p:childTnLst>
+                  <p:par>
+                    <p:cTn id="3" fill="hold">
+                      <p:stCondLst>
+                        <p:cond delay="indefinite"/>
+                      </p:stCondLst>
+                      <p:childTnLst>
+                        <p:par>
+                          <p:cTn id="4" fill="hold">
+                            <p:stCondLst>
+                              <p:cond delay="0"/>
+                            </p:stCondLst>
+                            <p:childTnLst>
+                              <p:par>
+                                <p:cTn id="5" presetID="10" presetClass="entr" presetSubtype="0" fill="hold" grpId="0" nodeType="clickEffect">
+                                  <p:stCondLst>
+                                    <p:cond delay="0"/>
+                                  </p:stCondLst>
+                                  <p:childTnLst>
+                                    <p:set>
+                                      <p:cBhvr>
+                                        <p:cTn id="6" dur="1" fill="hold">
+                                          <p:stCondLst>
+                                            <p:cond delay="0"/>
+                                          </p:stCondLst>
+                                        </p:cTn>
+                                        <p:tgtEl>
+                                          <p:spTgt spid="2"/>
+                                        </p:tgtEl>
+                                        <p:attrNameLst>
+                                          <p:attrName>style.visibility</p:attrName>
+                                        </p:attrNameLst>
+                                      </p:cBhvr>
+                                      <p:to>
+                                        <p:strVal val="visible"/>
+                                      </p:to>
+                                    </p:set>
+                                    <p:animEffect transition="in" filter="fade">
+                                      <p:cBhvr>
+                                        <p:cTn id="7" dur="2000"/>
+                                        <p:tgtEl>
+                                          <p:spTgt spid="2"/>
+                                        </p:tgtEl>
+                                      </p:cBhvr>
+                                    </p:animEffect>
+                                  </p:childTnLst>
+                                </p:cTn>
+                              </p:par>
+                            </p:childTnLst>
+                          </p:cTn>
+                        </p:par>
+                      </p:childTnLst>
+                    </p:cTn>
+                  </p:par>
+                  <p:par>
+                    <p:cTn id="8" fill="hold">
+                      <p:stCondLst>
+                        <p:cond delay="indefinite"/>
+                      </p:stCondLst>
+                      <p:childTnLst>
+                        <p:par>
+                          <p:cTn id="9" fill="hold">
+                            <p:stCondLst>
+                              <p:cond delay="0"/>
+                            </p:stCondLst>
+                            <p:childTnLst>
+                              <p:par>
+                                <p:cTn id="10" presetID="10" presetClass="entr" presetSubtype="0" fill="hold" grpId="0" nodeType="clickEffect">
+                                  <p:stCondLst>
+                                    <p:cond delay="0"/>
+                                  </p:stCondLst>
+                                  <p:childTnLst>
+                                    <p:set>
+                                      <p:cBhvr>
+                                        <p:cTn id="11" dur="1" fill="hold">
+                                          <p:stCondLst>
+                                            <p:cond delay="0"/>
+                                          </p:stCondLst>
+                                        </p:cTn>
+                                        <p:tgtEl>
+                                          <p:spTgt spid="3">
+                                            <p:txEl>
+                                              <p:pRg st="0" end="0"/>
+                                            </p:txEl>
+                                          </p:spTgt>
+                                        </p:tgtEl>
+                                        <p:attrNameLst>
+                                          <p:attrName>style.visibility</p:attrName>
+                                        </p:attrNameLst>
+                                      </p:cBhvr>
+                                      <p:to>
+                                        <p:strVal val="visible"/>
+                                      </p:to>
+                                    </p:set>
+                                    <p:animEffect transition="in" filter="fade">
+                                      <p:cBhvr>
+                                        <p:cTn id="12" dur="2000"/>
+                                        <p:tgtEl>
+                                          <p:spTgt spid="3">
+                                            <p:txEl>
+                                              <p:pRg st="0" end="0"/>
+                                            </p:txEl>
+                                          </p:spTgt>
+                                        </p:tgtEl>
+                                      </p:cBhvr>
+                                    </p:animEffect>
+                                  </p:childTnLst>
+                                </p:cTn>
+                              </p:par>
+                            </p:childTnLst>
+                          </p:cTn>
+                        </p:par>
+                      </p:childTnLst>
+                    </p:cTn>
+                  </p:par>
+                  <p:par>
+                    <p:cTn id="13" fill="hold">
+                      <p:stCondLst>
+                        <p:cond delay="indefinite"/>
+                      </p:stCondLst>
+                      <p:childTnLst>
+                        <p:par>
+                          <p:cTn id="14" fill="hold">
+                            <p:stCondLst>
+                              <p:cond delay="0"/>
+                            </p:stCondLst>
+                            <p:childTnLst>
+                              <p:par>
+                                <p:cTn id="15" presetID="10" presetClass="entr" presetSubtype="0" fill="hold" grpId="0" nodeType="clickEffect">
+                                  <p:stCondLst>
+                                    <p:cond delay="0"/>
+                                  </p:stCondLst>
+                                  <p:childTnLst>
+                                    <p:set>
+                                      <p:cBhvr>
+                                        <p:cTn id="16" dur="1" fill="hold">
+                                          <p:stCondLst>
+                                            <p:cond delay="0"/>
+                                          </p:stCondLst>
+                                        </p:cTn>
+                                        <p:tgtEl>
+                                          <p:spTgt spid="3">
+                                            <p:txEl>
+                                              <p:pRg st="1" end="1"/>
+                                            </p:txEl>
+                                          </p:spTgt>
+                                        </p:tgtEl>
+                                        <p:attrNameLst>
+                                          <p:attrName>style.visibility</p:attrName>
+                                        </p:attrNameLst>
+                                      </p:cBhvr>
+                                      <p:to>
+                                        <p:strVal val="visible"/>
+                                      </p:to>
+                                    </p:set>
+                                    <p:animEffect transition="in" filter="fade">
+                                      <p:cBhvr>
+                                        <p:cTn id="17" dur="2000"/>
+                                        <p:tgtEl>
+                                          <p:spTgt spid="3">
+                                            <p:txEl>
+                                              <p:pRg st="1" end="1"/>
+                                            </p:txEl>
+                                          </p:spTgt>
+                                        </p:tgtEl>
+                                      </p:cBhvr>
+                                    </p:animEffect>
+                                  </p:childTnLst>
+                                </p:cTn>
+                              </p:par>
+                            </p:childTnLst>
+                          </p:cTn>
+                        </p:par>
+                      </p:childTnLst>
+                    </p:cTn>
+                  </p:par>
+                  <p:par>
+                    <p:cTn id="18" fill="hold">
+                      <p:stCondLst>
+                        <p:cond delay="indefinite"/>
+                      </p:stCondLst>
+                      <p:childTnLst>
+                        <p:par>
+                          <p:cTn id="19" fill="hold">
+                            <p:stCondLst>
+                              <p:cond delay="0"/>
+                            </p:stCondLst>
+                            <p:childTnLst>
+                              <p:par>
+                                <p:cTn id="20" presetID="10" presetClass="entr" presetSubtype="0" fill="hold" grpId="0" nodeType="clickEffect">
+                                  <p:stCondLst>
+                                    <p:cond delay="0"/>
+                                  </p:stCondLst>
+                                  <p:childTnLst>
+                                    <p:set>
+                                      <p:cBhvr>
+                                        <p:cTn id="21" dur="1" fill="hold">
+                                          <p:stCondLst>
+                                            <p:cond delay="0"/>
+                                          </p:stCondLst>
+                                        </p:cTn>
+                                        <p:tgtEl>
+                                          <p:spTgt spid="3">
+                                            <p:txEl>
+                                              <p:pRg st="3" end="3"/>
+                                            </p:txEl>
+                                          </p:spTgt>
+                                        </p:tgtEl>
+                                        <p:attrNameLst>
+                                          <p:attrName>style.visibility</p:attrName>
+                                        </p:attrNameLst>
+                                      </p:cBhvr>
+                                      <p:to>
+                                        <p:strVal val="visible"/>
+                                      </p:to>
+                                    </p:set>
+                                    <p:animEffect transition="in" filter="fade">
+                                      <p:cBhvr>
+                                        <p:cTn id="22" dur="2000"/>
+                                        <p:tgtEl>
+                                          <p:spTgt spid="3">
+                                            <p:txEl>
+                                              <p:pRg st="3" end="3"/>
+                                            </p:txEl>
+                                          </p:spTgt>
+                                        </p:tgtEl>
+                                      </p:cBhvr>
+                                    </p:animEffect>
+                                  </p:childTnLst>
+                                </p:cTn>
+                              </p:par>
+                            </p:childTnLst>
+                          </p:cTn>
+                        </p:par>
+                      </p:childTnLst>
+                    </p:cTn>
+                  </p:par>
+                </p:childTnLst>
+              </p:cTn>
+              <p:prevCondLst>
+                <p:cond evt="onPrev" delay="0">
+                  <p:tgtEl>
+                    <p:sldTgt/>
+                  </p:tgtEl>
+                </p:cond>
+              </p:prevCondLst>
+              <p:nextCondLst>
+                <p:cond evt="onNext" delay="0">
+                  <p:tgtEl>
+                    <p:sldTgt/>
+                  </p:tgtEl>
+                </p:cond>
+              </p:nextCondLst>
+            </p:seq>
+          </p:childTnLst>
+        </p:cTn>
+      </p:par>
+    </p:tnLst>
+    <p:bldLst>
+      <p:bldP spid="2" grpId="0"/>
+      <p:bldP spid="3" grpId="0" build="p"/>
+    </p:bldLst>
+  </p:timing>
+</p:sld>
+</file>
+
+<file path=ppt/slides/slide23.xml><?xml version="1.0" encoding="utf-8"?>
+<p:sld xmlns:a="http://schemas.openxmlformats.org/drawingml/2006/main" xmlns:r="http://schemas.openxmlformats.org/officeDocument/2006/relationships" xmlns:p="http://schemas.openxmlformats.org/presentationml/2006/main">
+  <p:cSld>
+    <p:spTree>
+      <p:nvGrpSpPr>
+        <p:cNvPr id="1" name=""/>
+        <p:cNvGrpSpPr/>
+        <p:nvPr/>
+      </p:nvGrpSpPr>
+      <p:grpSpPr>
+        <a:xfrm>
+          <a:off x="0" y="0"/>
+          <a:ext cx="0" cy="0"/>
+          <a:chOff x="0" y="0"/>
+          <a:chExt cx="0" cy="0"/>
+        </a:xfrm>
+      </p:grpSpPr>
+      <p:sp>
+        <p:nvSpPr>
+          <p:cNvPr id="2" name="Title 1"/>
+          <p:cNvSpPr>
+            <a:spLocks noGrp="1"/>
+          </p:cNvSpPr>
+          <p:nvPr>
+            <p:ph type="title"/>
+          </p:nvPr>
+        </p:nvSpPr>
+        <p:spPr/>
+        <p:txBody>
+          <a:bodyPr/>
+          <a:lstStyle/>
+          <a:p>
+            <a:r>
+              <a:rPr lang="en-IN" dirty="0" smtClean="0"/>
+              <a:t>Applications of data</a:t>
+            </a:r>
+            <a:endParaRPr lang="en-IN" dirty="0"/>
+          </a:p>
+        </p:txBody>
+      </p:sp>
+      <p:sp>
+        <p:nvSpPr>
+          <p:cNvPr id="3" name="Content Placeholder 2"/>
+          <p:cNvSpPr>
+            <a:spLocks noGrp="1"/>
+          </p:cNvSpPr>
+          <p:nvPr>
+            <p:ph idx="1"/>
+          </p:nvPr>
+        </p:nvSpPr>
+        <p:spPr/>
+        <p:txBody>
+          <a:bodyPr/>
+          <a:lstStyle/>
+          <a:p>
+            <a:r>
+              <a:rPr lang="en-IN" dirty="0" smtClean="0"/>
+              <a:t>Using this thermal analysis data and dispersion data, we can get precise value of aberration which further uses in reducing the aberration.</a:t>
+            </a:r>
+          </a:p>
+        </p:txBody>
+      </p:sp>
+    </p:spTree>
+  </p:cSld>
+  <p:clrMapOvr>
+    <a:masterClrMapping/>
+  </p:clrMapOvr>
+  <p:timing>
+    <p:tnLst>
+      <p:par>
+        <p:cTn id="1" dur="indefinite" restart="never" nodeType="tmRoot">
+          <p:childTnLst>
+            <p:seq concurrent="1" nextAc="seek">
+              <p:cTn id="2" dur="indefinite" nodeType="mainSeq">
+                <p:childTnLst>
+                  <p:par>
+                    <p:cTn id="3" fill="hold">
+                      <p:stCondLst>
+                        <p:cond delay="indefinite"/>
+                      </p:stCondLst>
+                      <p:childTnLst>
+                        <p:par>
+                          <p:cTn id="4" fill="hold">
+                            <p:stCondLst>
+                              <p:cond delay="0"/>
+                            </p:stCondLst>
+                            <p:childTnLst>
+                              <p:par>
+                                <p:cTn id="5" presetID="10" presetClass="entr" presetSubtype="0" fill="hold" grpId="0" nodeType="clickEffect">
+                                  <p:stCondLst>
+                                    <p:cond delay="0"/>
+                                  </p:stCondLst>
+                                  <p:childTnLst>
+                                    <p:set>
+                                      <p:cBhvr>
+                                        <p:cTn id="6" dur="1" fill="hold">
+                                          <p:stCondLst>
+                                            <p:cond delay="0"/>
+                                          </p:stCondLst>
+                                        </p:cTn>
+                                        <p:tgtEl>
+                                          <p:spTgt spid="2"/>
+                                        </p:tgtEl>
+                                        <p:attrNameLst>
+                                          <p:attrName>style.visibility</p:attrName>
+                                        </p:attrNameLst>
+                                      </p:cBhvr>
+                                      <p:to>
+                                        <p:strVal val="visible"/>
+                                      </p:to>
+                                    </p:set>
+                                    <p:animEffect transition="in" filter="fade">
+                                      <p:cBhvr>
+                                        <p:cTn id="7" dur="2000"/>
+                                        <p:tgtEl>
+                                          <p:spTgt spid="2"/>
+                                        </p:tgtEl>
+                                      </p:cBhvr>
+                                    </p:animEffect>
+                                  </p:childTnLst>
+                                </p:cTn>
+                              </p:par>
+                            </p:childTnLst>
+                          </p:cTn>
+                        </p:par>
+                      </p:childTnLst>
+                    </p:cTn>
+                  </p:par>
+                  <p:par>
+                    <p:cTn id="8" fill="hold">
+                      <p:stCondLst>
+                        <p:cond delay="indefinite"/>
+                      </p:stCondLst>
+                      <p:childTnLst>
+                        <p:par>
+                          <p:cTn id="9" fill="hold">
+                            <p:stCondLst>
+                              <p:cond delay="0"/>
+                            </p:stCondLst>
+                            <p:childTnLst>
+                              <p:par>
+                                <p:cTn id="10" presetID="10" presetClass="entr" presetSubtype="0" fill="hold" grpId="0" nodeType="clickEffect">
+                                  <p:stCondLst>
+                                    <p:cond delay="0"/>
+                                  </p:stCondLst>
+                                  <p:childTnLst>
+                                    <p:set>
+                                      <p:cBhvr>
+                                        <p:cTn id="11" dur="1" fill="hold">
+                                          <p:stCondLst>
+                                            <p:cond delay="0"/>
+                                          </p:stCondLst>
+                                        </p:cTn>
+                                        <p:tgtEl>
+                                          <p:spTgt spid="3">
+                                            <p:txEl>
+                                              <p:pRg st="0" end="0"/>
+                                            </p:txEl>
+                                          </p:spTgt>
+                                        </p:tgtEl>
+                                        <p:attrNameLst>
+                                          <p:attrName>style.visibility</p:attrName>
+                                        </p:attrNameLst>
+                                      </p:cBhvr>
+                                      <p:to>
+                                        <p:strVal val="visible"/>
+                                      </p:to>
+                                    </p:set>
+                                    <p:animEffect transition="in" filter="fade">
+                                      <p:cBhvr>
+                                        <p:cTn id="12" dur="2000"/>
+                                        <p:tgtEl>
+                                          <p:spTgt spid="3">
+                                            <p:txEl>
+                                              <p:pRg st="0" end="0"/>
+                                            </p:txEl>
+                                          </p:spTgt>
+                                        </p:tgtEl>
+                                      </p:cBhvr>
+                                    </p:animEffect>
+                                  </p:childTnLst>
+                                </p:cTn>
+                              </p:par>
+                            </p:childTnLst>
+                          </p:cTn>
+                        </p:par>
+                      </p:childTnLst>
+                    </p:cTn>
+                  </p:par>
+                </p:childTnLst>
+              </p:cTn>
+              <p:prevCondLst>
+                <p:cond evt="onPrev" delay="0">
+                  <p:tgtEl>
+                    <p:sldTgt/>
+                  </p:tgtEl>
+                </p:cond>
+              </p:prevCondLst>
+              <p:nextCondLst>
+                <p:cond evt="onNext" delay="0">
+                  <p:tgtEl>
+                    <p:sldTgt/>
+                  </p:tgtEl>
+                </p:cond>
+              </p:nextCondLst>
+            </p:seq>
+          </p:childTnLst>
+        </p:cTn>
+      </p:par>
+    </p:tnLst>
+    <p:bldLst>
+      <p:bldP spid="2" grpId="0"/>
+      <p:bldP spid="3" grpId="0" build="allAtOnce"/>
     </p:bldLst>
   </p:timing>
 </p:sld>
@@ -8253,6 +11354,18 @@
           <a:bodyPr/>
           <a:lstStyle/>
           <a:p>
+            <a:r>
+              <a:rPr lang="en-IN" dirty="0" smtClean="0"/>
+              <a:t>Dispersion of </a:t>
+            </a:r>
+            <a:r>
+              <a:rPr lang="en-IN" dirty="0" smtClean="0"/>
+              <a:t>light....</a:t>
+            </a:r>
+            <a:r>
+              <a:rPr lang="en-IN" dirty="0" err="1" smtClean="0"/>
+              <a:t>contd</a:t>
+            </a:r>
             <a:endParaRPr lang="en-IN" dirty="0"/>
           </a:p>
         </p:txBody>
@@ -8270,18 +11383,18 @@
         <p:spPr>
           <a:xfrm>
             <a:off x="1187624" y="1124744"/>
-            <a:ext cx="7498080" cy="4800600"/>
+            <a:ext cx="7498080" cy="5184576"/>
           </a:xfrm>
         </p:spPr>
         <p:txBody>
           <a:bodyPr>
-            <a:normAutofit fontScale="92500" lnSpcReduction="20000"/>
+            <a:normAutofit fontScale="92500" lnSpcReduction="10000"/>
           </a:bodyPr>
           <a:lstStyle/>
           <a:p>
             <a:r>
               <a:rPr lang="en-IN" dirty="0" smtClean="0"/>
-              <a:t>Another type, Anomalous dispersion. At the edge of that region the RI decreases rapidly because of absorption.</a:t>
+              <a:t>Another type, Anomalous dispersion. At the edge of that range, the RI decreases rapidly because of absorption.</a:t>
             </a:r>
           </a:p>
           <a:p>
@@ -8302,7 +11415,7 @@
           <a:p>
             <a:r>
               <a:rPr lang="en-IN" dirty="0" smtClean="0"/>
-              <a:t>Final equation due to electric field effect of light on medium is,</a:t>
+              <a:t>Final equation due to electric field effects of light on medium is given by,</a:t>
             </a:r>
           </a:p>
           <a:p>
@@ -8356,7 +11469,7 @@
         </p:blipFill>
         <p:spPr>
           <a:xfrm>
-            <a:off x="5364088" y="5301208"/>
+            <a:off x="6012160" y="5661248"/>
             <a:ext cx="2232248" cy="576064"/>
           </a:xfrm>
           <a:prstGeom prst="rect">
@@ -8754,7 +11867,7 @@
           <a:p>
             <a:r>
               <a:rPr lang="en-IN" dirty="0" smtClean="0"/>
-              <a:t>Relation trends :</a:t>
+              <a:t>General relation trends :</a:t>
             </a:r>
           </a:p>
           <a:p>
@@ -8772,7 +11885,7 @@
             </a:pPr>
             <a:r>
               <a:rPr lang="en-IN" dirty="0" smtClean="0"/>
-              <a:t> (2) The rate of increase becomes greater at shorter wavelength.</a:t>
+              <a:t> (2) The rate of change becomes greater at shorter wavelength.</a:t>
             </a:r>
           </a:p>
           <a:p>
@@ -9502,43 +12615,25 @@
           <a:p>
             <a:r>
               <a:rPr lang="en-IN" dirty="0" smtClean="0"/>
-              <a:t> There are experimentally verified constants values for all dispersion formula and give the relation between refractive index and wavelengths. There are some </a:t>
-            </a:r>
-            <a:r>
-              <a:rPr lang="en-IN" dirty="0" err="1" smtClean="0"/>
-              <a:t>catalogs</a:t>
-            </a:r>
+              <a:t> There are experimentally verified constants values for all dispersion formula and give the relation between refractive index and wavelengths. </a:t>
+            </a:r>
+          </a:p>
+          <a:p>
             <a:r>
               <a:rPr lang="en-IN" dirty="0" smtClean="0"/>
-              <a:t> made by manufacturer of glass which provides the details of the glass.</a:t>
+              <a:t>There are some catalogues made by manufacturer of glass which provides the details of the glass.</a:t>
             </a:r>
           </a:p>
           <a:p>
             <a:r>
               <a:rPr lang="en-IN" dirty="0" smtClean="0"/>
-              <a:t>These </a:t>
-            </a:r>
-            <a:r>
-              <a:rPr lang="en-IN" dirty="0" err="1" smtClean="0"/>
-              <a:t>catalogs</a:t>
-            </a:r>
+              <a:t>These catalogues provide the thermal and dispersion relation details.</a:t>
+            </a:r>
+          </a:p>
+          <a:p>
             <a:r>
               <a:rPr lang="en-IN" dirty="0" smtClean="0"/>
-              <a:t> provide the thermal and dispersion relation details.</a:t>
-            </a:r>
-          </a:p>
-          <a:p>
-            <a:r>
-              <a:rPr lang="en-IN" dirty="0" smtClean="0"/>
-              <a:t>Example of </a:t>
-            </a:r>
-            <a:r>
-              <a:rPr lang="en-IN" dirty="0" err="1" smtClean="0"/>
-              <a:t>catalogs</a:t>
-            </a:r>
-            <a:r>
-              <a:rPr lang="en-IN" dirty="0" smtClean="0"/>
-              <a:t> : </a:t>
+              <a:t>Example of catalogues : </a:t>
             </a:r>
             <a:r>
               <a:rPr lang="en-IN" dirty="0" err="1" smtClean="0"/>
@@ -9584,15 +12679,7 @@
           <a:p>
             <a:r>
               <a:rPr lang="en-IN" dirty="0" smtClean="0"/>
-              <a:t>Extension of the </a:t>
-            </a:r>
-            <a:r>
-              <a:rPr lang="en-IN" dirty="0" err="1" smtClean="0"/>
-              <a:t>catalog</a:t>
-            </a:r>
-            <a:r>
-              <a:rPr lang="en-IN" dirty="0" smtClean="0"/>
-              <a:t> is AGF which is basically ANSII file. It could open with notepad with texts. </a:t>
+              <a:t>Extension of the catalogues is AGF which is basically ANSII file. It could open with notepad in texts format. </a:t>
             </a:r>
             <a:br>
               <a:rPr lang="en-IN" dirty="0" smtClean="0"/>
@@ -9958,6 +13045,67 @@
                                           <p:spTgt spid="3">
                                             <p:txEl>
                                               <p:pRg st="4" end="4"/>
+                                            </p:txEl>
+                                          </p:spTgt>
+                                        </p:tgtEl>
+                                      </p:cBhvr>
+                                    </p:animEffect>
+                                  </p:childTnLst>
+                                </p:cTn>
+                              </p:par>
+                            </p:childTnLst>
+                          </p:cTn>
+                        </p:par>
+                      </p:childTnLst>
+                    </p:cTn>
+                  </p:par>
+                  <p:par>
+                    <p:cTn id="33" fill="hold">
+                      <p:stCondLst>
+                        <p:cond delay="indefinite"/>
+                      </p:stCondLst>
+                      <p:childTnLst>
+                        <p:par>
+                          <p:cTn id="34" fill="hold">
+                            <p:stCondLst>
+                              <p:cond delay="0"/>
+                            </p:stCondLst>
+                            <p:childTnLst>
+                              <p:par>
+                                <p:cTn id="35" presetID="10" presetClass="entr" presetSubtype="0" fill="hold" grpId="0" nodeType="clickEffect">
+                                  <p:stCondLst>
+                                    <p:cond delay="0"/>
+                                  </p:stCondLst>
+                                  <p:childTnLst>
+                                    <p:set>
+                                      <p:cBhvr>
+                                        <p:cTn id="36" dur="1" fill="hold">
+                                          <p:stCondLst>
+                                            <p:cond delay="0"/>
+                                          </p:stCondLst>
+                                        </p:cTn>
+                                        <p:tgtEl>
+                                          <p:spTgt spid="3">
+                                            <p:txEl>
+                                              <p:pRg st="5" end="5"/>
+                                            </p:txEl>
+                                          </p:spTgt>
+                                        </p:tgtEl>
+                                        <p:attrNameLst>
+                                          <p:attrName>style.visibility</p:attrName>
+                                        </p:attrNameLst>
+                                      </p:cBhvr>
+                                      <p:to>
+                                        <p:strVal val="visible"/>
+                                      </p:to>
+                                    </p:set>
+                                    <p:animEffect transition="in" filter="fade">
+                                      <p:cBhvr>
+                                        <p:cTn id="37" dur="2000"/>
+                                        <p:tgtEl>
+                                          <p:spTgt spid="3">
+                                            <p:txEl>
+                                              <p:pRg st="5" end="5"/>
                                             </p:txEl>
                                           </p:spTgt>
                                         </p:tgtEl>
@@ -10245,20 +13393,14 @@
         </p:nvSpPr>
         <p:spPr/>
         <p:txBody>
-          <a:bodyPr/>
+          <a:bodyPr>
+            <a:normAutofit fontScale="90000"/>
+          </a:bodyPr>
           <a:lstStyle/>
           <a:p>
             <a:r>
               <a:rPr lang="en-IN" dirty="0" smtClean="0"/>
-              <a:t>How to read </a:t>
-            </a:r>
-            <a:r>
-              <a:rPr lang="en-IN" dirty="0" err="1" smtClean="0"/>
-              <a:t>catalogs</a:t>
-            </a:r>
-            <a:r>
-              <a:rPr lang="en-IN" dirty="0" smtClean="0"/>
-              <a:t> (N-BK7)</a:t>
+              <a:t>How to read catalogues (N-BK7)</a:t>
             </a:r>
             <a:endParaRPr lang="en-IN" dirty="0"/>
           </a:p>
@@ -10437,21 +13579,13 @@
           <a:p>
             <a:r>
               <a:rPr lang="en-IN" dirty="0" smtClean="0"/>
-              <a:t>With using of python, data extraction from </a:t>
-            </a:r>
-            <a:r>
-              <a:rPr lang="en-IN" dirty="0" err="1" smtClean="0"/>
-              <a:t>catalogs</a:t>
-            </a:r>
+              <a:t>With using of python, data extraction from catalogues become easy task.</a:t>
+            </a:r>
+          </a:p>
+          <a:p>
             <a:r>
               <a:rPr lang="en-IN" dirty="0" smtClean="0"/>
-              <a:t> becomes easy.</a:t>
-            </a:r>
-          </a:p>
-          <a:p>
-            <a:r>
-              <a:rPr lang="en-IN" dirty="0" smtClean="0"/>
-              <a:t>After getting input data of glass name from user, python runs the code through loops and logic codes and get data and all constants.</a:t>
+              <a:t>After getting input data of glass name from user, python runs the code through loops and logic codes and gets data and all constants.</a:t>
             </a:r>
           </a:p>
           <a:p>
@@ -10798,21 +13932,13 @@
           <a:p>
             <a:r>
               <a:rPr lang="en-IN" dirty="0" smtClean="0"/>
-              <a:t>RI for N-BK7 at 1060 nm wavelength is </a:t>
-            </a:r>
+              <a:t>RI for N-BK7 at 1060 nm wavelength is 1.5066875568966998.</a:t>
+            </a:r>
+          </a:p>
+          <a:p>
             <a:r>
               <a:rPr lang="en-IN" dirty="0" smtClean="0"/>
-              <a:t>1.5066875568966998.</a:t>
-            </a:r>
-          </a:p>
-          <a:p>
-            <a:r>
-              <a:rPr lang="en-IN" dirty="0" smtClean="0"/>
-              <a:t>From </a:t>
-            </a:r>
-            <a:r>
-              <a:rPr lang="en-IN" dirty="0" smtClean="0"/>
-              <a:t>the equation of </a:t>
+              <a:t>From the equation of </a:t>
             </a:r>
             <a:r>
               <a:rPr lang="en-IN" dirty="0" err="1" smtClean="0"/>
@@ -10844,7 +13970,7 @@
         </p:blipFill>
         <p:spPr>
           <a:xfrm>
-            <a:off x="4211960" y="4091186"/>
+            <a:off x="4355976" y="4091186"/>
             <a:ext cx="4047356" cy="2766814"/>
           </a:xfrm>
           <a:prstGeom prst="rect">
@@ -10857,6 +13983,9 @@
   <p:clrMapOvr>
     <a:masterClrMapping/>
   </p:clrMapOvr>
+  <p:transition>
+    <p:fade/>
+  </p:transition>
   <p:timing>
     <p:tnLst>
       <p:par>
@@ -10878,7 +14007,7 @@
                             </p:stCondLst>
                             <p:childTnLst>
                               <p:par>
-                                <p:cTn id="5" presetID="10" presetClass="entr" presetSubtype="0" fill="hold" grpId="0" nodeType="clickEffect">
+                                <p:cTn id="5" presetID="10" presetClass="entr" presetSubtype="0" fill="hold" nodeType="clickEffect">
                                   <p:stCondLst>
                                     <p:cond delay="0"/>
                                   </p:stCondLst>
@@ -10891,7 +14020,7 @@
                                           </p:stCondLst>
                                         </p:cTn>
                                         <p:tgtEl>
-                                          <p:spTgt spid="2"/>
+                                          <p:spTgt spid="4"/>
                                         </p:tgtEl>
                                         <p:attrNameLst>
                                           <p:attrName>style.visibility</p:attrName>
@@ -10905,7 +14034,7 @@
                                       <p:cBhvr>
                                         <p:cTn id="7" dur="2000"/>
                                         <p:tgtEl>
-                                          <p:spTgt spid="2"/>
+                                          <p:spTgt spid="4"/>
                                         </p:tgtEl>
                                       </p:cBhvr>
                                     </p:animEffect>
@@ -10931,7 +14060,7 @@
                             </p:stCondLst>
                             <p:childTnLst>
                               <p:par>
-                                <p:cTn id="10" presetID="10" presetClass="entr" presetSubtype="0" fill="hold" nodeType="clickEffect">
+                                <p:cTn id="10" presetID="10" presetClass="entr" presetSubtype="0" fill="hold" grpId="0" nodeType="clickEffect">
                                   <p:stCondLst>
                                     <p:cond delay="0"/>
                                   </p:stCondLst>
@@ -10944,7 +14073,7 @@
                                           </p:stCondLst>
                                         </p:cTn>
                                         <p:tgtEl>
-                                          <p:spTgt spid="4"/>
+                                          <p:spTgt spid="2"/>
                                         </p:tgtEl>
                                         <p:attrNameLst>
                                           <p:attrName>style.visibility</p:attrName>
@@ -10958,7 +14087,7 @@
                                       <p:cBhvr>
                                         <p:cTn id="12" dur="2000"/>
                                         <p:tgtEl>
-                                          <p:spTgt spid="4"/>
+                                          <p:spTgt spid="2"/>
                                         </p:tgtEl>
                                       </p:cBhvr>
                                     </p:animEffect>

</xml_diff>